<commit_message>
feat(6_softmax): update code and ppt
</commit_message>
<xml_diff>
--- a/lessons/6_softmax/ppt/使用交叉熵损失函数和Softmax激活函数.pptx
+++ b/lessons/6_softmax/ppt/使用交叉熵损失函数和Softmax激活函数.pptx
@@ -239,7 +239,7 @@
                 <a:latin typeface="微软雅黑" panose="020B0503020204020204" charset="-122"/>
                 <a:ea typeface="微软雅黑" panose="020B0503020204020204" charset="-122"/>
               </a:rPr>
-              <a:t>2022/11/11</a:t>
+              <a:t>2022/11/24</a:t>
             </a:fld>
             <a:endParaRPr lang="zh-CN" altLang="en-US">
               <a:latin typeface="微软雅黑" panose="020B0503020204020204" charset="-122"/>
@@ -422,7 +422,7 @@
           <a:p>
             <a:fld id="{1AC49D05-6128-4D0D-A32A-06A5E73B386C}" type="datetimeFigureOut">
               <a:rPr lang="zh-CN" altLang="en-US" smtClean="0"/>
-              <a:t>2022/11/11</a:t>
+              <a:t>2022/11/24</a:t>
             </a:fld>
             <a:endParaRPr lang="zh-CN" altLang="en-US"/>
           </a:p>
@@ -1084,7 +1084,7 @@
           <a:p>
             <a:fld id="{9EFD9D74-47D9-4702-A33C-335B63B48DBF}" type="datetimeFigureOut">
               <a:rPr lang="zh-CN" altLang="en-US" smtClean="0"/>
-              <a:t>2022/11/11</a:t>
+              <a:t>2022/11/24</a:t>
             </a:fld>
             <a:endParaRPr lang="zh-CN" altLang="en-US" dirty="0"/>
           </a:p>
@@ -1417,7 +1417,7 @@
           <a:p>
             <a:fld id="{760FBDFE-C587-4B4C-A407-44438C67B59E}" type="datetimeFigureOut">
               <a:rPr lang="zh-CN" altLang="en-US" smtClean="0"/>
-              <a:t>2022/11/11</a:t>
+              <a:t>2022/11/24</a:t>
             </a:fld>
             <a:endParaRPr lang="zh-CN" altLang="en-US"/>
           </a:p>
@@ -1590,7 +1590,7 @@
           <a:p>
             <a:fld id="{9EFD9D74-47D9-4702-A33C-335B63B48DBF}" type="datetimeFigureOut">
               <a:rPr lang="zh-CN" altLang="en-US" smtClean="0"/>
-              <a:t>2022/11/11</a:t>
+              <a:t>2022/11/24</a:t>
             </a:fld>
             <a:endParaRPr lang="zh-CN" altLang="en-US" dirty="0"/>
           </a:p>
@@ -2115,7 +2115,7 @@
           <a:p>
             <a:fld id="{760FBDFE-C587-4B4C-A407-44438C67B59E}" type="datetimeFigureOut">
               <a:rPr lang="zh-CN" altLang="en-US" smtClean="0"/>
-              <a:t>2022/11/11</a:t>
+              <a:t>2022/11/24</a:t>
             </a:fld>
             <a:endParaRPr lang="zh-CN" altLang="en-US"/>
           </a:p>
@@ -2863,7 +2863,7 @@
           <a:p>
             <a:fld id="{760FBDFE-C587-4B4C-A407-44438C67B59E}" type="datetimeFigureOut">
               <a:rPr lang="zh-CN" altLang="en-US" smtClean="0"/>
-              <a:t>2022/11/11</a:t>
+              <a:t>2022/11/24</a:t>
             </a:fld>
             <a:endParaRPr lang="zh-CN" altLang="en-US"/>
           </a:p>
@@ -3029,7 +3029,7 @@
           <a:p>
             <a:fld id="{760FBDFE-C587-4B4C-A407-44438C67B59E}" type="datetimeFigureOut">
               <a:rPr lang="zh-CN" altLang="en-US" smtClean="0"/>
-              <a:t>2022/11/11</a:t>
+              <a:t>2022/11/24</a:t>
             </a:fld>
             <a:endParaRPr lang="zh-CN" altLang="en-US"/>
           </a:p>
@@ -3143,7 +3143,7 @@
           <a:p>
             <a:fld id="{760FBDFE-C587-4B4C-A407-44438C67B59E}" type="datetimeFigureOut">
               <a:rPr lang="zh-CN" altLang="en-US" smtClean="0"/>
-              <a:t>2022/11/11</a:t>
+              <a:t>2022/11/24</a:t>
             </a:fld>
             <a:endParaRPr lang="zh-CN" altLang="en-US"/>
           </a:p>
@@ -3473,7 +3473,7 @@
           <a:p>
             <a:fld id="{9EFD9D74-47D9-4702-A33C-335B63B48DBF}" type="datetimeFigureOut">
               <a:rPr lang="zh-CN" altLang="en-US" smtClean="0"/>
-              <a:t>2022/11/11</a:t>
+              <a:t>2022/11/24</a:t>
             </a:fld>
             <a:endParaRPr lang="zh-CN" altLang="en-US" dirty="0"/>
           </a:p>
@@ -3986,7 +3986,7 @@
           <a:p>
             <a:fld id="{760FBDFE-C587-4B4C-A407-44438C67B59E}" type="datetimeFigureOut">
               <a:rPr lang="zh-CN" altLang="en-US" smtClean="0"/>
-              <a:t>2022/11/11</a:t>
+              <a:t>2022/11/24</a:t>
             </a:fld>
             <a:endParaRPr lang="zh-CN" altLang="en-US"/>
           </a:p>
@@ -4100,7 +4100,7 @@
           <a:p>
             <a:fld id="{760FBDFE-C587-4B4C-A407-44438C67B59E}" type="datetimeFigureOut">
               <a:rPr lang="zh-CN" altLang="en-US" smtClean="0"/>
-              <a:t>2022/11/11</a:t>
+              <a:t>2022/11/24</a:t>
             </a:fld>
             <a:endParaRPr lang="zh-CN" altLang="en-US"/>
           </a:p>
@@ -4388,7 +4388,7 @@
           <a:p>
             <a:fld id="{82F288E0-7875-42C4-84C8-98DBBD3BF4D2}" type="datetimeFigureOut">
               <a:rPr lang="zh-CN" altLang="en-US" smtClean="0"/>
-              <a:t>2022/11/11</a:t>
+              <a:t>2022/11/24</a:t>
             </a:fld>
             <a:endParaRPr lang="zh-CN" altLang="en-US"/>
           </a:p>
@@ -4847,7 +4847,7 @@
           <a:p>
             <a:fld id="{760FBDFE-C587-4B4C-A407-44438C67B59E}" type="datetimeFigureOut">
               <a:rPr lang="zh-CN" altLang="en-US" smtClean="0"/>
-              <a:t>2022/11/11</a:t>
+              <a:t>2022/11/24</a:t>
             </a:fld>
             <a:endParaRPr lang="zh-CN" altLang="en-US"/>
           </a:p>
@@ -5516,7 +5516,7 @@
           <a:p>
             <a:fld id="{9EFD9D74-47D9-4702-A33C-335B63B48DBF}" type="datetimeFigureOut">
               <a:rPr lang="zh-CN" altLang="en-US" smtClean="0"/>
-              <a:t>2022/11/11</a:t>
+              <a:t>2022/11/24</a:t>
             </a:fld>
             <a:endParaRPr lang="zh-CN" altLang="en-US" dirty="0"/>
           </a:p>
@@ -5664,7 +5664,7 @@
           <a:p>
             <a:fld id="{9EFD9D74-47D9-4702-A33C-335B63B48DBF}" type="datetimeFigureOut">
               <a:rPr lang="zh-CN" altLang="en-US" smtClean="0"/>
-              <a:t>2022/11/11</a:t>
+              <a:t>2022/11/24</a:t>
             </a:fld>
             <a:endParaRPr lang="zh-CN" altLang="en-US" dirty="0"/>
           </a:p>
@@ -6868,7 +6868,7 @@
                             </p:stCondLst>
                             <p:childTnLst>
                               <p:par>
-                                <p:cTn id="5" presetID="1" presetClass="entr" presetSubtype="0" fill="hold" grpId="0" nodeType="clickEffect">
+                                <p:cTn id="5" presetID="1" presetClass="entr" presetSubtype="0" fill="hold" nodeType="clickEffect">
                                   <p:stCondLst>
                                     <p:cond delay="0"/>
                                   </p:stCondLst>
@@ -6881,7 +6881,11 @@
                                           </p:stCondLst>
                                         </p:cTn>
                                         <p:tgtEl>
-                                          <p:spTgt spid="6"/>
+                                          <p:spTgt spid="6">
+                                            <p:txEl>
+                                              <p:pRg st="0" end="0"/>
+                                            </p:txEl>
+                                          </p:spTgt>
                                         </p:tgtEl>
                                         <p:attrNameLst>
                                           <p:attrName>style.visibility</p:attrName>
@@ -6921,9 +6925,6 @@
         </p:cTn>
       </p:par>
     </p:tnLst>
-    <p:bldLst>
-      <p:bldP spid="6" grpId="0"/>
-    </p:bldLst>
   </p:timing>
 </p:sld>
 </file>
@@ -7310,33 +7311,88 @@
             </a:pPr>
             <a:r>
               <a:rPr lang="zh-CN" altLang="en-US" dirty="0"/>
-              <a:t>请使用新的交叉熵损失函数实现代码</a:t>
+              <a:t>请实现“使用交叉熵损失函数”的代码</a:t>
             </a:r>
             <a:endParaRPr lang="en-US" altLang="zh-CN" dirty="0"/>
           </a:p>
           <a:p>
-            <a:pPr marL="285750" indent="-285750">
+            <a:pPr marL="742950" lvl="1" indent="-285750">
               <a:buFont typeface="Arial" panose="020B0604020202020204" pitchFamily="34" charset="0"/>
               <a:buChar char="•"/>
             </a:pPr>
             <a:r>
               <a:rPr lang="zh-CN" altLang="en-US" dirty="0"/>
-              <a:t>请每个同学运行代码，与之前的代码比较，看下</a:t>
+              <a:t>实现</a:t>
+            </a:r>
+            <a:r>
+              <a:rPr lang="en-US" altLang="zh-CN" dirty="0"/>
+              <a:t>_</a:t>
+            </a:r>
+            <a:r>
+              <a:rPr lang="en-US" altLang="zh-CN" dirty="0" err="1"/>
+              <a:t>computeLoss</a:t>
+            </a:r>
+            <a:r>
+              <a:rPr lang="zh-CN" altLang="en-US" dirty="0"/>
+              <a:t>函数，并且在训练时打印</a:t>
             </a:r>
             <a:r>
               <a:rPr lang="en-US" altLang="zh-CN" dirty="0"/>
               <a:t>loss</a:t>
             </a:r>
+          </a:p>
+          <a:p>
+            <a:pPr marL="742950" lvl="1" indent="-285750">
+              <a:buFont typeface="Arial" panose="020B0604020202020204" pitchFamily="34" charset="0"/>
+              <a:buChar char="•"/>
+            </a:pPr>
             <a:r>
               <a:rPr lang="zh-CN" altLang="en-US" dirty="0"/>
-              <a:t>的训练速度是否加快？是否在</a:t>
-            </a:r>
+              <a:t>修改输出层误差项的计算</a:t>
+            </a:r>
+            <a:endParaRPr lang="en-US" altLang="zh-CN" dirty="0"/>
+          </a:p>
+          <a:p>
+            <a:pPr marL="285750" indent="-285750">
+              <a:buFont typeface="Arial" panose="020B0604020202020204" pitchFamily="34" charset="0"/>
+              <a:buChar char="•"/>
+            </a:pPr>
+            <a:r>
+              <a:rPr lang="zh-CN" altLang="en-US" dirty="0"/>
+              <a:t>请每个同学运行代码，与之前的代码比较，看下：</a:t>
+            </a:r>
+            <a:endParaRPr lang="en-US" altLang="zh-CN" dirty="0"/>
+          </a:p>
+          <a:p>
+            <a:pPr marL="742950" lvl="1" indent="-285750">
+              <a:buFont typeface="Arial" panose="020B0604020202020204" pitchFamily="34" charset="0"/>
+              <a:buChar char="•"/>
+            </a:pPr>
             <a:r>
               <a:rPr lang="en-US" altLang="zh-CN" dirty="0"/>
               <a:t>loss</a:t>
             </a:r>
             <a:r>
               <a:rPr lang="zh-CN" altLang="en-US" dirty="0"/>
+              <a:t>的训练速度是否加快？</a:t>
+            </a:r>
+            <a:endParaRPr lang="en-US" altLang="zh-CN" dirty="0"/>
+          </a:p>
+          <a:p>
+            <a:pPr marL="742950" lvl="1" indent="-285750">
+              <a:buFont typeface="Arial" panose="020B0604020202020204" pitchFamily="34" charset="0"/>
+              <a:buChar char="•"/>
+            </a:pPr>
+            <a:r>
+              <a:rPr lang="zh-CN" altLang="en-US" dirty="0"/>
+              <a:t>是否在</a:t>
+            </a:r>
+            <a:r>
+              <a:rPr lang="en-US" altLang="zh-CN" dirty="0"/>
+              <a:t>loss</a:t>
+            </a:r>
+            <a:r>
+              <a:rPr lang="zh-CN" altLang="en-US" dirty="0"/>
               <a:t>很大时训练速度也很快？</a:t>
             </a:r>
             <a:endParaRPr lang="en-US" altLang="zh-CN" dirty="0"/>
@@ -7405,6 +7461,42 @@
           </a:p>
         </p:txBody>
       </p:sp>
+      <p:pic>
+        <p:nvPicPr>
+          <p:cNvPr id="2" name="图片 1">
+            <a:extLst>
+              <a:ext uri="{FF2B5EF4-FFF2-40B4-BE49-F238E27FC236}">
+                <a16:creationId xmlns:a16="http://schemas.microsoft.com/office/drawing/2014/main" id="{9716A8AE-D6A9-8F16-28C2-030BDEE70D28}"/>
+              </a:ext>
+            </a:extLst>
+          </p:cNvPr>
+          <p:cNvPicPr>
+            <a:picLocks noChangeAspect="1"/>
+          </p:cNvPicPr>
+          <p:nvPr/>
+        </p:nvPicPr>
+        <p:blipFill>
+          <a:blip r:embed="rId3">
+            <a:extLst>
+              <a:ext uri="{28A0092B-C50C-407E-A947-70E740481C1C}">
+                <a14:useLocalDpi xmlns:a14="http://schemas.microsoft.com/office/drawing/2010/main" val="0"/>
+              </a:ext>
+            </a:extLst>
+          </a:blip>
+          <a:stretch>
+            <a:fillRect/>
+          </a:stretch>
+        </p:blipFill>
+        <p:spPr>
+          <a:xfrm>
+            <a:off x="5045522" y="4879392"/>
+            <a:ext cx="4251302" cy="764837"/>
+          </a:xfrm>
+          <a:prstGeom prst="rect">
+            <a:avLst/>
+          </a:prstGeom>
+        </p:spPr>
+      </p:pic>
     </p:spTree>
     <p:custDataLst>
       <p:tags r:id="rId1"/>
@@ -7439,7 +7531,7 @@
                             </p:stCondLst>
                             <p:childTnLst>
                               <p:par>
-                                <p:cTn id="5" presetID="1" presetClass="entr" presetSubtype="0" fill="hold" grpId="0" nodeType="clickEffect">
+                                <p:cTn id="5" presetID="1" presetClass="entr" presetSubtype="0" fill="hold" nodeType="clickEffect">
                                   <p:stCondLst>
                                     <p:cond delay="0"/>
                                   </p:stCondLst>
@@ -7452,7 +7544,301 @@
                                           </p:stCondLst>
                                         </p:cTn>
                                         <p:tgtEl>
-                                          <p:spTgt spid="6"/>
+                                          <p:spTgt spid="6">
+                                            <p:txEl>
+                                              <p:pRg st="0" end="0"/>
+                                            </p:txEl>
+                                          </p:spTgt>
+                                        </p:tgtEl>
+                                        <p:attrNameLst>
+                                          <p:attrName>style.visibility</p:attrName>
+                                        </p:attrNameLst>
+                                      </p:cBhvr>
+                                      <p:to>
+                                        <p:strVal val="visible"/>
+                                      </p:to>
+                                    </p:set>
+                                  </p:childTnLst>
+                                </p:cTn>
+                              </p:par>
+                            </p:childTnLst>
+                          </p:cTn>
+                        </p:par>
+                      </p:childTnLst>
+                    </p:cTn>
+                  </p:par>
+                  <p:par>
+                    <p:cTn id="7" fill="hold">
+                      <p:stCondLst>
+                        <p:cond delay="indefinite"/>
+                      </p:stCondLst>
+                      <p:childTnLst>
+                        <p:par>
+                          <p:cTn id="8" fill="hold">
+                            <p:stCondLst>
+                              <p:cond delay="0"/>
+                            </p:stCondLst>
+                            <p:childTnLst>
+                              <p:par>
+                                <p:cTn id="9" presetID="1" presetClass="entr" presetSubtype="0" fill="hold" nodeType="clickEffect">
+                                  <p:stCondLst>
+                                    <p:cond delay="0"/>
+                                  </p:stCondLst>
+                                  <p:childTnLst>
+                                    <p:set>
+                                      <p:cBhvr>
+                                        <p:cTn id="10" dur="1" fill="hold">
+                                          <p:stCondLst>
+                                            <p:cond delay="0"/>
+                                          </p:stCondLst>
+                                        </p:cTn>
+                                        <p:tgtEl>
+                                          <p:spTgt spid="6">
+                                            <p:txEl>
+                                              <p:pRg st="1" end="1"/>
+                                            </p:txEl>
+                                          </p:spTgt>
+                                        </p:tgtEl>
+                                        <p:attrNameLst>
+                                          <p:attrName>style.visibility</p:attrName>
+                                        </p:attrNameLst>
+                                      </p:cBhvr>
+                                      <p:to>
+                                        <p:strVal val="visible"/>
+                                      </p:to>
+                                    </p:set>
+                                  </p:childTnLst>
+                                </p:cTn>
+                              </p:par>
+                            </p:childTnLst>
+                          </p:cTn>
+                        </p:par>
+                      </p:childTnLst>
+                    </p:cTn>
+                  </p:par>
+                  <p:par>
+                    <p:cTn id="11" fill="hold">
+                      <p:stCondLst>
+                        <p:cond delay="indefinite"/>
+                      </p:stCondLst>
+                      <p:childTnLst>
+                        <p:par>
+                          <p:cTn id="12" fill="hold">
+                            <p:stCondLst>
+                              <p:cond delay="0"/>
+                            </p:stCondLst>
+                            <p:childTnLst>
+                              <p:par>
+                                <p:cTn id="13" presetID="1" presetClass="entr" presetSubtype="0" fill="hold" nodeType="clickEffect">
+                                  <p:stCondLst>
+                                    <p:cond delay="0"/>
+                                  </p:stCondLst>
+                                  <p:childTnLst>
+                                    <p:set>
+                                      <p:cBhvr>
+                                        <p:cTn id="14" dur="1" fill="hold">
+                                          <p:stCondLst>
+                                            <p:cond delay="0"/>
+                                          </p:stCondLst>
+                                        </p:cTn>
+                                        <p:tgtEl>
+                                          <p:spTgt spid="6">
+                                            <p:txEl>
+                                              <p:pRg st="2" end="2"/>
+                                            </p:txEl>
+                                          </p:spTgt>
+                                        </p:tgtEl>
+                                        <p:attrNameLst>
+                                          <p:attrName>style.visibility</p:attrName>
+                                        </p:attrNameLst>
+                                      </p:cBhvr>
+                                      <p:to>
+                                        <p:strVal val="visible"/>
+                                      </p:to>
+                                    </p:set>
+                                  </p:childTnLst>
+                                </p:cTn>
+                              </p:par>
+                            </p:childTnLst>
+                          </p:cTn>
+                        </p:par>
+                      </p:childTnLst>
+                    </p:cTn>
+                  </p:par>
+                  <p:par>
+                    <p:cTn id="15" fill="hold">
+                      <p:stCondLst>
+                        <p:cond delay="indefinite"/>
+                      </p:stCondLst>
+                      <p:childTnLst>
+                        <p:par>
+                          <p:cTn id="16" fill="hold">
+                            <p:stCondLst>
+                              <p:cond delay="0"/>
+                            </p:stCondLst>
+                            <p:childTnLst>
+                              <p:par>
+                                <p:cTn id="17" presetID="1" presetClass="entr" presetSubtype="0" fill="hold" nodeType="clickEffect">
+                                  <p:stCondLst>
+                                    <p:cond delay="0"/>
+                                  </p:stCondLst>
+                                  <p:childTnLst>
+                                    <p:set>
+                                      <p:cBhvr>
+                                        <p:cTn id="18" dur="1" fill="hold">
+                                          <p:stCondLst>
+                                            <p:cond delay="0"/>
+                                          </p:stCondLst>
+                                        </p:cTn>
+                                        <p:tgtEl>
+                                          <p:spTgt spid="2"/>
+                                        </p:tgtEl>
+                                        <p:attrNameLst>
+                                          <p:attrName>style.visibility</p:attrName>
+                                        </p:attrNameLst>
+                                      </p:cBhvr>
+                                      <p:to>
+                                        <p:strVal val="visible"/>
+                                      </p:to>
+                                    </p:set>
+                                  </p:childTnLst>
+                                </p:cTn>
+                              </p:par>
+                            </p:childTnLst>
+                          </p:cTn>
+                        </p:par>
+                      </p:childTnLst>
+                    </p:cTn>
+                  </p:par>
+                  <p:par>
+                    <p:cTn id="19" fill="hold">
+                      <p:stCondLst>
+                        <p:cond delay="indefinite"/>
+                      </p:stCondLst>
+                      <p:childTnLst>
+                        <p:par>
+                          <p:cTn id="20" fill="hold">
+                            <p:stCondLst>
+                              <p:cond delay="0"/>
+                            </p:stCondLst>
+                            <p:childTnLst>
+                              <p:par>
+                                <p:cTn id="21" presetID="1" presetClass="entr" presetSubtype="0" fill="hold" nodeType="clickEffect">
+                                  <p:stCondLst>
+                                    <p:cond delay="0"/>
+                                  </p:stCondLst>
+                                  <p:childTnLst>
+                                    <p:set>
+                                      <p:cBhvr>
+                                        <p:cTn id="22" dur="1" fill="hold">
+                                          <p:stCondLst>
+                                            <p:cond delay="0"/>
+                                          </p:stCondLst>
+                                        </p:cTn>
+                                        <p:tgtEl>
+                                          <p:spTgt spid="6">
+                                            <p:txEl>
+                                              <p:pRg st="3" end="3"/>
+                                            </p:txEl>
+                                          </p:spTgt>
+                                        </p:tgtEl>
+                                        <p:attrNameLst>
+                                          <p:attrName>style.visibility</p:attrName>
+                                        </p:attrNameLst>
+                                      </p:cBhvr>
+                                      <p:to>
+                                        <p:strVal val="visible"/>
+                                      </p:to>
+                                    </p:set>
+                                  </p:childTnLst>
+                                </p:cTn>
+                              </p:par>
+                            </p:childTnLst>
+                          </p:cTn>
+                        </p:par>
+                      </p:childTnLst>
+                    </p:cTn>
+                  </p:par>
+                  <p:par>
+                    <p:cTn id="23" fill="hold">
+                      <p:stCondLst>
+                        <p:cond delay="indefinite"/>
+                      </p:stCondLst>
+                      <p:childTnLst>
+                        <p:par>
+                          <p:cTn id="24" fill="hold">
+                            <p:stCondLst>
+                              <p:cond delay="0"/>
+                            </p:stCondLst>
+                            <p:childTnLst>
+                              <p:par>
+                                <p:cTn id="25" presetID="1" presetClass="entr" presetSubtype="0" fill="hold" nodeType="clickEffect">
+                                  <p:stCondLst>
+                                    <p:cond delay="0"/>
+                                  </p:stCondLst>
+                                  <p:childTnLst>
+                                    <p:set>
+                                      <p:cBhvr>
+                                        <p:cTn id="26" dur="1" fill="hold">
+                                          <p:stCondLst>
+                                            <p:cond delay="0"/>
+                                          </p:stCondLst>
+                                        </p:cTn>
+                                        <p:tgtEl>
+                                          <p:spTgt spid="6">
+                                            <p:txEl>
+                                              <p:pRg st="4" end="4"/>
+                                            </p:txEl>
+                                          </p:spTgt>
+                                        </p:tgtEl>
+                                        <p:attrNameLst>
+                                          <p:attrName>style.visibility</p:attrName>
+                                        </p:attrNameLst>
+                                      </p:cBhvr>
+                                      <p:to>
+                                        <p:strVal val="visible"/>
+                                      </p:to>
+                                    </p:set>
+                                  </p:childTnLst>
+                                </p:cTn>
+                              </p:par>
+                            </p:childTnLst>
+                          </p:cTn>
+                        </p:par>
+                      </p:childTnLst>
+                    </p:cTn>
+                  </p:par>
+                  <p:par>
+                    <p:cTn id="27" fill="hold">
+                      <p:stCondLst>
+                        <p:cond delay="indefinite"/>
+                      </p:stCondLst>
+                      <p:childTnLst>
+                        <p:par>
+                          <p:cTn id="28" fill="hold">
+                            <p:stCondLst>
+                              <p:cond delay="0"/>
+                            </p:stCondLst>
+                            <p:childTnLst>
+                              <p:par>
+                                <p:cTn id="29" presetID="1" presetClass="entr" presetSubtype="0" fill="hold" nodeType="clickEffect">
+                                  <p:stCondLst>
+                                    <p:cond delay="0"/>
+                                  </p:stCondLst>
+                                  <p:childTnLst>
+                                    <p:set>
+                                      <p:cBhvr>
+                                        <p:cTn id="30" dur="1" fill="hold">
+                                          <p:stCondLst>
+                                            <p:cond delay="0"/>
+                                          </p:stCondLst>
+                                        </p:cTn>
+                                        <p:tgtEl>
+                                          <p:spTgt spid="6">
+                                            <p:txEl>
+                                              <p:pRg st="5" end="5"/>
+                                            </p:txEl>
+                                          </p:spTgt>
                                         </p:tgtEl>
                                         <p:attrNameLst>
                                           <p:attrName>style.visibility</p:attrName>
@@ -7492,9 +7878,6 @@
         </p:cTn>
       </p:par>
     </p:tnLst>
-    <p:bldLst>
-      <p:bldP spid="6" grpId="0"/>
-    </p:bldLst>
   </p:timing>
 </p:sld>
 </file>
@@ -11252,25 +11635,20 @@
               <a:rPr lang="zh-CN" altLang="en-US" dirty="0">
                 <a:sym typeface="+mn-ea"/>
               </a:rPr>
-              <a:t>判断性别</a:t>
-            </a:r>
-            <a:r>
-              <a:rPr lang="en-US" altLang="zh-CN" dirty="0">
+              <a:t>识别手写数字使用交叉熵损失函数和</a:t>
+            </a:r>
+            <a:r>
+              <a:rPr lang="en-US" altLang="zh-CN" dirty="0" err="1">
                 <a:sym typeface="+mn-ea"/>
               </a:rPr>
-              <a:t>Demo</a:t>
+              <a:t>softmax</a:t>
             </a:r>
             <a:r>
               <a:rPr lang="zh-CN" altLang="en-US" dirty="0">
                 <a:sym typeface="+mn-ea"/>
               </a:rPr>
-              <a:t>使用交叉熵损失函数	</a:t>
-            </a:r>
-            <a:br>
-              <a:rPr lang="en-US" altLang="zh-CN" dirty="0">
-                <a:sym typeface="+mn-ea"/>
-              </a:rPr>
-            </a:br>
+              <a:t>激活函数</a:t>
+            </a:r>
             <a:endParaRPr lang="zh-CN" altLang="en-US" dirty="0"/>
           </a:p>
         </p:txBody>
@@ -13100,9 +13478,43 @@
               <a:buChar char="•"/>
             </a:pPr>
             <a:r>
+              <a:rPr lang="zh-CN" altLang="en-US" dirty="0"/>
+              <a:t>为什么要学习本课</a:t>
+            </a:r>
+            <a:endParaRPr lang="en-US" altLang="zh-CN" dirty="0"/>
+          </a:p>
+          <a:p>
+            <a:pPr marL="285750" indent="-285750">
+              <a:buFont typeface="Arial" panose="020B0604020202020204" pitchFamily="34" charset="0"/>
+              <a:buChar char="•"/>
+            </a:pPr>
+            <a:r>
+              <a:rPr lang="zh-CN" altLang="en-US" dirty="0"/>
+              <a:t>主问题：如何加快单分类的训练速度？</a:t>
+            </a:r>
+            <a:endParaRPr lang="en-US" altLang="zh-CN" dirty="0"/>
+          </a:p>
+          <a:p>
+            <a:pPr marL="285750" indent="-285750">
+              <a:buFont typeface="Arial" panose="020B0604020202020204" pitchFamily="34" charset="0"/>
+              <a:buChar char="•"/>
+            </a:pPr>
+            <a:r>
+              <a:rPr lang="zh-CN" altLang="en-US" dirty="0"/>
+              <a:t>任务：判断性别</a:t>
+            </a:r>
+            <a:r>
               <a:rPr lang="en-US" altLang="zh-CN" dirty="0"/>
-              <a:t>TODO</a:t>
-            </a:r>
+              <a:t>Demo</a:t>
+            </a:r>
+            <a:r>
+              <a:rPr lang="zh-CN" altLang="en-US" dirty="0"/>
+              <a:t>使用交叉熵损失函数	</a:t>
+            </a:r>
+            <a:br>
+              <a:rPr lang="en-US" altLang="zh-CN" dirty="0"/>
+            </a:br>
+            <a:endParaRPr lang="en-US" altLang="zh-CN" dirty="0"/>
           </a:p>
         </p:txBody>
       </p:sp>
@@ -13132,6 +13544,707 @@
     <p:custDataLst>
       <p:tags r:id="rId1"/>
     </p:custDataLst>
+  </p:cSld>
+  <p:clrMapOvr>
+    <a:masterClrMapping/>
+  </p:clrMapOvr>
+  <p:timing>
+    <p:tnLst>
+      <p:par>
+        <p:cTn id="1" dur="indefinite" restart="never" nodeType="tmRoot">
+          <p:childTnLst>
+            <p:seq concurrent="1" nextAc="seek">
+              <p:cTn id="2" dur="indefinite" nodeType="mainSeq">
+                <p:childTnLst>
+                  <p:par>
+                    <p:cTn id="3" fill="hold">
+                      <p:stCondLst>
+                        <p:cond delay="indefinite"/>
+                      </p:stCondLst>
+                      <p:childTnLst>
+                        <p:par>
+                          <p:cTn id="4" fill="hold">
+                            <p:stCondLst>
+                              <p:cond delay="0"/>
+                            </p:stCondLst>
+                            <p:childTnLst>
+                              <p:par>
+                                <p:cTn id="5" presetID="1" presetClass="entr" presetSubtype="0" fill="hold" grpId="0" nodeType="clickEffect">
+                                  <p:stCondLst>
+                                    <p:cond delay="0"/>
+                                  </p:stCondLst>
+                                  <p:childTnLst>
+                                    <p:set>
+                                      <p:cBhvr>
+                                        <p:cTn id="6" dur="1" fill="hold">
+                                          <p:stCondLst>
+                                            <p:cond delay="0"/>
+                                          </p:stCondLst>
+                                        </p:cTn>
+                                        <p:tgtEl>
+                                          <p:spTgt spid="2">
+                                            <p:txEl>
+                                              <p:pRg st="0" end="0"/>
+                                            </p:txEl>
+                                          </p:spTgt>
+                                        </p:tgtEl>
+                                        <p:attrNameLst>
+                                          <p:attrName>style.visibility</p:attrName>
+                                        </p:attrNameLst>
+                                      </p:cBhvr>
+                                      <p:to>
+                                        <p:strVal val="visible"/>
+                                      </p:to>
+                                    </p:set>
+                                  </p:childTnLst>
+                                </p:cTn>
+                              </p:par>
+                            </p:childTnLst>
+                          </p:cTn>
+                        </p:par>
+                      </p:childTnLst>
+                    </p:cTn>
+                  </p:par>
+                  <p:par>
+                    <p:cTn id="7" fill="hold">
+                      <p:stCondLst>
+                        <p:cond delay="indefinite"/>
+                      </p:stCondLst>
+                      <p:childTnLst>
+                        <p:par>
+                          <p:cTn id="8" fill="hold">
+                            <p:stCondLst>
+                              <p:cond delay="0"/>
+                            </p:stCondLst>
+                            <p:childTnLst>
+                              <p:par>
+                                <p:cTn id="9" presetID="1" presetClass="entr" presetSubtype="0" fill="hold" grpId="0" nodeType="clickEffect">
+                                  <p:stCondLst>
+                                    <p:cond delay="0"/>
+                                  </p:stCondLst>
+                                  <p:childTnLst>
+                                    <p:set>
+                                      <p:cBhvr>
+                                        <p:cTn id="10" dur="1" fill="hold">
+                                          <p:stCondLst>
+                                            <p:cond delay="0"/>
+                                          </p:stCondLst>
+                                        </p:cTn>
+                                        <p:tgtEl>
+                                          <p:spTgt spid="2">
+                                            <p:txEl>
+                                              <p:charRg st="9" end="18"/>
+                                            </p:txEl>
+                                          </p:spTgt>
+                                        </p:tgtEl>
+                                        <p:attrNameLst>
+                                          <p:attrName>style.visibility</p:attrName>
+                                        </p:attrNameLst>
+                                      </p:cBhvr>
+                                      <p:to>
+                                        <p:strVal val="visible"/>
+                                      </p:to>
+                                    </p:set>
+                                  </p:childTnLst>
+                                </p:cTn>
+                              </p:par>
+                            </p:childTnLst>
+                          </p:cTn>
+                        </p:par>
+                      </p:childTnLst>
+                    </p:cTn>
+                  </p:par>
+                  <p:par>
+                    <p:cTn id="11" fill="hold">
+                      <p:stCondLst>
+                        <p:cond delay="indefinite"/>
+                      </p:stCondLst>
+                      <p:childTnLst>
+                        <p:par>
+                          <p:cTn id="12" fill="hold">
+                            <p:stCondLst>
+                              <p:cond delay="0"/>
+                            </p:stCondLst>
+                            <p:childTnLst>
+                              <p:par>
+                                <p:cTn id="13" presetID="1" presetClass="entr" presetSubtype="0" fill="hold" grpId="0" nodeType="clickEffect">
+                                  <p:stCondLst>
+                                    <p:cond delay="0"/>
+                                  </p:stCondLst>
+                                  <p:childTnLst>
+                                    <p:set>
+                                      <p:cBhvr>
+                                        <p:cTn id="14" dur="1" fill="hold">
+                                          <p:stCondLst>
+                                            <p:cond delay="0"/>
+                                          </p:stCondLst>
+                                        </p:cTn>
+                                        <p:tgtEl>
+                                          <p:spTgt spid="2">
+                                            <p:txEl>
+                                              <p:charRg st="18" end="36"/>
+                                            </p:txEl>
+                                          </p:spTgt>
+                                        </p:tgtEl>
+                                        <p:attrNameLst>
+                                          <p:attrName>style.visibility</p:attrName>
+                                        </p:attrNameLst>
+                                      </p:cBhvr>
+                                      <p:to>
+                                        <p:strVal val="visible"/>
+                                      </p:to>
+                                    </p:set>
+                                  </p:childTnLst>
+                                </p:cTn>
+                              </p:par>
+                            </p:childTnLst>
+                          </p:cTn>
+                        </p:par>
+                      </p:childTnLst>
+                    </p:cTn>
+                  </p:par>
+                  <p:par>
+                    <p:cTn id="15" fill="hold">
+                      <p:stCondLst>
+                        <p:cond delay="indefinite"/>
+                      </p:stCondLst>
+                      <p:childTnLst>
+                        <p:par>
+                          <p:cTn id="16" fill="hold">
+                            <p:stCondLst>
+                              <p:cond delay="0"/>
+                            </p:stCondLst>
+                            <p:childTnLst>
+                              <p:par>
+                                <p:cTn id="17" presetID="1" presetClass="entr" presetSubtype="0" fill="hold" grpId="0" nodeType="clickEffect">
+                                  <p:stCondLst>
+                                    <p:cond delay="0"/>
+                                  </p:stCondLst>
+                                  <p:childTnLst>
+                                    <p:set>
+                                      <p:cBhvr>
+                                        <p:cTn id="18" dur="1" fill="hold">
+                                          <p:stCondLst>
+                                            <p:cond delay="0"/>
+                                          </p:stCondLst>
+                                        </p:cTn>
+                                        <p:tgtEl>
+                                          <p:spTgt spid="2">
+                                            <p:txEl>
+                                              <p:charRg st="36" end="59"/>
+                                            </p:txEl>
+                                          </p:spTgt>
+                                        </p:tgtEl>
+                                        <p:attrNameLst>
+                                          <p:attrName>style.visibility</p:attrName>
+                                        </p:attrNameLst>
+                                      </p:cBhvr>
+                                      <p:to>
+                                        <p:strVal val="visible"/>
+                                      </p:to>
+                                    </p:set>
+                                  </p:childTnLst>
+                                </p:cTn>
+                              </p:par>
+                            </p:childTnLst>
+                          </p:cTn>
+                        </p:par>
+                      </p:childTnLst>
+                    </p:cTn>
+                  </p:par>
+                </p:childTnLst>
+              </p:cTn>
+              <p:prevCondLst>
+                <p:cond evt="onPrev" delay="0">
+                  <p:tgtEl>
+                    <p:sldTgt/>
+                  </p:tgtEl>
+                </p:cond>
+              </p:prevCondLst>
+              <p:nextCondLst>
+                <p:cond evt="onNext" delay="0">
+                  <p:tgtEl>
+                    <p:sldTgt/>
+                  </p:tgtEl>
+                </p:cond>
+              </p:nextCondLst>
+            </p:seq>
+          </p:childTnLst>
+        </p:cTn>
+      </p:par>
+    </p:tnLst>
+    <p:bldLst>
+      <p:bldP spid="2" grpId="0" build="p"/>
+    </p:bldLst>
+  </p:timing>
+</p:sld>
+</file>
+
+<file path=ppt/slides/slide30.xml><?xml version="1.0" encoding="utf-8"?>
+<p:sld xmlns:a="http://schemas.openxmlformats.org/drawingml/2006/main" xmlns:r="http://schemas.openxmlformats.org/officeDocument/2006/relationships" xmlns:p="http://schemas.openxmlformats.org/presentationml/2006/main">
+  <p:cSld>
+    <p:spTree>
+      <p:nvGrpSpPr>
+        <p:cNvPr id="1" name=""/>
+        <p:cNvGrpSpPr/>
+        <p:nvPr/>
+      </p:nvGrpSpPr>
+      <p:grpSpPr>
+        <a:xfrm>
+          <a:off x="0" y="0"/>
+          <a:ext cx="0" cy="0"/>
+          <a:chOff x="0" y="0"/>
+          <a:chExt cx="0" cy="0"/>
+        </a:xfrm>
+      </p:grpSpPr>
+      <p:sp>
+        <p:nvSpPr>
+          <p:cNvPr id="2" name="文本占位符 1"/>
+          <p:cNvSpPr>
+            <a:spLocks noGrp="1"/>
+          </p:cNvSpPr>
+          <p:nvPr>
+            <p:ph type="body" idx="1"/>
+          </p:nvPr>
+        </p:nvSpPr>
+        <p:spPr/>
+        <p:txBody>
+          <a:bodyPr/>
+          <a:lstStyle/>
+          <a:p>
+            <a:pPr marL="285750" indent="-285750">
+              <a:buFont typeface="Arial" panose="020B0604020202020204" pitchFamily="34" charset="0"/>
+              <a:buChar char="•"/>
+            </a:pPr>
+            <a:endParaRPr lang="en-US" altLang="zh-CN" dirty="0"/>
+          </a:p>
+        </p:txBody>
+      </p:sp>
+      <p:sp>
+        <p:nvSpPr>
+          <p:cNvPr id="3" name="标题 2"/>
+          <p:cNvSpPr>
+            <a:spLocks noGrp="1"/>
+          </p:cNvSpPr>
+          <p:nvPr>
+            <p:ph type="title"/>
+          </p:nvPr>
+        </p:nvSpPr>
+        <p:spPr/>
+        <p:txBody>
+          <a:bodyPr/>
+          <a:lstStyle/>
+          <a:p>
+            <a:r>
+              <a:rPr lang="zh-CN" altLang="en-US" dirty="0"/>
+              <a:t>问答</a:t>
+            </a:r>
+          </a:p>
+        </p:txBody>
+      </p:sp>
+    </p:spTree>
+    <p:custDataLst>
+      <p:tags r:id="rId1"/>
+    </p:custDataLst>
+  </p:cSld>
+  <p:clrMapOvr>
+    <a:masterClrMapping/>
+  </p:clrMapOvr>
+</p:sld>
+</file>
+
+<file path=ppt/slides/slide31.xml><?xml version="1.0" encoding="utf-8"?>
+<p:sld xmlns:a="http://schemas.openxmlformats.org/drawingml/2006/main" xmlns:r="http://schemas.openxmlformats.org/officeDocument/2006/relationships" xmlns:p="http://schemas.openxmlformats.org/presentationml/2006/main">
+  <p:cSld>
+    <p:spTree>
+      <p:nvGrpSpPr>
+        <p:cNvPr id="1" name=""/>
+        <p:cNvGrpSpPr/>
+        <p:nvPr/>
+      </p:nvGrpSpPr>
+      <p:grpSpPr>
+        <a:xfrm>
+          <a:off x="0" y="0"/>
+          <a:ext cx="0" cy="0"/>
+          <a:chOff x="0" y="0"/>
+          <a:chExt cx="0" cy="0"/>
+        </a:xfrm>
+      </p:grpSpPr>
+    </p:spTree>
+    <p:custDataLst>
+      <p:tags r:id="rId1"/>
+    </p:custDataLst>
+  </p:cSld>
+  <p:clrMapOvr>
+    <a:masterClrMapping/>
+  </p:clrMapOvr>
+</p:sld>
+</file>
+
+<file path=ppt/slides/slide4.xml><?xml version="1.0" encoding="utf-8"?>
+<p:sld xmlns:a="http://schemas.openxmlformats.org/drawingml/2006/main" xmlns:r="http://schemas.openxmlformats.org/officeDocument/2006/relationships" xmlns:p="http://schemas.openxmlformats.org/presentationml/2006/main">
+  <p:cSld>
+    <p:spTree>
+      <p:nvGrpSpPr>
+        <p:cNvPr id="1" name=""/>
+        <p:cNvGrpSpPr/>
+        <p:nvPr/>
+      </p:nvGrpSpPr>
+      <p:grpSpPr>
+        <a:xfrm>
+          <a:off x="0" y="0"/>
+          <a:ext cx="0" cy="0"/>
+          <a:chOff x="0" y="0"/>
+          <a:chExt cx="0" cy="0"/>
+        </a:xfrm>
+      </p:grpSpPr>
+      <p:sp>
+        <p:nvSpPr>
+          <p:cNvPr id="2" name="文本占位符 1"/>
+          <p:cNvSpPr>
+            <a:spLocks noGrp="1"/>
+          </p:cNvSpPr>
+          <p:nvPr>
+            <p:ph type="body" idx="1"/>
+          </p:nvPr>
+        </p:nvSpPr>
+        <p:spPr/>
+        <p:txBody>
+          <a:bodyPr/>
+          <a:lstStyle/>
+          <a:p>
+            <a:pPr marL="285750" indent="-285750">
+              <a:buFont typeface="Arial" panose="020B0604020202020204" pitchFamily="34" charset="0"/>
+              <a:buChar char="•"/>
+            </a:pPr>
+            <a:r>
+              <a:rPr lang="zh-CN" altLang="en-US" dirty="0"/>
+              <a:t>什么是训练？</a:t>
+            </a:r>
+            <a:endParaRPr lang="en-US" altLang="zh-CN" dirty="0"/>
+          </a:p>
+          <a:p>
+            <a:pPr marL="285750" indent="-285750">
+              <a:buFont typeface="Arial" panose="020B0604020202020204" pitchFamily="34" charset="0"/>
+              <a:buChar char="•"/>
+            </a:pPr>
+            <a:r>
+              <a:rPr lang="zh-CN" altLang="en-US" dirty="0"/>
+              <a:t>训练中的收敛是指什么？</a:t>
+            </a:r>
+            <a:endParaRPr lang="en-US" altLang="zh-CN" dirty="0"/>
+          </a:p>
+          <a:p>
+            <a:pPr lvl="1"/>
+            <a:endParaRPr lang="zh-CN" altLang="en-US" dirty="0"/>
+          </a:p>
+          <a:p>
+            <a:pPr marL="285750" indent="-285750">
+              <a:buFont typeface="Arial" panose="020B0604020202020204" pitchFamily="34" charset="0"/>
+              <a:buChar char="•"/>
+            </a:pPr>
+            <a:r>
+              <a:rPr lang="zh-CN" altLang="en-US" dirty="0"/>
+              <a:t>自学、展学</a:t>
+            </a:r>
+          </a:p>
+          <a:p>
+            <a:br>
+              <a:rPr lang="zh-CN" altLang="en-US" dirty="0"/>
+            </a:br>
+            <a:endParaRPr lang="zh-CN" altLang="en-US" dirty="0">
+              <a:hlinkClick r:id="rId3" action="ppaction://hlinkfile"/>
+            </a:endParaRPr>
+          </a:p>
+          <a:p>
+            <a:pPr marL="285750" indent="-285750">
+              <a:buFont typeface="Arial" panose="020B0604020202020204" pitchFamily="34" charset="0"/>
+              <a:buChar char="•"/>
+            </a:pPr>
+            <a:endParaRPr lang="zh-CN" altLang="en-US" dirty="0"/>
+          </a:p>
+        </p:txBody>
+      </p:sp>
+      <p:sp>
+        <p:nvSpPr>
+          <p:cNvPr id="3" name="标题 2"/>
+          <p:cNvSpPr>
+            <a:spLocks noGrp="1"/>
+          </p:cNvSpPr>
+          <p:nvPr>
+            <p:ph type="title"/>
+          </p:nvPr>
+        </p:nvSpPr>
+        <p:spPr/>
+        <p:txBody>
+          <a:bodyPr/>
+          <a:lstStyle/>
+          <a:p>
+            <a:r>
+              <a:rPr lang="zh-CN" altLang="en-US" dirty="0"/>
+              <a:t>回顾相关课程内容</a:t>
+            </a:r>
+            <a:endParaRPr dirty="0">
+              <a:sym typeface="+mn-ea"/>
+            </a:endParaRPr>
+          </a:p>
+        </p:txBody>
+      </p:sp>
+    </p:spTree>
+    <p:custDataLst>
+      <p:tags r:id="rId1"/>
+    </p:custDataLst>
+    <p:extLst>
+      <p:ext uri="{BB962C8B-B14F-4D97-AF65-F5344CB8AC3E}">
+        <p14:creationId xmlns:p14="http://schemas.microsoft.com/office/powerpoint/2010/main" val="534233520"/>
+      </p:ext>
+    </p:extLst>
+  </p:cSld>
+  <p:clrMapOvr>
+    <a:masterClrMapping/>
+  </p:clrMapOvr>
+  <p:timing>
+    <p:tnLst>
+      <p:par>
+        <p:cTn id="1" dur="indefinite" restart="never" nodeType="tmRoot">
+          <p:childTnLst>
+            <p:seq concurrent="1" nextAc="seek">
+              <p:cTn id="2" dur="indefinite" nodeType="mainSeq">
+                <p:childTnLst>
+                  <p:par>
+                    <p:cTn id="3" fill="hold">
+                      <p:stCondLst>
+                        <p:cond delay="indefinite"/>
+                      </p:stCondLst>
+                      <p:childTnLst>
+                        <p:par>
+                          <p:cTn id="4" fill="hold">
+                            <p:stCondLst>
+                              <p:cond delay="0"/>
+                            </p:stCondLst>
+                            <p:childTnLst>
+                              <p:par>
+                                <p:cTn id="5" presetID="1" presetClass="entr" presetSubtype="0" fill="hold" nodeType="clickEffect">
+                                  <p:stCondLst>
+                                    <p:cond delay="0"/>
+                                  </p:stCondLst>
+                                  <p:childTnLst>
+                                    <p:set>
+                                      <p:cBhvr>
+                                        <p:cTn id="6" dur="1" fill="hold">
+                                          <p:stCondLst>
+                                            <p:cond delay="0"/>
+                                          </p:stCondLst>
+                                        </p:cTn>
+                                        <p:tgtEl>
+                                          <p:spTgt spid="2">
+                                            <p:txEl>
+                                              <p:pRg st="0" end="0"/>
+                                            </p:txEl>
+                                          </p:spTgt>
+                                        </p:tgtEl>
+                                        <p:attrNameLst>
+                                          <p:attrName>style.visibility</p:attrName>
+                                        </p:attrNameLst>
+                                      </p:cBhvr>
+                                      <p:to>
+                                        <p:strVal val="visible"/>
+                                      </p:to>
+                                    </p:set>
+                                  </p:childTnLst>
+                                </p:cTn>
+                              </p:par>
+                            </p:childTnLst>
+                          </p:cTn>
+                        </p:par>
+                      </p:childTnLst>
+                    </p:cTn>
+                  </p:par>
+                  <p:par>
+                    <p:cTn id="7" fill="hold">
+                      <p:stCondLst>
+                        <p:cond delay="indefinite"/>
+                      </p:stCondLst>
+                      <p:childTnLst>
+                        <p:par>
+                          <p:cTn id="8" fill="hold">
+                            <p:stCondLst>
+                              <p:cond delay="0"/>
+                            </p:stCondLst>
+                            <p:childTnLst>
+                              <p:par>
+                                <p:cTn id="9" presetID="1" presetClass="entr" presetSubtype="0" fill="hold" nodeType="clickEffect">
+                                  <p:stCondLst>
+                                    <p:cond delay="0"/>
+                                  </p:stCondLst>
+                                  <p:childTnLst>
+                                    <p:set>
+                                      <p:cBhvr>
+                                        <p:cTn id="10" dur="1" fill="hold">
+                                          <p:stCondLst>
+                                            <p:cond delay="0"/>
+                                          </p:stCondLst>
+                                        </p:cTn>
+                                        <p:tgtEl>
+                                          <p:spTgt spid="2">
+                                            <p:txEl>
+                                              <p:pRg st="1" end="1"/>
+                                            </p:txEl>
+                                          </p:spTgt>
+                                        </p:tgtEl>
+                                        <p:attrNameLst>
+                                          <p:attrName>style.visibility</p:attrName>
+                                        </p:attrNameLst>
+                                      </p:cBhvr>
+                                      <p:to>
+                                        <p:strVal val="visible"/>
+                                      </p:to>
+                                    </p:set>
+                                  </p:childTnLst>
+                                </p:cTn>
+                              </p:par>
+                            </p:childTnLst>
+                          </p:cTn>
+                        </p:par>
+                      </p:childTnLst>
+                    </p:cTn>
+                  </p:par>
+                </p:childTnLst>
+              </p:cTn>
+              <p:prevCondLst>
+                <p:cond evt="onPrev" delay="0">
+                  <p:tgtEl>
+                    <p:sldTgt/>
+                  </p:tgtEl>
+                </p:cond>
+              </p:prevCondLst>
+              <p:nextCondLst>
+                <p:cond evt="onNext" delay="0">
+                  <p:tgtEl>
+                    <p:sldTgt/>
+                  </p:tgtEl>
+                </p:cond>
+              </p:nextCondLst>
+            </p:seq>
+          </p:childTnLst>
+        </p:cTn>
+      </p:par>
+    </p:tnLst>
+  </p:timing>
+</p:sld>
+</file>
+
+<file path=ppt/slides/slide5.xml><?xml version="1.0" encoding="utf-8"?>
+<p:sld xmlns:a="http://schemas.openxmlformats.org/drawingml/2006/main" xmlns:r="http://schemas.openxmlformats.org/officeDocument/2006/relationships" xmlns:p="http://schemas.openxmlformats.org/presentationml/2006/main">
+  <p:cSld>
+    <p:spTree>
+      <p:nvGrpSpPr>
+        <p:cNvPr id="1" name=""/>
+        <p:cNvGrpSpPr/>
+        <p:nvPr/>
+      </p:nvGrpSpPr>
+      <p:grpSpPr>
+        <a:xfrm>
+          <a:off x="0" y="0"/>
+          <a:ext cx="0" cy="0"/>
+          <a:chOff x="0" y="0"/>
+          <a:chExt cx="0" cy="0"/>
+        </a:xfrm>
+      </p:grpSpPr>
+      <p:sp>
+        <p:nvSpPr>
+          <p:cNvPr id="2" name="文本占位符 1"/>
+          <p:cNvSpPr>
+            <a:spLocks noGrp="1"/>
+          </p:cNvSpPr>
+          <p:nvPr>
+            <p:ph type="body" idx="1"/>
+          </p:nvPr>
+        </p:nvSpPr>
+        <p:spPr/>
+        <p:txBody>
+          <a:bodyPr/>
+          <a:lstStyle/>
+          <a:p>
+            <a:pPr marL="285750" indent="-285750">
+              <a:buFont typeface="Arial" panose="020B0604020202020204" pitchFamily="34" charset="0"/>
+              <a:buChar char="•"/>
+            </a:pPr>
+            <a:r>
+              <a:rPr lang="zh-CN" altLang="en-US" dirty="0"/>
+              <a:t>全连接层在“判断性别</a:t>
+            </a:r>
+            <a:r>
+              <a:rPr lang="en-US" altLang="zh-CN" dirty="0"/>
+              <a:t>Demo</a:t>
+            </a:r>
+            <a:r>
+              <a:rPr lang="zh-CN" altLang="en-US" dirty="0"/>
+              <a:t>“的训练时，收敛得比较慢，如何加快？</a:t>
+            </a:r>
+            <a:endParaRPr lang="en-US" altLang="zh-CN" dirty="0"/>
+          </a:p>
+          <a:p>
+            <a:pPr marL="285750" indent="-285750">
+              <a:buFont typeface="Arial" panose="020B0604020202020204" pitchFamily="34" charset="0"/>
+              <a:buChar char="•"/>
+            </a:pPr>
+            <a:r>
+              <a:rPr lang="zh-CN" altLang="en-US" dirty="0"/>
+              <a:t>全连接层在“识别手写数字“的训练时，收敛得比较慢，如何加快？</a:t>
+            </a:r>
+            <a:endParaRPr lang="en-US" altLang="zh-CN" dirty="0"/>
+          </a:p>
+          <a:p>
+            <a:pPr marL="285750" indent="-285750">
+              <a:buFont typeface="Arial" panose="020B0604020202020204" pitchFamily="34" charset="0"/>
+              <a:buChar char="•"/>
+            </a:pPr>
+            <a:endParaRPr lang="en-US" altLang="zh-CN" dirty="0"/>
+          </a:p>
+          <a:p>
+            <a:pPr marL="285750" indent="-285750">
+              <a:buFont typeface="Arial" panose="020B0604020202020204" pitchFamily="34" charset="0"/>
+              <a:buChar char="•"/>
+            </a:pPr>
+            <a:endParaRPr lang="zh-CN" altLang="en-US" dirty="0"/>
+          </a:p>
+        </p:txBody>
+      </p:sp>
+      <p:sp>
+        <p:nvSpPr>
+          <p:cNvPr id="3" name="标题 2"/>
+          <p:cNvSpPr>
+            <a:spLocks noGrp="1"/>
+          </p:cNvSpPr>
+          <p:nvPr>
+            <p:ph type="title"/>
+          </p:nvPr>
+        </p:nvSpPr>
+        <p:spPr/>
+        <p:txBody>
+          <a:bodyPr/>
+          <a:lstStyle/>
+          <a:p>
+            <a:r>
+              <a:rPr lang="zh-CN" altLang="en-US" dirty="0"/>
+              <a:t>为什么要学习本课</a:t>
+            </a:r>
+            <a:endParaRPr dirty="0">
+              <a:sym typeface="+mn-ea"/>
+            </a:endParaRPr>
+          </a:p>
+        </p:txBody>
+      </p:sp>
+    </p:spTree>
+    <p:custDataLst>
+      <p:tags r:id="rId1"/>
+    </p:custDataLst>
+    <p:extLst>
+      <p:ext uri="{BB962C8B-B14F-4D97-AF65-F5344CB8AC3E}">
+        <p14:creationId xmlns:p14="http://schemas.microsoft.com/office/powerpoint/2010/main" val="1916671536"/>
+      </p:ext>
+    </p:extLst>
   </p:cSld>
   <p:clrMapOvr>
     <a:masterClrMapping/>
@@ -13270,428 +14383,6 @@
 </p:sld>
 </file>
 
-<file path=ppt/slides/slide30.xml><?xml version="1.0" encoding="utf-8"?>
-<p:sld xmlns:a="http://schemas.openxmlformats.org/drawingml/2006/main" xmlns:r="http://schemas.openxmlformats.org/officeDocument/2006/relationships" xmlns:p="http://schemas.openxmlformats.org/presentationml/2006/main">
-  <p:cSld>
-    <p:spTree>
-      <p:nvGrpSpPr>
-        <p:cNvPr id="1" name=""/>
-        <p:cNvGrpSpPr/>
-        <p:nvPr/>
-      </p:nvGrpSpPr>
-      <p:grpSpPr>
-        <a:xfrm>
-          <a:off x="0" y="0"/>
-          <a:ext cx="0" cy="0"/>
-          <a:chOff x="0" y="0"/>
-          <a:chExt cx="0" cy="0"/>
-        </a:xfrm>
-      </p:grpSpPr>
-      <p:sp>
-        <p:nvSpPr>
-          <p:cNvPr id="2" name="文本占位符 1"/>
-          <p:cNvSpPr>
-            <a:spLocks noGrp="1"/>
-          </p:cNvSpPr>
-          <p:nvPr>
-            <p:ph type="body" idx="1"/>
-          </p:nvPr>
-        </p:nvSpPr>
-        <p:spPr/>
-        <p:txBody>
-          <a:bodyPr/>
-          <a:lstStyle/>
-          <a:p>
-            <a:pPr marL="285750" indent="-285750">
-              <a:buFont typeface="Arial" panose="020B0604020202020204" pitchFamily="34" charset="0"/>
-              <a:buChar char="•"/>
-            </a:pPr>
-            <a:endParaRPr lang="en-US" altLang="zh-CN" dirty="0"/>
-          </a:p>
-        </p:txBody>
-      </p:sp>
-      <p:sp>
-        <p:nvSpPr>
-          <p:cNvPr id="3" name="标题 2"/>
-          <p:cNvSpPr>
-            <a:spLocks noGrp="1"/>
-          </p:cNvSpPr>
-          <p:nvPr>
-            <p:ph type="title"/>
-          </p:nvPr>
-        </p:nvSpPr>
-        <p:spPr/>
-        <p:txBody>
-          <a:bodyPr/>
-          <a:lstStyle/>
-          <a:p>
-            <a:r>
-              <a:rPr lang="zh-CN" altLang="en-US" dirty="0"/>
-              <a:t>问答</a:t>
-            </a:r>
-          </a:p>
-        </p:txBody>
-      </p:sp>
-    </p:spTree>
-    <p:custDataLst>
-      <p:tags r:id="rId1"/>
-    </p:custDataLst>
-  </p:cSld>
-  <p:clrMapOvr>
-    <a:masterClrMapping/>
-  </p:clrMapOvr>
-</p:sld>
-</file>
-
-<file path=ppt/slides/slide31.xml><?xml version="1.0" encoding="utf-8"?>
-<p:sld xmlns:a="http://schemas.openxmlformats.org/drawingml/2006/main" xmlns:r="http://schemas.openxmlformats.org/officeDocument/2006/relationships" xmlns:p="http://schemas.openxmlformats.org/presentationml/2006/main">
-  <p:cSld>
-    <p:spTree>
-      <p:nvGrpSpPr>
-        <p:cNvPr id="1" name=""/>
-        <p:cNvGrpSpPr/>
-        <p:nvPr/>
-      </p:nvGrpSpPr>
-      <p:grpSpPr>
-        <a:xfrm>
-          <a:off x="0" y="0"/>
-          <a:ext cx="0" cy="0"/>
-          <a:chOff x="0" y="0"/>
-          <a:chExt cx="0" cy="0"/>
-        </a:xfrm>
-      </p:grpSpPr>
-    </p:spTree>
-    <p:custDataLst>
-      <p:tags r:id="rId1"/>
-    </p:custDataLst>
-  </p:cSld>
-  <p:clrMapOvr>
-    <a:masterClrMapping/>
-  </p:clrMapOvr>
-</p:sld>
-</file>
-
-<file path=ppt/slides/slide4.xml><?xml version="1.0" encoding="utf-8"?>
-<p:sld xmlns:a="http://schemas.openxmlformats.org/drawingml/2006/main" xmlns:r="http://schemas.openxmlformats.org/officeDocument/2006/relationships" xmlns:p="http://schemas.openxmlformats.org/presentationml/2006/main">
-  <p:cSld>
-    <p:spTree>
-      <p:nvGrpSpPr>
-        <p:cNvPr id="1" name=""/>
-        <p:cNvGrpSpPr/>
-        <p:nvPr/>
-      </p:nvGrpSpPr>
-      <p:grpSpPr>
-        <a:xfrm>
-          <a:off x="0" y="0"/>
-          <a:ext cx="0" cy="0"/>
-          <a:chOff x="0" y="0"/>
-          <a:chExt cx="0" cy="0"/>
-        </a:xfrm>
-      </p:grpSpPr>
-      <p:sp>
-        <p:nvSpPr>
-          <p:cNvPr id="2" name="文本占位符 1"/>
-          <p:cNvSpPr>
-            <a:spLocks noGrp="1"/>
-          </p:cNvSpPr>
-          <p:nvPr>
-            <p:ph type="body" idx="1"/>
-          </p:nvPr>
-        </p:nvSpPr>
-        <p:spPr/>
-        <p:txBody>
-          <a:bodyPr/>
-          <a:lstStyle/>
-          <a:p>
-            <a:pPr marL="285750" indent="-285750">
-              <a:buFont typeface="Arial" panose="020B0604020202020204" pitchFamily="34" charset="0"/>
-              <a:buChar char="•"/>
-            </a:pPr>
-            <a:r>
-              <a:rPr lang="en-US" altLang="zh-CN" dirty="0"/>
-              <a:t>TODO</a:t>
-            </a:r>
-          </a:p>
-          <a:p>
-            <a:pPr lvl="1"/>
-            <a:endParaRPr lang="zh-CN" altLang="en-US" dirty="0"/>
-          </a:p>
-          <a:p>
-            <a:pPr marL="285750" indent="-285750">
-              <a:buFont typeface="Arial" panose="020B0604020202020204" pitchFamily="34" charset="0"/>
-              <a:buChar char="•"/>
-            </a:pPr>
-            <a:r>
-              <a:rPr lang="zh-CN" altLang="en-US" dirty="0"/>
-              <a:t>自学、展学</a:t>
-            </a:r>
-          </a:p>
-          <a:p>
-            <a:br>
-              <a:rPr lang="zh-CN" altLang="en-US" dirty="0"/>
-            </a:br>
-            <a:endParaRPr lang="zh-CN" altLang="en-US" dirty="0">
-              <a:hlinkClick r:id="rId3" action="ppaction://hlinkfile"/>
-            </a:endParaRPr>
-          </a:p>
-          <a:p>
-            <a:pPr marL="285750" indent="-285750">
-              <a:buFont typeface="Arial" panose="020B0604020202020204" pitchFamily="34" charset="0"/>
-              <a:buChar char="•"/>
-            </a:pPr>
-            <a:endParaRPr lang="zh-CN" altLang="en-US" dirty="0"/>
-          </a:p>
-        </p:txBody>
-      </p:sp>
-      <p:sp>
-        <p:nvSpPr>
-          <p:cNvPr id="3" name="标题 2"/>
-          <p:cNvSpPr>
-            <a:spLocks noGrp="1"/>
-          </p:cNvSpPr>
-          <p:nvPr>
-            <p:ph type="title"/>
-          </p:nvPr>
-        </p:nvSpPr>
-        <p:spPr/>
-        <p:txBody>
-          <a:bodyPr/>
-          <a:lstStyle/>
-          <a:p>
-            <a:r>
-              <a:rPr lang="zh-CN" altLang="en-US" dirty="0"/>
-              <a:t>回顾相关课程内容</a:t>
-            </a:r>
-            <a:endParaRPr dirty="0">
-              <a:sym typeface="+mn-ea"/>
-            </a:endParaRPr>
-          </a:p>
-        </p:txBody>
-      </p:sp>
-    </p:spTree>
-    <p:custDataLst>
-      <p:tags r:id="rId1"/>
-    </p:custDataLst>
-    <p:extLst>
-      <p:ext uri="{BB962C8B-B14F-4D97-AF65-F5344CB8AC3E}">
-        <p14:creationId xmlns:p14="http://schemas.microsoft.com/office/powerpoint/2010/main" val="534233520"/>
-      </p:ext>
-    </p:extLst>
-  </p:cSld>
-  <p:clrMapOvr>
-    <a:masterClrMapping/>
-  </p:clrMapOvr>
-  <p:timing>
-    <p:tnLst>
-      <p:par>
-        <p:cTn id="1" dur="indefinite" restart="never" nodeType="tmRoot">
-          <p:childTnLst>
-            <p:seq concurrent="1" nextAc="seek">
-              <p:cTn id="2" dur="indefinite" nodeType="mainSeq">
-                <p:childTnLst>
-                  <p:par>
-                    <p:cTn id="3" fill="hold">
-                      <p:stCondLst>
-                        <p:cond delay="indefinite"/>
-                      </p:stCondLst>
-                      <p:childTnLst>
-                        <p:par>
-                          <p:cTn id="4" fill="hold">
-                            <p:stCondLst>
-                              <p:cond delay="0"/>
-                            </p:stCondLst>
-                            <p:childTnLst>
-                              <p:par>
-                                <p:cTn id="5" presetID="1" presetClass="entr" presetSubtype="0" fill="hold" nodeType="clickEffect">
-                                  <p:stCondLst>
-                                    <p:cond delay="0"/>
-                                  </p:stCondLst>
-                                  <p:childTnLst>
-                                    <p:set>
-                                      <p:cBhvr>
-                                        <p:cTn id="6" dur="1" fill="hold">
-                                          <p:stCondLst>
-                                            <p:cond delay="0"/>
-                                          </p:stCondLst>
-                                        </p:cTn>
-                                        <p:tgtEl>
-                                          <p:spTgt spid="2">
-                                            <p:txEl>
-                                              <p:pRg st="0" end="0"/>
-                                            </p:txEl>
-                                          </p:spTgt>
-                                        </p:tgtEl>
-                                        <p:attrNameLst>
-                                          <p:attrName>style.visibility</p:attrName>
-                                        </p:attrNameLst>
-                                      </p:cBhvr>
-                                      <p:to>
-                                        <p:strVal val="visible"/>
-                                      </p:to>
-                                    </p:set>
-                                  </p:childTnLst>
-                                </p:cTn>
-                              </p:par>
-                            </p:childTnLst>
-                          </p:cTn>
-                        </p:par>
-                      </p:childTnLst>
-                    </p:cTn>
-                  </p:par>
-                </p:childTnLst>
-              </p:cTn>
-              <p:prevCondLst>
-                <p:cond evt="onPrev" delay="0">
-                  <p:tgtEl>
-                    <p:sldTgt/>
-                  </p:tgtEl>
-                </p:cond>
-              </p:prevCondLst>
-              <p:nextCondLst>
-                <p:cond evt="onNext" delay="0">
-                  <p:tgtEl>
-                    <p:sldTgt/>
-                  </p:tgtEl>
-                </p:cond>
-              </p:nextCondLst>
-            </p:seq>
-          </p:childTnLst>
-        </p:cTn>
-      </p:par>
-    </p:tnLst>
-  </p:timing>
-</p:sld>
-</file>
-
-<file path=ppt/slides/slide5.xml><?xml version="1.0" encoding="utf-8"?>
-<p:sld xmlns:a="http://schemas.openxmlformats.org/drawingml/2006/main" xmlns:r="http://schemas.openxmlformats.org/officeDocument/2006/relationships" xmlns:p="http://schemas.openxmlformats.org/presentationml/2006/main">
-  <p:cSld>
-    <p:spTree>
-      <p:nvGrpSpPr>
-        <p:cNvPr id="1" name=""/>
-        <p:cNvGrpSpPr/>
-        <p:nvPr/>
-      </p:nvGrpSpPr>
-      <p:grpSpPr>
-        <a:xfrm>
-          <a:off x="0" y="0"/>
-          <a:ext cx="0" cy="0"/>
-          <a:chOff x="0" y="0"/>
-          <a:chExt cx="0" cy="0"/>
-        </a:xfrm>
-      </p:grpSpPr>
-      <p:sp>
-        <p:nvSpPr>
-          <p:cNvPr id="2" name="文本占位符 1"/>
-          <p:cNvSpPr>
-            <a:spLocks noGrp="1"/>
-          </p:cNvSpPr>
-          <p:nvPr>
-            <p:ph type="body" idx="1"/>
-          </p:nvPr>
-        </p:nvSpPr>
-        <p:spPr/>
-        <p:txBody>
-          <a:bodyPr/>
-          <a:lstStyle/>
-          <a:p>
-            <a:pPr marL="285750" indent="-285750">
-              <a:buFont typeface="Arial" panose="020B0604020202020204" pitchFamily="34" charset="0"/>
-              <a:buChar char="•"/>
-            </a:pPr>
-            <a:r>
-              <a:rPr lang="zh-CN" altLang="en-US" dirty="0"/>
-              <a:t>收敛的速度决定于什么？</a:t>
-            </a:r>
-            <a:endParaRPr lang="en-US" altLang="zh-CN" dirty="0"/>
-          </a:p>
-          <a:p>
-            <a:pPr marL="285750" indent="-285750">
-              <a:buFont typeface="Arial" panose="020B0604020202020204" pitchFamily="34" charset="0"/>
-              <a:buChar char="•"/>
-            </a:pPr>
-            <a:r>
-              <a:rPr lang="zh-CN" altLang="en-US" dirty="0"/>
-              <a:t>全连接层在“判断性别</a:t>
-            </a:r>
-            <a:r>
-              <a:rPr lang="en-US" altLang="zh-CN" dirty="0"/>
-              <a:t>Demo</a:t>
-            </a:r>
-            <a:r>
-              <a:rPr lang="zh-CN" altLang="en-US" dirty="0"/>
-              <a:t>“的训练时，收敛得比较慢，如何加快收敛？</a:t>
-            </a:r>
-            <a:endParaRPr lang="en-US" altLang="zh-CN" dirty="0"/>
-          </a:p>
-          <a:p>
-            <a:pPr marL="285750" indent="-285750">
-              <a:buFont typeface="Arial" panose="020B0604020202020204" pitchFamily="34" charset="0"/>
-              <a:buChar char="•"/>
-            </a:pPr>
-            <a:r>
-              <a:rPr lang="zh-CN" altLang="en-US" dirty="0"/>
-              <a:t>全连接层在“识别手写数字“的训练时，收敛得比较慢，如何加快收敛？</a:t>
-            </a:r>
-            <a:endParaRPr lang="en-US" altLang="zh-CN" dirty="0"/>
-          </a:p>
-          <a:p>
-            <a:pPr marL="285750" indent="-285750">
-              <a:buFont typeface="Arial" panose="020B0604020202020204" pitchFamily="34" charset="0"/>
-              <a:buChar char="•"/>
-            </a:pPr>
-            <a:endParaRPr lang="en-US" altLang="zh-CN" dirty="0"/>
-          </a:p>
-          <a:p>
-            <a:pPr marL="285750" indent="-285750">
-              <a:buFont typeface="Arial" panose="020B0604020202020204" pitchFamily="34" charset="0"/>
-              <a:buChar char="•"/>
-            </a:pPr>
-            <a:endParaRPr lang="zh-CN" altLang="en-US" dirty="0"/>
-          </a:p>
-        </p:txBody>
-      </p:sp>
-      <p:sp>
-        <p:nvSpPr>
-          <p:cNvPr id="3" name="标题 2"/>
-          <p:cNvSpPr>
-            <a:spLocks noGrp="1"/>
-          </p:cNvSpPr>
-          <p:nvPr>
-            <p:ph type="title"/>
-          </p:nvPr>
-        </p:nvSpPr>
-        <p:spPr/>
-        <p:txBody>
-          <a:bodyPr/>
-          <a:lstStyle/>
-          <a:p>
-            <a:r>
-              <a:rPr lang="zh-CN" altLang="en-US" dirty="0"/>
-              <a:t>为什么要学习本课</a:t>
-            </a:r>
-            <a:endParaRPr dirty="0">
-              <a:sym typeface="+mn-ea"/>
-            </a:endParaRPr>
-          </a:p>
-        </p:txBody>
-      </p:sp>
-    </p:spTree>
-    <p:custDataLst>
-      <p:tags r:id="rId1"/>
-    </p:custDataLst>
-    <p:extLst>
-      <p:ext uri="{BB962C8B-B14F-4D97-AF65-F5344CB8AC3E}">
-        <p14:creationId xmlns:p14="http://schemas.microsoft.com/office/powerpoint/2010/main" val="1916671536"/>
-      </p:ext>
-    </p:extLst>
-  </p:cSld>
-  <p:clrMapOvr>
-    <a:masterClrMapping/>
-  </p:clrMapOvr>
-</p:sld>
-</file>
-
 <file path=ppt/slides/slide6.xml><?xml version="1.0" encoding="utf-8"?>
 <p:sld xmlns:a="http://schemas.openxmlformats.org/drawingml/2006/main" xmlns:r="http://schemas.openxmlformats.org/officeDocument/2006/relationships" xmlns:p="http://schemas.openxmlformats.org/presentationml/2006/main">
   <p:cSld>
@@ -14180,7 +14871,7 @@
         <p:spPr>
           <a:xfrm>
             <a:off x="7918102" y="2210637"/>
-            <a:ext cx="1338828" cy="369332"/>
+            <a:ext cx="2262158" cy="369332"/>
           </a:xfrm>
           <a:prstGeom prst="rect">
             <a:avLst/>
@@ -14195,7 +14886,7 @@
           <a:p>
             <a:r>
               <a:rPr kumimoji="1" lang="zh-CN" altLang="en-US" dirty="0"/>
-              <a:t>梯度的大小</a:t>
+              <a:t>梯度越大，收敛越快</a:t>
             </a:r>
           </a:p>
         </p:txBody>
@@ -14234,7 +14925,7 @@
                             </p:stCondLst>
                             <p:childTnLst>
                               <p:par>
-                                <p:cTn id="5" presetID="1" presetClass="entr" presetSubtype="0" fill="hold" grpId="0" nodeType="clickEffect">
+                                <p:cTn id="5" presetID="1" presetClass="entr" presetSubtype="0" fill="hold" nodeType="clickEffect">
                                   <p:stCondLst>
                                     <p:cond delay="0"/>
                                   </p:stCondLst>
@@ -14247,7 +14938,105 @@
                                           </p:stCondLst>
                                         </p:cTn>
                                         <p:tgtEl>
-                                          <p:spTgt spid="6"/>
+                                          <p:spTgt spid="6">
+                                            <p:txEl>
+                                              <p:pRg st="0" end="0"/>
+                                            </p:txEl>
+                                          </p:spTgt>
+                                        </p:tgtEl>
+                                        <p:attrNameLst>
+                                          <p:attrName>style.visibility</p:attrName>
+                                        </p:attrNameLst>
+                                      </p:cBhvr>
+                                      <p:to>
+                                        <p:strVal val="visible"/>
+                                      </p:to>
+                                    </p:set>
+                                  </p:childTnLst>
+                                </p:cTn>
+                              </p:par>
+                            </p:childTnLst>
+                          </p:cTn>
+                        </p:par>
+                      </p:childTnLst>
+                    </p:cTn>
+                  </p:par>
+                  <p:par>
+                    <p:cTn id="7" fill="hold">
+                      <p:stCondLst>
+                        <p:cond delay="indefinite"/>
+                      </p:stCondLst>
+                      <p:childTnLst>
+                        <p:par>
+                          <p:cTn id="8" fill="hold">
+                            <p:stCondLst>
+                              <p:cond delay="0"/>
+                            </p:stCondLst>
+                            <p:childTnLst>
+                              <p:par>
+                                <p:cTn id="9" presetID="1" presetClass="entr" presetSubtype="0" fill="hold" nodeType="clickEffect">
+                                  <p:stCondLst>
+                                    <p:cond delay="0"/>
+                                  </p:stCondLst>
+                                  <p:childTnLst>
+                                    <p:set>
+                                      <p:cBhvr>
+                                        <p:cTn id="10" dur="1" fill="hold">
+                                          <p:stCondLst>
+                                            <p:cond delay="0"/>
+                                          </p:stCondLst>
+                                        </p:cTn>
+                                        <p:tgtEl>
+                                          <p:spTgt spid="6">
+                                            <p:txEl>
+                                              <p:pRg st="1" end="1"/>
+                                            </p:txEl>
+                                          </p:spTgt>
+                                        </p:tgtEl>
+                                        <p:attrNameLst>
+                                          <p:attrName>style.visibility</p:attrName>
+                                        </p:attrNameLst>
+                                      </p:cBhvr>
+                                      <p:to>
+                                        <p:strVal val="visible"/>
+                                      </p:to>
+                                    </p:set>
+                                  </p:childTnLst>
+                                </p:cTn>
+                              </p:par>
+                            </p:childTnLst>
+                          </p:cTn>
+                        </p:par>
+                      </p:childTnLst>
+                    </p:cTn>
+                  </p:par>
+                  <p:par>
+                    <p:cTn id="11" fill="hold">
+                      <p:stCondLst>
+                        <p:cond delay="indefinite"/>
+                      </p:stCondLst>
+                      <p:childTnLst>
+                        <p:par>
+                          <p:cTn id="12" fill="hold">
+                            <p:stCondLst>
+                              <p:cond delay="0"/>
+                            </p:stCondLst>
+                            <p:childTnLst>
+                              <p:par>
+                                <p:cTn id="13" presetID="1" presetClass="entr" presetSubtype="0" fill="hold" grpId="0" nodeType="clickEffect">
+                                  <p:stCondLst>
+                                    <p:cond delay="0"/>
+                                  </p:stCondLst>
+                                  <p:childTnLst>
+                                    <p:set>
+                                      <p:cBhvr>
+                                        <p:cTn id="14" dur="1" fill="hold">
+                                          <p:stCondLst>
+                                            <p:cond delay="0"/>
+                                          </p:stCondLst>
+                                        </p:cTn>
+                                        <p:tgtEl>
+                                          <p:spTgt spid="2"/>
                                         </p:tgtEl>
                                         <p:attrNameLst>
                                           <p:attrName>style.visibility</p:attrName>
@@ -14288,7 +15077,7 @@
       </p:par>
     </p:tnLst>
     <p:bldLst>
-      <p:bldP spid="6" grpId="0"/>
+      <p:bldP spid="2" grpId="0"/>
     </p:bldLst>
   </p:timing>
 </p:sld>
@@ -14621,18 +15410,7 @@
             </a:pPr>
             <a:r>
               <a:rPr lang="zh-CN" altLang="en-US" dirty="0"/>
-              <a:t>公式中跟输出层相关的变量是哪项？</a:t>
-            </a:r>
-            <a:endParaRPr lang="en-US" altLang="zh-CN" dirty="0"/>
-          </a:p>
-          <a:p>
-            <a:pPr marL="285750" indent="-285750">
-              <a:buFont typeface="Arial" panose="020B0604020202020204" pitchFamily="34" charset="0"/>
-              <a:buChar char="•"/>
-            </a:pPr>
-            <a:r>
-              <a:rPr lang="zh-CN" altLang="en-US" dirty="0"/>
-              <a:t>它的值跟</a:t>
+              <a:t>公式中的第三项（激活函数的导数）的值跟</a:t>
             </a:r>
             <a:r>
               <a:rPr lang="en-US" altLang="zh-CN" dirty="0"/>
@@ -14641,6 +15419,44 @@
             <a:r>
               <a:rPr lang="zh-CN" altLang="en-US" dirty="0"/>
               <a:t>的大小有什么关系？</a:t>
+            </a:r>
+            <a:endParaRPr lang="en-US" altLang="zh-CN" dirty="0"/>
+          </a:p>
+          <a:p>
+            <a:pPr marL="285750" indent="-285750">
+              <a:buFont typeface="Arial" panose="020B0604020202020204" pitchFamily="34" charset="0"/>
+              <a:buChar char="•"/>
+            </a:pPr>
+            <a:r>
+              <a:rPr lang="zh-CN" altLang="en-US" dirty="0"/>
+              <a:t>所以</a:t>
+            </a:r>
+            <a:r>
+              <a:rPr lang="en-US" altLang="zh-CN" dirty="0"/>
+              <a:t>loss</a:t>
+            </a:r>
+            <a:r>
+              <a:rPr lang="zh-CN" altLang="en-US" dirty="0"/>
+              <a:t>的大小和梯度的大小的关系是什么？</a:t>
+            </a:r>
+            <a:endParaRPr lang="en-US" altLang="zh-CN" dirty="0"/>
+          </a:p>
+          <a:p>
+            <a:pPr marL="285750" indent="-285750">
+              <a:buFont typeface="Arial" panose="020B0604020202020204" pitchFamily="34" charset="0"/>
+              <a:buChar char="•"/>
+            </a:pPr>
+            <a:r>
+              <a:rPr lang="zh-CN" altLang="en-US" dirty="0"/>
+              <a:t>所以</a:t>
+            </a:r>
+            <a:r>
+              <a:rPr lang="en-US" altLang="zh-CN" dirty="0"/>
+              <a:t>loss</a:t>
+            </a:r>
+            <a:r>
+              <a:rPr lang="zh-CN" altLang="en-US" dirty="0"/>
+              <a:t>的大小和收敛速度的关系是什么？</a:t>
             </a:r>
             <a:endParaRPr lang="en-US" altLang="zh-CN" dirty="0"/>
           </a:p>
@@ -14790,7 +15606,7 @@
         </p:blipFill>
         <p:spPr>
           <a:xfrm>
-            <a:off x="3542253" y="4833620"/>
+            <a:off x="3455068" y="5127220"/>
             <a:ext cx="6896100" cy="1498600"/>
           </a:xfrm>
           <a:prstGeom prst="rect">
@@ -14836,10 +15652,10 @@
       </p:pic>
       <p:pic>
         <p:nvPicPr>
-          <p:cNvPr id="13" name="图片 12">
+          <p:cNvPr id="8" name="图片 7">
             <a:extLst>
               <a:ext uri="{FF2B5EF4-FFF2-40B4-BE49-F238E27FC236}">
-                <a16:creationId xmlns:a16="http://schemas.microsoft.com/office/drawing/2014/main" id="{A08EBD16-6C53-0538-8302-1C642B462673}"/>
+                <a16:creationId xmlns:a16="http://schemas.microsoft.com/office/drawing/2014/main" id="{C93741E9-C658-3EBE-243E-2468281F56C9}"/>
               </a:ext>
             </a:extLst>
           </p:cNvPr>
@@ -14862,8 +15678,8 @@
         </p:blipFill>
         <p:spPr>
           <a:xfrm>
-            <a:off x="6437665" y="2822151"/>
-            <a:ext cx="3042888" cy="1900574"/>
+            <a:off x="8560114" y="3375763"/>
+            <a:ext cx="3114361" cy="1652929"/>
           </a:xfrm>
           <a:prstGeom prst="rect">
             <a:avLst/>
@@ -14904,7 +15720,7 @@
                             </p:stCondLst>
                             <p:childTnLst>
                               <p:par>
-                                <p:cTn id="5" presetID="1" presetClass="entr" presetSubtype="0" fill="hold" grpId="0" nodeType="clickEffect">
+                                <p:cTn id="5" presetID="1" presetClass="entr" presetSubtype="0" fill="hold" nodeType="clickEffect">
                                   <p:stCondLst>
                                     <p:cond delay="0"/>
                                   </p:stCondLst>
@@ -14917,7 +15733,11 @@
                                           </p:stCondLst>
                                         </p:cTn>
                                         <p:tgtEl>
-                                          <p:spTgt spid="6"/>
+                                          <p:spTgt spid="6">
+                                            <p:txEl>
+                                              <p:pRg st="0" end="0"/>
+                                            </p:txEl>
+                                          </p:spTgt>
                                         </p:tgtEl>
                                         <p:attrNameLst>
                                           <p:attrName>style.visibility</p:attrName>
@@ -14957,6 +15777,1667 @@
                                     <p:set>
                                       <p:cBhvr>
                                         <p:cTn id="10" dur="1" fill="hold">
+                                          <p:stCondLst>
+                                            <p:cond delay="0"/>
+                                          </p:stCondLst>
+                                        </p:cTn>
+                                        <p:tgtEl>
+                                          <p:spTgt spid="6">
+                                            <p:txEl>
+                                              <p:pRg st="1" end="1"/>
+                                            </p:txEl>
+                                          </p:spTgt>
+                                        </p:tgtEl>
+                                        <p:attrNameLst>
+                                          <p:attrName>style.visibility</p:attrName>
+                                        </p:attrNameLst>
+                                      </p:cBhvr>
+                                      <p:to>
+                                        <p:strVal val="visible"/>
+                                      </p:to>
+                                    </p:set>
+                                  </p:childTnLst>
+                                </p:cTn>
+                              </p:par>
+                            </p:childTnLst>
+                          </p:cTn>
+                        </p:par>
+                      </p:childTnLst>
+                    </p:cTn>
+                  </p:par>
+                  <p:par>
+                    <p:cTn id="11" fill="hold">
+                      <p:stCondLst>
+                        <p:cond delay="indefinite"/>
+                      </p:stCondLst>
+                      <p:childTnLst>
+                        <p:par>
+                          <p:cTn id="12" fill="hold">
+                            <p:stCondLst>
+                              <p:cond delay="0"/>
+                            </p:stCondLst>
+                            <p:childTnLst>
+                              <p:par>
+                                <p:cTn id="13" presetID="1" presetClass="entr" presetSubtype="0" fill="hold" nodeType="clickEffect">
+                                  <p:stCondLst>
+                                    <p:cond delay="0"/>
+                                  </p:stCondLst>
+                                  <p:childTnLst>
+                                    <p:set>
+                                      <p:cBhvr>
+                                        <p:cTn id="14" dur="1" fill="hold">
+                                          <p:stCondLst>
+                                            <p:cond delay="0"/>
+                                          </p:stCondLst>
+                                        </p:cTn>
+                                        <p:tgtEl>
+                                          <p:spTgt spid="11"/>
+                                        </p:tgtEl>
+                                        <p:attrNameLst>
+                                          <p:attrName>style.visibility</p:attrName>
+                                        </p:attrNameLst>
+                                      </p:cBhvr>
+                                      <p:to>
+                                        <p:strVal val="visible"/>
+                                      </p:to>
+                                    </p:set>
+                                  </p:childTnLst>
+                                </p:cTn>
+                              </p:par>
+                            </p:childTnLst>
+                          </p:cTn>
+                        </p:par>
+                      </p:childTnLst>
+                    </p:cTn>
+                  </p:par>
+                  <p:par>
+                    <p:cTn id="15" fill="hold">
+                      <p:stCondLst>
+                        <p:cond delay="indefinite"/>
+                      </p:stCondLst>
+                      <p:childTnLst>
+                        <p:par>
+                          <p:cTn id="16" fill="hold">
+                            <p:stCondLst>
+                              <p:cond delay="0"/>
+                            </p:stCondLst>
+                            <p:childTnLst>
+                              <p:par>
+                                <p:cTn id="17" presetID="1" presetClass="entr" presetSubtype="0" fill="hold" nodeType="clickEffect">
+                                  <p:stCondLst>
+                                    <p:cond delay="0"/>
+                                  </p:stCondLst>
+                                  <p:childTnLst>
+                                    <p:set>
+                                      <p:cBhvr>
+                                        <p:cTn id="18" dur="1" fill="hold">
+                                          <p:stCondLst>
+                                            <p:cond delay="0"/>
+                                          </p:stCondLst>
+                                        </p:cTn>
+                                        <p:tgtEl>
+                                          <p:spTgt spid="6">
+                                            <p:txEl>
+                                              <p:pRg st="2" end="2"/>
+                                            </p:txEl>
+                                          </p:spTgt>
+                                        </p:tgtEl>
+                                        <p:attrNameLst>
+                                          <p:attrName>style.visibility</p:attrName>
+                                        </p:attrNameLst>
+                                      </p:cBhvr>
+                                      <p:to>
+                                        <p:strVal val="visible"/>
+                                      </p:to>
+                                    </p:set>
+                                  </p:childTnLst>
+                                </p:cTn>
+                              </p:par>
+                            </p:childTnLst>
+                          </p:cTn>
+                        </p:par>
+                      </p:childTnLst>
+                    </p:cTn>
+                  </p:par>
+                  <p:par>
+                    <p:cTn id="19" fill="hold">
+                      <p:stCondLst>
+                        <p:cond delay="indefinite"/>
+                      </p:stCondLst>
+                      <p:childTnLst>
+                        <p:par>
+                          <p:cTn id="20" fill="hold">
+                            <p:stCondLst>
+                              <p:cond delay="0"/>
+                            </p:stCondLst>
+                            <p:childTnLst>
+                              <p:par>
+                                <p:cTn id="21" presetID="1" presetClass="entr" presetSubtype="0" fill="hold" nodeType="clickEffect">
+                                  <p:stCondLst>
+                                    <p:cond delay="0"/>
+                                  </p:stCondLst>
+                                  <p:childTnLst>
+                                    <p:set>
+                                      <p:cBhvr>
+                                        <p:cTn id="22" dur="1" fill="hold">
+                                          <p:stCondLst>
+                                            <p:cond delay="0"/>
+                                          </p:stCondLst>
+                                        </p:cTn>
+                                        <p:tgtEl>
+                                          <p:spTgt spid="5"/>
+                                        </p:tgtEl>
+                                        <p:attrNameLst>
+                                          <p:attrName>style.visibility</p:attrName>
+                                        </p:attrNameLst>
+                                      </p:cBhvr>
+                                      <p:to>
+                                        <p:strVal val="visible"/>
+                                      </p:to>
+                                    </p:set>
+                                  </p:childTnLst>
+                                </p:cTn>
+                              </p:par>
+                            </p:childTnLst>
+                          </p:cTn>
+                        </p:par>
+                      </p:childTnLst>
+                    </p:cTn>
+                  </p:par>
+                  <p:par>
+                    <p:cTn id="23" fill="hold">
+                      <p:stCondLst>
+                        <p:cond delay="indefinite"/>
+                      </p:stCondLst>
+                      <p:childTnLst>
+                        <p:par>
+                          <p:cTn id="24" fill="hold">
+                            <p:stCondLst>
+                              <p:cond delay="0"/>
+                            </p:stCondLst>
+                            <p:childTnLst>
+                              <p:par>
+                                <p:cTn id="25" presetID="1" presetClass="entr" presetSubtype="0" fill="hold" nodeType="clickEffect">
+                                  <p:stCondLst>
+                                    <p:cond delay="0"/>
+                                  </p:stCondLst>
+                                  <p:childTnLst>
+                                    <p:set>
+                                      <p:cBhvr>
+                                        <p:cTn id="26" dur="1" fill="hold">
+                                          <p:stCondLst>
+                                            <p:cond delay="0"/>
+                                          </p:stCondLst>
+                                        </p:cTn>
+                                        <p:tgtEl>
+                                          <p:spTgt spid="6">
+                                            <p:txEl>
+                                              <p:pRg st="3" end="3"/>
+                                            </p:txEl>
+                                          </p:spTgt>
+                                        </p:tgtEl>
+                                        <p:attrNameLst>
+                                          <p:attrName>style.visibility</p:attrName>
+                                        </p:attrNameLst>
+                                      </p:cBhvr>
+                                      <p:to>
+                                        <p:strVal val="visible"/>
+                                      </p:to>
+                                    </p:set>
+                                  </p:childTnLst>
+                                </p:cTn>
+                              </p:par>
+                            </p:childTnLst>
+                          </p:cTn>
+                        </p:par>
+                      </p:childTnLst>
+                    </p:cTn>
+                  </p:par>
+                  <p:par>
+                    <p:cTn id="27" fill="hold">
+                      <p:stCondLst>
+                        <p:cond delay="indefinite"/>
+                      </p:stCondLst>
+                      <p:childTnLst>
+                        <p:par>
+                          <p:cTn id="28" fill="hold">
+                            <p:stCondLst>
+                              <p:cond delay="0"/>
+                            </p:stCondLst>
+                            <p:childTnLst>
+                              <p:par>
+                                <p:cTn id="29" presetID="1" presetClass="entr" presetSubtype="0" fill="hold" nodeType="clickEffect">
+                                  <p:stCondLst>
+                                    <p:cond delay="0"/>
+                                  </p:stCondLst>
+                                  <p:childTnLst>
+                                    <p:set>
+                                      <p:cBhvr>
+                                        <p:cTn id="30" dur="1" fill="hold">
+                                          <p:stCondLst>
+                                            <p:cond delay="0"/>
+                                          </p:stCondLst>
+                                        </p:cTn>
+                                        <p:tgtEl>
+                                          <p:spTgt spid="8"/>
+                                        </p:tgtEl>
+                                        <p:attrNameLst>
+                                          <p:attrName>style.visibility</p:attrName>
+                                        </p:attrNameLst>
+                                      </p:cBhvr>
+                                      <p:to>
+                                        <p:strVal val="visible"/>
+                                      </p:to>
+                                    </p:set>
+                                  </p:childTnLst>
+                                </p:cTn>
+                              </p:par>
+                            </p:childTnLst>
+                          </p:cTn>
+                        </p:par>
+                      </p:childTnLst>
+                    </p:cTn>
+                  </p:par>
+                  <p:par>
+                    <p:cTn id="31" fill="hold">
+                      <p:stCondLst>
+                        <p:cond delay="indefinite"/>
+                      </p:stCondLst>
+                      <p:childTnLst>
+                        <p:par>
+                          <p:cTn id="32" fill="hold">
+                            <p:stCondLst>
+                              <p:cond delay="0"/>
+                            </p:stCondLst>
+                            <p:childTnLst>
+                              <p:par>
+                                <p:cTn id="33" presetID="1" presetClass="entr" presetSubtype="0" fill="hold" nodeType="clickEffect">
+                                  <p:stCondLst>
+                                    <p:cond delay="0"/>
+                                  </p:stCondLst>
+                                  <p:childTnLst>
+                                    <p:set>
+                                      <p:cBhvr>
+                                        <p:cTn id="34" dur="1" fill="hold">
+                                          <p:stCondLst>
+                                            <p:cond delay="0"/>
+                                          </p:stCondLst>
+                                        </p:cTn>
+                                        <p:tgtEl>
+                                          <p:spTgt spid="6">
+                                            <p:txEl>
+                                              <p:pRg st="4" end="4"/>
+                                            </p:txEl>
+                                          </p:spTgt>
+                                        </p:tgtEl>
+                                        <p:attrNameLst>
+                                          <p:attrName>style.visibility</p:attrName>
+                                        </p:attrNameLst>
+                                      </p:cBhvr>
+                                      <p:to>
+                                        <p:strVal val="visible"/>
+                                      </p:to>
+                                    </p:set>
+                                  </p:childTnLst>
+                                </p:cTn>
+                              </p:par>
+                            </p:childTnLst>
+                          </p:cTn>
+                        </p:par>
+                      </p:childTnLst>
+                    </p:cTn>
+                  </p:par>
+                  <p:par>
+                    <p:cTn id="35" fill="hold">
+                      <p:stCondLst>
+                        <p:cond delay="indefinite"/>
+                      </p:stCondLst>
+                      <p:childTnLst>
+                        <p:par>
+                          <p:cTn id="36" fill="hold">
+                            <p:stCondLst>
+                              <p:cond delay="0"/>
+                            </p:stCondLst>
+                            <p:childTnLst>
+                              <p:par>
+                                <p:cTn id="37" presetID="1" presetClass="entr" presetSubtype="0" fill="hold" nodeType="clickEffect">
+                                  <p:stCondLst>
+                                    <p:cond delay="0"/>
+                                  </p:stCondLst>
+                                  <p:childTnLst>
+                                    <p:set>
+                                      <p:cBhvr>
+                                        <p:cTn id="38" dur="1" fill="hold">
+                                          <p:stCondLst>
+                                            <p:cond delay="0"/>
+                                          </p:stCondLst>
+                                        </p:cTn>
+                                        <p:tgtEl>
+                                          <p:spTgt spid="10"/>
+                                        </p:tgtEl>
+                                        <p:attrNameLst>
+                                          <p:attrName>style.visibility</p:attrName>
+                                        </p:attrNameLst>
+                                      </p:cBhvr>
+                                      <p:to>
+                                        <p:strVal val="visible"/>
+                                      </p:to>
+                                    </p:set>
+                                  </p:childTnLst>
+                                </p:cTn>
+                              </p:par>
+                            </p:childTnLst>
+                          </p:cTn>
+                        </p:par>
+                      </p:childTnLst>
+                    </p:cTn>
+                  </p:par>
+                  <p:par>
+                    <p:cTn id="39" fill="hold">
+                      <p:stCondLst>
+                        <p:cond delay="indefinite"/>
+                      </p:stCondLst>
+                      <p:childTnLst>
+                        <p:par>
+                          <p:cTn id="40" fill="hold">
+                            <p:stCondLst>
+                              <p:cond delay="0"/>
+                            </p:stCondLst>
+                            <p:childTnLst>
+                              <p:par>
+                                <p:cTn id="41" presetID="1" presetClass="entr" presetSubtype="0" fill="hold" nodeType="clickEffect">
+                                  <p:stCondLst>
+                                    <p:cond delay="0"/>
+                                  </p:stCondLst>
+                                  <p:childTnLst>
+                                    <p:set>
+                                      <p:cBhvr>
+                                        <p:cTn id="42" dur="1" fill="hold">
+                                          <p:stCondLst>
+                                            <p:cond delay="0"/>
+                                          </p:stCondLst>
+                                        </p:cTn>
+                                        <p:tgtEl>
+                                          <p:spTgt spid="6">
+                                            <p:txEl>
+                                              <p:pRg st="5" end="5"/>
+                                            </p:txEl>
+                                          </p:spTgt>
+                                        </p:tgtEl>
+                                        <p:attrNameLst>
+                                          <p:attrName>style.visibility</p:attrName>
+                                        </p:attrNameLst>
+                                      </p:cBhvr>
+                                      <p:to>
+                                        <p:strVal val="visible"/>
+                                      </p:to>
+                                    </p:set>
+                                  </p:childTnLst>
+                                </p:cTn>
+                              </p:par>
+                            </p:childTnLst>
+                          </p:cTn>
+                        </p:par>
+                      </p:childTnLst>
+                    </p:cTn>
+                  </p:par>
+                  <p:par>
+                    <p:cTn id="43" fill="hold">
+                      <p:stCondLst>
+                        <p:cond delay="indefinite"/>
+                      </p:stCondLst>
+                      <p:childTnLst>
+                        <p:par>
+                          <p:cTn id="44" fill="hold">
+                            <p:stCondLst>
+                              <p:cond delay="0"/>
+                            </p:stCondLst>
+                            <p:childTnLst>
+                              <p:par>
+                                <p:cTn id="45" presetID="1" presetClass="entr" presetSubtype="0" fill="hold" nodeType="clickEffect">
+                                  <p:stCondLst>
+                                    <p:cond delay="0"/>
+                                  </p:stCondLst>
+                                  <p:childTnLst>
+                                    <p:set>
+                                      <p:cBhvr>
+                                        <p:cTn id="46" dur="1" fill="hold">
+                                          <p:stCondLst>
+                                            <p:cond delay="0"/>
+                                          </p:stCondLst>
+                                        </p:cTn>
+                                        <p:tgtEl>
+                                          <p:spTgt spid="6">
+                                            <p:txEl>
+                                              <p:pRg st="6" end="6"/>
+                                            </p:txEl>
+                                          </p:spTgt>
+                                        </p:tgtEl>
+                                        <p:attrNameLst>
+                                          <p:attrName>style.visibility</p:attrName>
+                                        </p:attrNameLst>
+                                      </p:cBhvr>
+                                      <p:to>
+                                        <p:strVal val="visible"/>
+                                      </p:to>
+                                    </p:set>
+                                  </p:childTnLst>
+                                </p:cTn>
+                              </p:par>
+                            </p:childTnLst>
+                          </p:cTn>
+                        </p:par>
+                      </p:childTnLst>
+                    </p:cTn>
+                  </p:par>
+                </p:childTnLst>
+              </p:cTn>
+              <p:prevCondLst>
+                <p:cond evt="onPrev" delay="0">
+                  <p:tgtEl>
+                    <p:sldTgt/>
+                  </p:tgtEl>
+                </p:cond>
+              </p:prevCondLst>
+              <p:nextCondLst>
+                <p:cond evt="onNext" delay="0">
+                  <p:tgtEl>
+                    <p:sldTgt/>
+                  </p:tgtEl>
+                </p:cond>
+              </p:nextCondLst>
+            </p:seq>
+          </p:childTnLst>
+        </p:cTn>
+      </p:par>
+    </p:tnLst>
+  </p:timing>
+</p:sld>
+</file>
+
+<file path=ppt/slides/slide9.xml><?xml version="1.0" encoding="utf-8"?>
+<p:sld xmlns:a="http://schemas.openxmlformats.org/drawingml/2006/main" xmlns:r="http://schemas.openxmlformats.org/officeDocument/2006/relationships" xmlns:p="http://schemas.openxmlformats.org/presentationml/2006/main">
+  <p:cSld>
+    <p:spTree>
+      <p:nvGrpSpPr>
+        <p:cNvPr id="1" name=""/>
+        <p:cNvGrpSpPr/>
+        <p:nvPr/>
+      </p:nvGrpSpPr>
+      <p:grpSpPr>
+        <a:xfrm>
+          <a:off x="0" y="0"/>
+          <a:ext cx="0" cy="0"/>
+          <a:chOff x="0" y="0"/>
+          <a:chExt cx="0" cy="0"/>
+        </a:xfrm>
+      </p:grpSpPr>
+      <p:sp>
+        <p:nvSpPr>
+          <p:cNvPr id="3" name="标题 2"/>
+          <p:cNvSpPr>
+            <a:spLocks noGrp="1"/>
+          </p:cNvSpPr>
+          <p:nvPr>
+            <p:ph type="title"/>
+          </p:nvPr>
+        </p:nvSpPr>
+        <p:spPr/>
+        <p:txBody>
+          <a:bodyPr/>
+          <a:lstStyle/>
+          <a:p>
+            <a:r>
+              <a:rPr lang="zh-CN" altLang="en-US" dirty="0">
+                <a:sym typeface="+mn-ea"/>
+              </a:rPr>
+              <a:t>主问题：	如何加快</a:t>
+            </a:r>
+            <a:r>
+              <a:rPr lang="zh-CN" altLang="en-US" dirty="0"/>
+              <a:t>单分类的训练速度？</a:t>
+            </a:r>
+            <a:endParaRPr dirty="0">
+              <a:sym typeface="+mn-ea"/>
+            </a:endParaRPr>
+          </a:p>
+        </p:txBody>
+      </p:sp>
+      <p:sp>
+        <p:nvSpPr>
+          <p:cNvPr id="6" name="文本占位符 1">
+            <a:extLst>
+              <a:ext uri="{FF2B5EF4-FFF2-40B4-BE49-F238E27FC236}">
+                <a16:creationId xmlns:a16="http://schemas.microsoft.com/office/drawing/2014/main" id="{BA88068A-4FDC-6963-46A5-ADEC46CDA15E}"/>
+              </a:ext>
+            </a:extLst>
+          </p:cNvPr>
+          <p:cNvSpPr txBox="1">
+            <a:spLocks/>
+          </p:cNvSpPr>
+          <p:nvPr/>
+        </p:nvSpPr>
+        <p:spPr>
+          <a:xfrm>
+            <a:off x="822325" y="1778635"/>
+            <a:ext cx="10852150" cy="4553585"/>
+          </a:xfrm>
+        </p:spPr>
+        <p:txBody>
+          <a:bodyPr lIns="101600" tIns="38100" rIns="76200" bIns="38100">
+            <a:noAutofit/>
+          </a:bodyPr>
+          <a:lstStyle>
+            <a:lvl1pPr marL="0" indent="0" algn="l" defTabSz="914400" rtl="0" eaLnBrk="1" fontAlgn="auto" latinLnBrk="0" hangingPunct="1">
+              <a:lnSpc>
+                <a:spcPct val="130000"/>
+              </a:lnSpc>
+              <a:spcBef>
+                <a:spcPts val="0"/>
+              </a:spcBef>
+              <a:spcAft>
+                <a:spcPts val="1000"/>
+              </a:spcAft>
+              <a:buFont typeface="Arial" panose="020B0604020202020204" pitchFamily="34" charset="0"/>
+              <a:buNone/>
+              <a:defRPr kumimoji="0" lang="zh-CN" altLang="en-US" sz="1600" b="0" i="0" u="none" strike="noStrike" kern="1200" cap="none" spc="150" normalizeH="0" baseline="0" noProof="1">
+                <a:solidFill>
+                  <a:schemeClr val="tx1"/>
+                </a:solidFill>
+                <a:uFillTx/>
+                <a:latin typeface="+mn-lt"/>
+                <a:ea typeface="+mn-ea"/>
+                <a:cs typeface="+mn-cs"/>
+                <a:sym typeface="+mn-ea"/>
+              </a:defRPr>
+            </a:lvl1pPr>
+            <a:lvl2pPr marL="457200" indent="0" algn="l" defTabSz="914400" rtl="0" eaLnBrk="1" fontAlgn="auto" latinLnBrk="0" hangingPunct="1">
+              <a:lnSpc>
+                <a:spcPct val="130000"/>
+              </a:lnSpc>
+              <a:spcBef>
+                <a:spcPts val="0"/>
+              </a:spcBef>
+              <a:spcAft>
+                <a:spcPts val="1000"/>
+              </a:spcAft>
+              <a:buFont typeface="Arial" panose="020B0604020202020204" pitchFamily="34" charset="0"/>
+              <a:buNone/>
+              <a:tabLst>
+                <a:tab pos="1609725" algn="l"/>
+              </a:tabLst>
+              <a:defRPr sz="2000" u="none" strike="noStrike" kern="1200" cap="none" spc="150" normalizeH="0" baseline="0">
+                <a:solidFill>
+                  <a:schemeClr val="tx1">
+                    <a:tint val="75000"/>
+                  </a:schemeClr>
+                </a:solidFill>
+                <a:uFillTx/>
+                <a:latin typeface="+mn-lt"/>
+                <a:ea typeface="+mn-ea"/>
+                <a:cs typeface="+mn-cs"/>
+              </a:defRPr>
+            </a:lvl2pPr>
+            <a:lvl3pPr marL="914400" indent="0" algn="l" defTabSz="914400" rtl="0" eaLnBrk="1" fontAlgn="auto" latinLnBrk="0" hangingPunct="1">
+              <a:lnSpc>
+                <a:spcPct val="130000"/>
+              </a:lnSpc>
+              <a:spcBef>
+                <a:spcPts val="0"/>
+              </a:spcBef>
+              <a:spcAft>
+                <a:spcPts val="1000"/>
+              </a:spcAft>
+              <a:buFont typeface="Arial" panose="020B0604020202020204" pitchFamily="34" charset="0"/>
+              <a:buNone/>
+              <a:defRPr sz="1800" u="none" strike="noStrike" kern="1200" cap="none" spc="150" normalizeH="0" baseline="0">
+                <a:solidFill>
+                  <a:schemeClr val="tx1">
+                    <a:tint val="75000"/>
+                  </a:schemeClr>
+                </a:solidFill>
+                <a:uFillTx/>
+                <a:latin typeface="+mn-lt"/>
+                <a:ea typeface="+mn-ea"/>
+                <a:cs typeface="+mn-cs"/>
+              </a:defRPr>
+            </a:lvl3pPr>
+            <a:lvl4pPr marL="1371600" indent="0" algn="l" defTabSz="914400" rtl="0" eaLnBrk="1" fontAlgn="auto" latinLnBrk="0" hangingPunct="1">
+              <a:lnSpc>
+                <a:spcPct val="130000"/>
+              </a:lnSpc>
+              <a:spcBef>
+                <a:spcPts val="0"/>
+              </a:spcBef>
+              <a:spcAft>
+                <a:spcPts val="1000"/>
+              </a:spcAft>
+              <a:buFont typeface="Arial" panose="020B0604020202020204" pitchFamily="34" charset="0"/>
+              <a:buNone/>
+              <a:defRPr sz="1600" u="none" strike="noStrike" kern="1200" cap="none" spc="150" normalizeH="0" baseline="0">
+                <a:solidFill>
+                  <a:schemeClr val="tx1">
+                    <a:tint val="75000"/>
+                  </a:schemeClr>
+                </a:solidFill>
+                <a:uFillTx/>
+                <a:latin typeface="+mn-lt"/>
+                <a:ea typeface="+mn-ea"/>
+                <a:cs typeface="+mn-cs"/>
+              </a:defRPr>
+            </a:lvl4pPr>
+            <a:lvl5pPr marL="1828800" indent="0" algn="l" defTabSz="914400" rtl="0" eaLnBrk="1" fontAlgn="auto" latinLnBrk="0" hangingPunct="1">
+              <a:lnSpc>
+                <a:spcPct val="130000"/>
+              </a:lnSpc>
+              <a:spcBef>
+                <a:spcPts val="0"/>
+              </a:spcBef>
+              <a:spcAft>
+                <a:spcPts val="1000"/>
+              </a:spcAft>
+              <a:buFont typeface="Arial" panose="020B0604020202020204" pitchFamily="34" charset="0"/>
+              <a:buNone/>
+              <a:defRPr sz="1600" u="none" strike="noStrike" kern="1200" cap="none" spc="150" normalizeH="0" baseline="0">
+                <a:solidFill>
+                  <a:schemeClr val="tx1">
+                    <a:tint val="75000"/>
+                  </a:schemeClr>
+                </a:solidFill>
+                <a:uFillTx/>
+                <a:latin typeface="+mn-lt"/>
+                <a:ea typeface="+mn-ea"/>
+                <a:cs typeface="+mn-cs"/>
+              </a:defRPr>
+            </a:lvl5pPr>
+            <a:lvl6pPr marL="2286000" indent="0" algn="l" defTabSz="914400" rtl="0" eaLnBrk="1" latinLnBrk="0" hangingPunct="1">
+              <a:lnSpc>
+                <a:spcPct val="90000"/>
+              </a:lnSpc>
+              <a:spcBef>
+                <a:spcPts val="500"/>
+              </a:spcBef>
+              <a:buFont typeface="Arial" panose="020B0604020202020204" pitchFamily="34" charset="0"/>
+              <a:buNone/>
+              <a:defRPr sz="1600" kern="1200">
+                <a:solidFill>
+                  <a:schemeClr val="tx1">
+                    <a:tint val="75000"/>
+                  </a:schemeClr>
+                </a:solidFill>
+                <a:latin typeface="+mn-lt"/>
+                <a:ea typeface="+mn-ea"/>
+                <a:cs typeface="+mn-cs"/>
+              </a:defRPr>
+            </a:lvl6pPr>
+            <a:lvl7pPr marL="2743200" indent="0" algn="l" defTabSz="914400" rtl="0" eaLnBrk="1" latinLnBrk="0" hangingPunct="1">
+              <a:lnSpc>
+                <a:spcPct val="90000"/>
+              </a:lnSpc>
+              <a:spcBef>
+                <a:spcPts val="500"/>
+              </a:spcBef>
+              <a:buFont typeface="Arial" panose="020B0604020202020204" pitchFamily="34" charset="0"/>
+              <a:buNone/>
+              <a:defRPr sz="1600" kern="1200">
+                <a:solidFill>
+                  <a:schemeClr val="tx1">
+                    <a:tint val="75000"/>
+                  </a:schemeClr>
+                </a:solidFill>
+                <a:latin typeface="+mn-lt"/>
+                <a:ea typeface="+mn-ea"/>
+                <a:cs typeface="+mn-cs"/>
+              </a:defRPr>
+            </a:lvl7pPr>
+            <a:lvl8pPr marL="3200400" indent="0" algn="l" defTabSz="914400" rtl="0" eaLnBrk="1" latinLnBrk="0" hangingPunct="1">
+              <a:lnSpc>
+                <a:spcPct val="90000"/>
+              </a:lnSpc>
+              <a:spcBef>
+                <a:spcPts val="500"/>
+              </a:spcBef>
+              <a:buFont typeface="Arial" panose="020B0604020202020204" pitchFamily="34" charset="0"/>
+              <a:buNone/>
+              <a:defRPr sz="1600" kern="1200">
+                <a:solidFill>
+                  <a:schemeClr val="tx1">
+                    <a:tint val="75000"/>
+                  </a:schemeClr>
+                </a:solidFill>
+                <a:latin typeface="+mn-lt"/>
+                <a:ea typeface="+mn-ea"/>
+                <a:cs typeface="+mn-cs"/>
+              </a:defRPr>
+            </a:lvl8pPr>
+            <a:lvl9pPr marL="3657600" indent="0" algn="l" defTabSz="914400" rtl="0" eaLnBrk="1" latinLnBrk="0" hangingPunct="1">
+              <a:lnSpc>
+                <a:spcPct val="90000"/>
+              </a:lnSpc>
+              <a:spcBef>
+                <a:spcPts val="500"/>
+              </a:spcBef>
+              <a:buFont typeface="Arial" panose="020B0604020202020204" pitchFamily="34" charset="0"/>
+              <a:buNone/>
+              <a:defRPr sz="1600" kern="1200">
+                <a:solidFill>
+                  <a:schemeClr val="tx1">
+                    <a:tint val="75000"/>
+                  </a:schemeClr>
+                </a:solidFill>
+                <a:latin typeface="+mn-lt"/>
+                <a:ea typeface="+mn-ea"/>
+                <a:cs typeface="+mn-cs"/>
+              </a:defRPr>
+            </a:lvl9pPr>
+          </a:lstStyle>
+          <a:p>
+            <a:pPr marL="285750" indent="-285750">
+              <a:buFont typeface="Arial" panose="020B0604020202020204" pitchFamily="34" charset="0"/>
+              <a:buChar char="•"/>
+            </a:pPr>
+            <a:r>
+              <a:rPr lang="zh-CN" altLang="en-US" dirty="0"/>
+              <a:t>希望</a:t>
+            </a:r>
+            <a:r>
+              <a:rPr lang="en-US" altLang="zh-CN" dirty="0"/>
+              <a:t>loss</a:t>
+            </a:r>
+            <a:r>
+              <a:rPr lang="zh-CN" altLang="en-US" dirty="0"/>
+              <a:t>和梯度的关系是什么，才能尽快收敛？</a:t>
+            </a:r>
+            <a:endParaRPr lang="en-US" altLang="zh-CN" dirty="0"/>
+          </a:p>
+          <a:p>
+            <a:pPr marL="285750" indent="-285750">
+              <a:buFont typeface="Arial" panose="020B0604020202020204" pitchFamily="34" charset="0"/>
+              <a:buChar char="•"/>
+            </a:pPr>
+            <a:r>
+              <a:rPr lang="zh-CN" altLang="en-US" dirty="0"/>
+              <a:t>误差项的大小和梯度的大小的关系是什么？</a:t>
+            </a:r>
+            <a:endParaRPr lang="en-US" altLang="zh-CN" dirty="0"/>
+          </a:p>
+          <a:p>
+            <a:pPr marL="285750" indent="-285750">
+              <a:buFont typeface="Arial" panose="020B0604020202020204" pitchFamily="34" charset="0"/>
+              <a:buChar char="•"/>
+            </a:pPr>
+            <a:r>
+              <a:rPr lang="zh-CN" altLang="en-US" dirty="0"/>
+              <a:t>请思考误差项的公式应该是什么样的，才能满足</a:t>
+            </a:r>
+            <a:r>
+              <a:rPr lang="en-US" altLang="zh-CN" dirty="0"/>
+              <a:t>loss</a:t>
+            </a:r>
+            <a:r>
+              <a:rPr lang="zh-CN" altLang="en-US" dirty="0"/>
+              <a:t>与误差项成正比，从而与梯度成正比？</a:t>
+            </a:r>
+            <a:endParaRPr lang="en-US" altLang="zh-CN" dirty="0"/>
+          </a:p>
+          <a:p>
+            <a:pPr marL="285750" indent="-285750">
+              <a:buFont typeface="Arial" panose="020B0604020202020204" pitchFamily="34" charset="0"/>
+              <a:buChar char="•"/>
+            </a:pPr>
+            <a:r>
+              <a:rPr lang="zh-CN" altLang="en-US" dirty="0"/>
+              <a:t>我们使用新的损失函数：交叉熵损失函数，它能使误差项成为该公式</a:t>
+            </a:r>
+            <a:endParaRPr lang="en-US" altLang="zh-CN" dirty="0"/>
+          </a:p>
+          <a:p>
+            <a:pPr marL="285750" indent="-285750">
+              <a:buFont typeface="Arial" panose="020B0604020202020204" pitchFamily="34" charset="0"/>
+              <a:buChar char="•"/>
+            </a:pPr>
+            <a:r>
+              <a:rPr lang="zh-CN" altLang="en-US" dirty="0"/>
+              <a:t>所以它应该是什么，才能满足下面的公式？</a:t>
+            </a:r>
+            <a:endParaRPr lang="en-US" altLang="zh-CN" dirty="0"/>
+          </a:p>
+          <a:p>
+            <a:endParaRPr lang="en-US" altLang="zh-CN" dirty="0"/>
+          </a:p>
+          <a:p>
+            <a:endParaRPr lang="en-US" altLang="zh-CN" dirty="0"/>
+          </a:p>
+          <a:p>
+            <a:pPr marL="285750" indent="-285750">
+              <a:buFont typeface="Arial" panose="020B0604020202020204" pitchFamily="34" charset="0"/>
+              <a:buChar char="•"/>
+            </a:pPr>
+            <a:endParaRPr lang="en-US" altLang="zh-CN" dirty="0"/>
+          </a:p>
+          <a:p>
+            <a:pPr marL="285750" indent="-285750">
+              <a:buFont typeface="Arial" panose="020B0604020202020204" pitchFamily="34" charset="0"/>
+              <a:buChar char="•"/>
+            </a:pPr>
+            <a:r>
+              <a:rPr lang="zh-CN" altLang="en-US" dirty="0"/>
+              <a:t>自学、展学</a:t>
+            </a:r>
+          </a:p>
+          <a:p>
+            <a:pPr marL="285750" indent="-285750">
+              <a:buFont typeface="Arial" panose="020B0604020202020204" pitchFamily="34" charset="0"/>
+              <a:buChar char="•"/>
+            </a:pPr>
+            <a:endParaRPr lang="zh-CN" altLang="en-US" dirty="0"/>
+          </a:p>
+          <a:p>
+            <a:pPr marL="285750" indent="-285750">
+              <a:buFont typeface="Arial" panose="020B0604020202020204" pitchFamily="34" charset="0"/>
+              <a:buChar char="•"/>
+            </a:pPr>
+            <a:endParaRPr lang="en-US" altLang="zh-CN" dirty="0"/>
+          </a:p>
+          <a:p>
+            <a:pPr marL="285750" indent="-285750">
+              <a:buFont typeface="Arial" panose="020B0604020202020204" pitchFamily="34" charset="0"/>
+              <a:buChar char="•"/>
+            </a:pPr>
+            <a:endParaRPr lang="zh-CN" altLang="en-US" dirty="0"/>
+          </a:p>
+          <a:p>
+            <a:pPr marL="285750" indent="-285750">
+              <a:buFont typeface="Arial" panose="020B0604020202020204" pitchFamily="34" charset="0"/>
+              <a:buChar char="•"/>
+            </a:pPr>
+            <a:endParaRPr lang="zh-CN" altLang="en-US" dirty="0"/>
+          </a:p>
+          <a:p>
+            <a:pPr marL="285750" indent="-285750">
+              <a:buFont typeface="Arial" panose="020B0604020202020204" pitchFamily="34" charset="0"/>
+              <a:buChar char="•"/>
+            </a:pPr>
+            <a:endParaRPr lang="zh-CN" altLang="en-US" dirty="0"/>
+          </a:p>
+          <a:p>
+            <a:pPr marL="285750" indent="-285750">
+              <a:buFont typeface="Arial" panose="020B0604020202020204" pitchFamily="34" charset="0"/>
+              <a:buChar char="•"/>
+            </a:pPr>
+            <a:endParaRPr lang="zh-CN" altLang="en-US" dirty="0"/>
+          </a:p>
+          <a:p>
+            <a:pPr marL="285750" indent="-285750">
+              <a:buFont typeface="Arial" panose="020B0604020202020204" pitchFamily="34" charset="0"/>
+              <a:buChar char="•"/>
+            </a:pPr>
+            <a:endParaRPr lang="zh-CN" altLang="en-US" dirty="0"/>
+          </a:p>
+          <a:p>
+            <a:pPr marL="285750" indent="-285750">
+              <a:buFont typeface="Arial" panose="020B0604020202020204" pitchFamily="34" charset="0"/>
+              <a:buChar char="•"/>
+            </a:pPr>
+            <a:endParaRPr lang="zh-CN" altLang="en-US" dirty="0"/>
+          </a:p>
+          <a:p>
+            <a:pPr marL="285750" indent="-285750">
+              <a:buFont typeface="Arial" panose="020B0604020202020204" pitchFamily="34" charset="0"/>
+              <a:buChar char="•"/>
+            </a:pPr>
+            <a:endParaRPr lang="zh-CN" altLang="en-US" dirty="0"/>
+          </a:p>
+        </p:txBody>
+      </p:sp>
+      <p:pic>
+        <p:nvPicPr>
+          <p:cNvPr id="4" name="图片 3">
+            <a:extLst>
+              <a:ext uri="{FF2B5EF4-FFF2-40B4-BE49-F238E27FC236}">
+                <a16:creationId xmlns:a16="http://schemas.microsoft.com/office/drawing/2014/main" id="{30F07015-2F03-094A-696A-5D50BFACB80D}"/>
+              </a:ext>
+            </a:extLst>
+          </p:cNvPr>
+          <p:cNvPicPr>
+            <a:picLocks noChangeAspect="1"/>
+          </p:cNvPicPr>
+          <p:nvPr/>
+        </p:nvPicPr>
+        <p:blipFill>
+          <a:blip r:embed="rId3">
+            <a:extLst>
+              <a:ext uri="{28A0092B-C50C-407E-A947-70E740481C1C}">
+                <a14:useLocalDpi xmlns:a14="http://schemas.microsoft.com/office/drawing/2010/main" val="0"/>
+              </a:ext>
+            </a:extLst>
+          </a:blip>
+          <a:stretch>
+            <a:fillRect/>
+          </a:stretch>
+        </p:blipFill>
+        <p:spPr>
+          <a:xfrm>
+            <a:off x="9252813" y="3414143"/>
+            <a:ext cx="1624493" cy="443961"/>
+          </a:xfrm>
+          <a:prstGeom prst="rect">
+            <a:avLst/>
+          </a:prstGeom>
+        </p:spPr>
+      </p:pic>
+      <p:sp>
+        <p:nvSpPr>
+          <p:cNvPr id="5" name="文本框 4">
+            <a:extLst>
+              <a:ext uri="{FF2B5EF4-FFF2-40B4-BE49-F238E27FC236}">
+                <a16:creationId xmlns:a16="http://schemas.microsoft.com/office/drawing/2014/main" id="{0E999AB4-2872-0269-EBA8-B7C232548942}"/>
+              </a:ext>
+            </a:extLst>
+          </p:cNvPr>
+          <p:cNvSpPr txBox="1"/>
+          <p:nvPr/>
+        </p:nvSpPr>
+        <p:spPr>
+          <a:xfrm>
+            <a:off x="8849593" y="4633497"/>
+            <a:ext cx="2672526" cy="923330"/>
+          </a:xfrm>
+          <a:prstGeom prst="rect">
+            <a:avLst/>
+          </a:prstGeom>
+          <a:noFill/>
+        </p:spPr>
+        <p:txBody>
+          <a:bodyPr wrap="none" rtlCol="0">
+            <a:spAutoFit/>
+          </a:bodyPr>
+          <a:lstStyle/>
+          <a:p>
+            <a:r>
+              <a:rPr kumimoji="1" lang="zh-CN" altLang="en-US" dirty="0"/>
+              <a:t>成正比关系，即：</a:t>
+            </a:r>
+            <a:endParaRPr kumimoji="1" lang="en-US" altLang="zh-CN" dirty="0"/>
+          </a:p>
+          <a:p>
+            <a:r>
+              <a:rPr kumimoji="1" lang="en-US" altLang="zh-CN" dirty="0"/>
+              <a:t>loss</a:t>
+            </a:r>
+            <a:r>
+              <a:rPr kumimoji="1" lang="zh-CN" altLang="en-US" dirty="0"/>
+              <a:t>很大时，梯度很大；</a:t>
+            </a:r>
+            <a:endParaRPr kumimoji="1" lang="en-US" altLang="zh-CN" dirty="0"/>
+          </a:p>
+          <a:p>
+            <a:r>
+              <a:rPr kumimoji="1" lang="en-US" altLang="zh-CN" dirty="0"/>
+              <a:t>loss</a:t>
+            </a:r>
+            <a:r>
+              <a:rPr kumimoji="1" lang="zh-CN" altLang="en-US" dirty="0"/>
+              <a:t>很小时，梯度很小</a:t>
+            </a:r>
+          </a:p>
+        </p:txBody>
+      </p:sp>
+      <p:sp>
+        <p:nvSpPr>
+          <p:cNvPr id="8" name="文本框 7">
+            <a:extLst>
+              <a:ext uri="{FF2B5EF4-FFF2-40B4-BE49-F238E27FC236}">
+                <a16:creationId xmlns:a16="http://schemas.microsoft.com/office/drawing/2014/main" id="{99716F04-14FB-57BC-8AAE-9C1C4425F6D2}"/>
+              </a:ext>
+            </a:extLst>
+          </p:cNvPr>
+          <p:cNvSpPr txBox="1"/>
+          <p:nvPr/>
+        </p:nvSpPr>
+        <p:spPr>
+          <a:xfrm>
+            <a:off x="5602069" y="2231155"/>
+            <a:ext cx="646331" cy="369332"/>
+          </a:xfrm>
+          <a:prstGeom prst="rect">
+            <a:avLst/>
+          </a:prstGeom>
+          <a:noFill/>
+        </p:spPr>
+        <p:txBody>
+          <a:bodyPr wrap="none" rtlCol="0">
+            <a:spAutoFit/>
+          </a:bodyPr>
+          <a:lstStyle/>
+          <a:p>
+            <a:r>
+              <a:rPr kumimoji="1" lang="zh-CN" altLang="en-US" dirty="0"/>
+              <a:t>正比</a:t>
+            </a:r>
+          </a:p>
+        </p:txBody>
+      </p:sp>
+      <p:pic>
+        <p:nvPicPr>
+          <p:cNvPr id="11" name="图片 10">
+            <a:extLst>
+              <a:ext uri="{FF2B5EF4-FFF2-40B4-BE49-F238E27FC236}">
+                <a16:creationId xmlns:a16="http://schemas.microsoft.com/office/drawing/2014/main" id="{294C5EDB-7DFA-62BC-A534-1F9BB3BA87DC}"/>
+              </a:ext>
+            </a:extLst>
+          </p:cNvPr>
+          <p:cNvPicPr>
+            <a:picLocks noChangeAspect="1"/>
+          </p:cNvPicPr>
+          <p:nvPr/>
+        </p:nvPicPr>
+        <p:blipFill>
+          <a:blip r:embed="rId4">
+            <a:extLst>
+              <a:ext uri="{28A0092B-C50C-407E-A947-70E740481C1C}">
+                <a14:useLocalDpi xmlns:a14="http://schemas.microsoft.com/office/drawing/2010/main" val="0"/>
+              </a:ext>
+            </a:extLst>
+          </a:blip>
+          <a:stretch>
+            <a:fillRect/>
+          </a:stretch>
+        </p:blipFill>
+        <p:spPr>
+          <a:xfrm>
+            <a:off x="2916071" y="5249484"/>
+            <a:ext cx="6018325" cy="1082736"/>
+          </a:xfrm>
+          <a:prstGeom prst="rect">
+            <a:avLst/>
+          </a:prstGeom>
+        </p:spPr>
+      </p:pic>
+      <p:pic>
+        <p:nvPicPr>
+          <p:cNvPr id="12" name="图片 11">
+            <a:extLst>
+              <a:ext uri="{FF2B5EF4-FFF2-40B4-BE49-F238E27FC236}">
+                <a16:creationId xmlns:a16="http://schemas.microsoft.com/office/drawing/2014/main" id="{BBA6CEFB-7438-4FB2-0D3A-65C76CEA2B6F}"/>
+              </a:ext>
+            </a:extLst>
+          </p:cNvPr>
+          <p:cNvPicPr>
+            <a:picLocks noChangeAspect="1"/>
+          </p:cNvPicPr>
+          <p:nvPr/>
+        </p:nvPicPr>
+        <p:blipFill>
+          <a:blip r:embed="rId5">
+            <a:extLst>
+              <a:ext uri="{28A0092B-C50C-407E-A947-70E740481C1C}">
+                <a14:useLocalDpi xmlns:a14="http://schemas.microsoft.com/office/drawing/2010/main" val="0"/>
+              </a:ext>
+            </a:extLst>
+          </a:blip>
+          <a:stretch>
+            <a:fillRect/>
+          </a:stretch>
+        </p:blipFill>
+        <p:spPr>
+          <a:xfrm>
+            <a:off x="8059197" y="1242296"/>
+            <a:ext cx="2818109" cy="1495695"/>
+          </a:xfrm>
+          <a:prstGeom prst="rect">
+            <a:avLst/>
+          </a:prstGeom>
+        </p:spPr>
+      </p:pic>
+      <p:pic>
+        <p:nvPicPr>
+          <p:cNvPr id="16" name="图片 15">
+            <a:extLst>
+              <a:ext uri="{FF2B5EF4-FFF2-40B4-BE49-F238E27FC236}">
+                <a16:creationId xmlns:a16="http://schemas.microsoft.com/office/drawing/2014/main" id="{662E9D3F-5406-778C-467E-6ED05945AEA0}"/>
+              </a:ext>
+            </a:extLst>
+          </p:cNvPr>
+          <p:cNvPicPr>
+            <a:picLocks noChangeAspect="1"/>
+          </p:cNvPicPr>
+          <p:nvPr/>
+        </p:nvPicPr>
+        <p:blipFill>
+          <a:blip r:embed="rId6">
+            <a:extLst>
+              <a:ext uri="{28A0092B-C50C-407E-A947-70E740481C1C}">
+                <a14:useLocalDpi xmlns:a14="http://schemas.microsoft.com/office/drawing/2010/main" val="0"/>
+              </a:ext>
+            </a:extLst>
+          </a:blip>
+          <a:stretch>
+            <a:fillRect/>
+          </a:stretch>
+        </p:blipFill>
+        <p:spPr>
+          <a:xfrm>
+            <a:off x="1157069" y="4173718"/>
+            <a:ext cx="4445000" cy="787400"/>
+          </a:xfrm>
+          <a:prstGeom prst="rect">
+            <a:avLst/>
+          </a:prstGeom>
+        </p:spPr>
+      </p:pic>
+    </p:spTree>
+    <p:custDataLst>
+      <p:tags r:id="rId1"/>
+    </p:custDataLst>
+    <p:extLst>
+      <p:ext uri="{BB962C8B-B14F-4D97-AF65-F5344CB8AC3E}">
+        <p14:creationId xmlns:p14="http://schemas.microsoft.com/office/powerpoint/2010/main" val="3884151446"/>
+      </p:ext>
+    </p:extLst>
+  </p:cSld>
+  <p:clrMapOvr>
+    <a:masterClrMapping/>
+  </p:clrMapOvr>
+  <p:timing>
+    <p:tnLst>
+      <p:par>
+        <p:cTn id="1" dur="indefinite" restart="never" nodeType="tmRoot">
+          <p:childTnLst>
+            <p:seq concurrent="1" nextAc="seek">
+              <p:cTn id="2" dur="indefinite" nodeType="mainSeq">
+                <p:childTnLst>
+                  <p:par>
+                    <p:cTn id="3" fill="hold">
+                      <p:stCondLst>
+                        <p:cond delay="indefinite"/>
+                      </p:stCondLst>
+                      <p:childTnLst>
+                        <p:par>
+                          <p:cTn id="4" fill="hold">
+                            <p:stCondLst>
+                              <p:cond delay="0"/>
+                            </p:stCondLst>
+                            <p:childTnLst>
+                              <p:par>
+                                <p:cTn id="5" presetID="1" presetClass="entr" presetSubtype="0" fill="hold" nodeType="clickEffect">
+                                  <p:stCondLst>
+                                    <p:cond delay="0"/>
+                                  </p:stCondLst>
+                                  <p:childTnLst>
+                                    <p:set>
+                                      <p:cBhvr>
+                                        <p:cTn id="6" dur="1" fill="hold">
+                                          <p:stCondLst>
+                                            <p:cond delay="0"/>
+                                          </p:stCondLst>
+                                        </p:cTn>
+                                        <p:tgtEl>
+                                          <p:spTgt spid="6">
+                                            <p:txEl>
+                                              <p:pRg st="0" end="0"/>
+                                            </p:txEl>
+                                          </p:spTgt>
+                                        </p:tgtEl>
+                                        <p:attrNameLst>
+                                          <p:attrName>style.visibility</p:attrName>
+                                        </p:attrNameLst>
+                                      </p:cBhvr>
+                                      <p:to>
+                                        <p:strVal val="visible"/>
+                                      </p:to>
+                                    </p:set>
+                                  </p:childTnLst>
+                                </p:cTn>
+                              </p:par>
+                            </p:childTnLst>
+                          </p:cTn>
+                        </p:par>
+                      </p:childTnLst>
+                    </p:cTn>
+                  </p:par>
+                  <p:par>
+                    <p:cTn id="7" fill="hold">
+                      <p:stCondLst>
+                        <p:cond delay="indefinite"/>
+                      </p:stCondLst>
+                      <p:childTnLst>
+                        <p:par>
+                          <p:cTn id="8" fill="hold">
+                            <p:stCondLst>
+                              <p:cond delay="0"/>
+                            </p:stCondLst>
+                            <p:childTnLst>
+                              <p:par>
+                                <p:cTn id="9" presetID="1" presetClass="entr" presetSubtype="0" fill="hold" grpId="0" nodeType="clickEffect">
+                                  <p:stCondLst>
+                                    <p:cond delay="0"/>
+                                  </p:stCondLst>
+                                  <p:childTnLst>
+                                    <p:set>
+                                      <p:cBhvr>
+                                        <p:cTn id="10" dur="1" fill="hold">
+                                          <p:stCondLst>
+                                            <p:cond delay="0"/>
+                                          </p:stCondLst>
+                                        </p:cTn>
+                                        <p:tgtEl>
+                                          <p:spTgt spid="5"/>
+                                        </p:tgtEl>
+                                        <p:attrNameLst>
+                                          <p:attrName>style.visibility</p:attrName>
+                                        </p:attrNameLst>
+                                      </p:cBhvr>
+                                      <p:to>
+                                        <p:strVal val="visible"/>
+                                      </p:to>
+                                    </p:set>
+                                  </p:childTnLst>
+                                </p:cTn>
+                              </p:par>
+                            </p:childTnLst>
+                          </p:cTn>
+                        </p:par>
+                      </p:childTnLst>
+                    </p:cTn>
+                  </p:par>
+                  <p:par>
+                    <p:cTn id="11" fill="hold">
+                      <p:stCondLst>
+                        <p:cond delay="indefinite"/>
+                      </p:stCondLst>
+                      <p:childTnLst>
+                        <p:par>
+                          <p:cTn id="12" fill="hold">
+                            <p:stCondLst>
+                              <p:cond delay="0"/>
+                            </p:stCondLst>
+                            <p:childTnLst>
+                              <p:par>
+                                <p:cTn id="13" presetID="1" presetClass="entr" presetSubtype="0" fill="hold" nodeType="clickEffect">
+                                  <p:stCondLst>
+                                    <p:cond delay="0"/>
+                                  </p:stCondLst>
+                                  <p:childTnLst>
+                                    <p:set>
+                                      <p:cBhvr>
+                                        <p:cTn id="14" dur="1" fill="hold">
+                                          <p:stCondLst>
+                                            <p:cond delay="0"/>
+                                          </p:stCondLst>
+                                        </p:cTn>
+                                        <p:tgtEl>
+                                          <p:spTgt spid="6">
+                                            <p:txEl>
+                                              <p:pRg st="1" end="1"/>
+                                            </p:txEl>
+                                          </p:spTgt>
+                                        </p:tgtEl>
+                                        <p:attrNameLst>
+                                          <p:attrName>style.visibility</p:attrName>
+                                        </p:attrNameLst>
+                                      </p:cBhvr>
+                                      <p:to>
+                                        <p:strVal val="visible"/>
+                                      </p:to>
+                                    </p:set>
+                                  </p:childTnLst>
+                                </p:cTn>
+                              </p:par>
+                            </p:childTnLst>
+                          </p:cTn>
+                        </p:par>
+                      </p:childTnLst>
+                    </p:cTn>
+                  </p:par>
+                  <p:par>
+                    <p:cTn id="15" fill="hold">
+                      <p:stCondLst>
+                        <p:cond delay="indefinite"/>
+                      </p:stCondLst>
+                      <p:childTnLst>
+                        <p:par>
+                          <p:cTn id="16" fill="hold">
+                            <p:stCondLst>
+                              <p:cond delay="0"/>
+                            </p:stCondLst>
+                            <p:childTnLst>
+                              <p:par>
+                                <p:cTn id="17" presetID="1" presetClass="entr" presetSubtype="0" fill="hold" nodeType="clickEffect">
+                                  <p:stCondLst>
+                                    <p:cond delay="0"/>
+                                  </p:stCondLst>
+                                  <p:childTnLst>
+                                    <p:set>
+                                      <p:cBhvr>
+                                        <p:cTn id="18" dur="1" fill="hold">
+                                          <p:stCondLst>
+                                            <p:cond delay="0"/>
+                                          </p:stCondLst>
+                                        </p:cTn>
+                                        <p:tgtEl>
+                                          <p:spTgt spid="12"/>
+                                        </p:tgtEl>
+                                        <p:attrNameLst>
+                                          <p:attrName>style.visibility</p:attrName>
+                                        </p:attrNameLst>
+                                      </p:cBhvr>
+                                      <p:to>
+                                        <p:strVal val="visible"/>
+                                      </p:to>
+                                    </p:set>
+                                  </p:childTnLst>
+                                </p:cTn>
+                              </p:par>
+                            </p:childTnLst>
+                          </p:cTn>
+                        </p:par>
+                      </p:childTnLst>
+                    </p:cTn>
+                  </p:par>
+                  <p:par>
+                    <p:cTn id="19" fill="hold">
+                      <p:stCondLst>
+                        <p:cond delay="indefinite"/>
+                      </p:stCondLst>
+                      <p:childTnLst>
+                        <p:par>
+                          <p:cTn id="20" fill="hold">
+                            <p:stCondLst>
+                              <p:cond delay="0"/>
+                            </p:stCondLst>
+                            <p:childTnLst>
+                              <p:par>
+                                <p:cTn id="21" presetID="1" presetClass="entr" presetSubtype="0" fill="hold" grpId="0" nodeType="clickEffect">
+                                  <p:stCondLst>
+                                    <p:cond delay="0"/>
+                                  </p:stCondLst>
+                                  <p:childTnLst>
+                                    <p:set>
+                                      <p:cBhvr>
+                                        <p:cTn id="22" dur="1" fill="hold">
+                                          <p:stCondLst>
+                                            <p:cond delay="0"/>
+                                          </p:stCondLst>
+                                        </p:cTn>
+                                        <p:tgtEl>
+                                          <p:spTgt spid="8"/>
+                                        </p:tgtEl>
+                                        <p:attrNameLst>
+                                          <p:attrName>style.visibility</p:attrName>
+                                        </p:attrNameLst>
+                                      </p:cBhvr>
+                                      <p:to>
+                                        <p:strVal val="visible"/>
+                                      </p:to>
+                                    </p:set>
+                                  </p:childTnLst>
+                                </p:cTn>
+                              </p:par>
+                            </p:childTnLst>
+                          </p:cTn>
+                        </p:par>
+                      </p:childTnLst>
+                    </p:cTn>
+                  </p:par>
+                  <p:par>
+                    <p:cTn id="23" fill="hold">
+                      <p:stCondLst>
+                        <p:cond delay="indefinite"/>
+                      </p:stCondLst>
+                      <p:childTnLst>
+                        <p:par>
+                          <p:cTn id="24" fill="hold">
+                            <p:stCondLst>
+                              <p:cond delay="0"/>
+                            </p:stCondLst>
+                            <p:childTnLst>
+                              <p:par>
+                                <p:cTn id="25" presetID="1" presetClass="entr" presetSubtype="0" fill="hold" nodeType="clickEffect">
+                                  <p:stCondLst>
+                                    <p:cond delay="0"/>
+                                  </p:stCondLst>
+                                  <p:childTnLst>
+                                    <p:set>
+                                      <p:cBhvr>
+                                        <p:cTn id="26" dur="1" fill="hold">
+                                          <p:stCondLst>
+                                            <p:cond delay="0"/>
+                                          </p:stCondLst>
+                                        </p:cTn>
+                                        <p:tgtEl>
+                                          <p:spTgt spid="6">
+                                            <p:txEl>
+                                              <p:pRg st="2" end="2"/>
+                                            </p:txEl>
+                                          </p:spTgt>
+                                        </p:tgtEl>
+                                        <p:attrNameLst>
+                                          <p:attrName>style.visibility</p:attrName>
+                                        </p:attrNameLst>
+                                      </p:cBhvr>
+                                      <p:to>
+                                        <p:strVal val="visible"/>
+                                      </p:to>
+                                    </p:set>
+                                  </p:childTnLst>
+                                </p:cTn>
+                              </p:par>
+                            </p:childTnLst>
+                          </p:cTn>
+                        </p:par>
+                      </p:childTnLst>
+                    </p:cTn>
+                  </p:par>
+                  <p:par>
+                    <p:cTn id="27" fill="hold">
+                      <p:stCondLst>
+                        <p:cond delay="indefinite"/>
+                      </p:stCondLst>
+                      <p:childTnLst>
+                        <p:par>
+                          <p:cTn id="28" fill="hold">
+                            <p:stCondLst>
+                              <p:cond delay="0"/>
+                            </p:stCondLst>
+                            <p:childTnLst>
+                              <p:par>
+                                <p:cTn id="29" presetID="1" presetClass="entr" presetSubtype="0" fill="hold" nodeType="clickEffect">
+                                  <p:stCondLst>
+                                    <p:cond delay="0"/>
+                                  </p:stCondLst>
+                                  <p:childTnLst>
+                                    <p:set>
+                                      <p:cBhvr>
+                                        <p:cTn id="30" dur="1" fill="hold">
+                                          <p:stCondLst>
+                                            <p:cond delay="0"/>
+                                          </p:stCondLst>
+                                        </p:cTn>
+                                        <p:tgtEl>
+                                          <p:spTgt spid="4"/>
+                                        </p:tgtEl>
+                                        <p:attrNameLst>
+                                          <p:attrName>style.visibility</p:attrName>
+                                        </p:attrNameLst>
+                                      </p:cBhvr>
+                                      <p:to>
+                                        <p:strVal val="visible"/>
+                                      </p:to>
+                                    </p:set>
+                                  </p:childTnLst>
+                                </p:cTn>
+                              </p:par>
+                            </p:childTnLst>
+                          </p:cTn>
+                        </p:par>
+                      </p:childTnLst>
+                    </p:cTn>
+                  </p:par>
+                  <p:par>
+                    <p:cTn id="31" fill="hold">
+                      <p:stCondLst>
+                        <p:cond delay="indefinite"/>
+                      </p:stCondLst>
+                      <p:childTnLst>
+                        <p:par>
+                          <p:cTn id="32" fill="hold">
+                            <p:stCondLst>
+                              <p:cond delay="0"/>
+                            </p:stCondLst>
+                            <p:childTnLst>
+                              <p:par>
+                                <p:cTn id="33" presetID="1" presetClass="entr" presetSubtype="0" fill="hold" nodeType="clickEffect">
+                                  <p:stCondLst>
+                                    <p:cond delay="0"/>
+                                  </p:stCondLst>
+                                  <p:childTnLst>
+                                    <p:set>
+                                      <p:cBhvr>
+                                        <p:cTn id="34" dur="1" fill="hold">
+                                          <p:stCondLst>
+                                            <p:cond delay="0"/>
+                                          </p:stCondLst>
+                                        </p:cTn>
+                                        <p:tgtEl>
+                                          <p:spTgt spid="6">
+                                            <p:txEl>
+                                              <p:pRg st="3" end="3"/>
+                                            </p:txEl>
+                                          </p:spTgt>
+                                        </p:tgtEl>
+                                        <p:attrNameLst>
+                                          <p:attrName>style.visibility</p:attrName>
+                                        </p:attrNameLst>
+                                      </p:cBhvr>
+                                      <p:to>
+                                        <p:strVal val="visible"/>
+                                      </p:to>
+                                    </p:set>
+                                  </p:childTnLst>
+                                </p:cTn>
+                              </p:par>
+                            </p:childTnLst>
+                          </p:cTn>
+                        </p:par>
+                      </p:childTnLst>
+                    </p:cTn>
+                  </p:par>
+                  <p:par>
+                    <p:cTn id="35" fill="hold">
+                      <p:stCondLst>
+                        <p:cond delay="indefinite"/>
+                      </p:stCondLst>
+                      <p:childTnLst>
+                        <p:par>
+                          <p:cTn id="36" fill="hold">
+                            <p:stCondLst>
+                              <p:cond delay="0"/>
+                            </p:stCondLst>
+                            <p:childTnLst>
+                              <p:par>
+                                <p:cTn id="37" presetID="1" presetClass="entr" presetSubtype="0" fill="hold" nodeType="clickEffect">
+                                  <p:stCondLst>
+                                    <p:cond delay="0"/>
+                                  </p:stCondLst>
+                                  <p:childTnLst>
+                                    <p:set>
+                                      <p:cBhvr>
+                                        <p:cTn id="38" dur="1" fill="hold">
+                                          <p:stCondLst>
+                                            <p:cond delay="0"/>
+                                          </p:stCondLst>
+                                        </p:cTn>
+                                        <p:tgtEl>
+                                          <p:spTgt spid="6">
+                                            <p:txEl>
+                                              <p:pRg st="4" end="4"/>
+                                            </p:txEl>
+                                          </p:spTgt>
+                                        </p:tgtEl>
+                                        <p:attrNameLst>
+                                          <p:attrName>style.visibility</p:attrName>
+                                        </p:attrNameLst>
+                                      </p:cBhvr>
+                                      <p:to>
+                                        <p:strVal val="visible"/>
+                                      </p:to>
+                                    </p:set>
+                                  </p:childTnLst>
+                                </p:cTn>
+                              </p:par>
+                            </p:childTnLst>
+                          </p:cTn>
+                        </p:par>
+                      </p:childTnLst>
+                    </p:cTn>
+                  </p:par>
+                  <p:par>
+                    <p:cTn id="39" fill="hold">
+                      <p:stCondLst>
+                        <p:cond delay="indefinite"/>
+                      </p:stCondLst>
+                      <p:childTnLst>
+                        <p:par>
+                          <p:cTn id="40" fill="hold">
+                            <p:stCondLst>
+                              <p:cond delay="0"/>
+                            </p:stCondLst>
+                            <p:childTnLst>
+                              <p:par>
+                                <p:cTn id="41" presetID="1" presetClass="entr" presetSubtype="0" fill="hold" nodeType="clickEffect">
+                                  <p:stCondLst>
+                                    <p:cond delay="0"/>
+                                  </p:stCondLst>
+                                  <p:childTnLst>
+                                    <p:set>
+                                      <p:cBhvr>
+                                        <p:cTn id="42" dur="1" fill="hold">
+                                          <p:stCondLst>
+                                            <p:cond delay="0"/>
+                                          </p:stCondLst>
+                                        </p:cTn>
+                                        <p:tgtEl>
+                                          <p:spTgt spid="16"/>
+                                        </p:tgtEl>
+                                        <p:attrNameLst>
+                                          <p:attrName>style.visibility</p:attrName>
+                                        </p:attrNameLst>
+                                      </p:cBhvr>
+                                      <p:to>
+                                        <p:strVal val="visible"/>
+                                      </p:to>
+                                    </p:set>
+                                  </p:childTnLst>
+                                </p:cTn>
+                              </p:par>
+                            </p:childTnLst>
+                          </p:cTn>
+                        </p:par>
+                      </p:childTnLst>
+                    </p:cTn>
+                  </p:par>
+                  <p:par>
+                    <p:cTn id="43" fill="hold">
+                      <p:stCondLst>
+                        <p:cond delay="indefinite"/>
+                      </p:stCondLst>
+                      <p:childTnLst>
+                        <p:par>
+                          <p:cTn id="44" fill="hold">
+                            <p:stCondLst>
+                              <p:cond delay="0"/>
+                            </p:stCondLst>
+                            <p:childTnLst>
+                              <p:par>
+                                <p:cTn id="45" presetID="1" presetClass="entr" presetSubtype="0" fill="hold" nodeType="clickEffect">
+                                  <p:stCondLst>
+                                    <p:cond delay="0"/>
+                                  </p:stCondLst>
+                                  <p:childTnLst>
+                                    <p:set>
+                                      <p:cBhvr>
+                                        <p:cTn id="46" dur="1" fill="hold">
                                           <p:stCondLst>
                                             <p:cond delay="0"/>
                                           </p:stCondLst>
@@ -15003,592 +17484,8 @@
       </p:par>
     </p:tnLst>
     <p:bldLst>
-      <p:bldP spid="6" grpId="0"/>
-    </p:bldLst>
-  </p:timing>
-</p:sld>
-</file>
-
-<file path=ppt/slides/slide9.xml><?xml version="1.0" encoding="utf-8"?>
-<p:sld xmlns:a="http://schemas.openxmlformats.org/drawingml/2006/main" xmlns:r="http://schemas.openxmlformats.org/officeDocument/2006/relationships" xmlns:p="http://schemas.openxmlformats.org/presentationml/2006/main">
-  <p:cSld>
-    <p:spTree>
-      <p:nvGrpSpPr>
-        <p:cNvPr id="1" name=""/>
-        <p:cNvGrpSpPr/>
-        <p:nvPr/>
-      </p:nvGrpSpPr>
-      <p:grpSpPr>
-        <a:xfrm>
-          <a:off x="0" y="0"/>
-          <a:ext cx="0" cy="0"/>
-          <a:chOff x="0" y="0"/>
-          <a:chExt cx="0" cy="0"/>
-        </a:xfrm>
-      </p:grpSpPr>
-      <p:sp>
-        <p:nvSpPr>
-          <p:cNvPr id="3" name="标题 2"/>
-          <p:cNvSpPr>
-            <a:spLocks noGrp="1"/>
-          </p:cNvSpPr>
-          <p:nvPr>
-            <p:ph type="title"/>
-          </p:nvPr>
-        </p:nvSpPr>
-        <p:spPr/>
-        <p:txBody>
-          <a:bodyPr/>
-          <a:lstStyle/>
-          <a:p>
-            <a:r>
-              <a:rPr lang="zh-CN" altLang="en-US" dirty="0">
-                <a:sym typeface="+mn-ea"/>
-              </a:rPr>
-              <a:t>主问题：	如何加快</a:t>
-            </a:r>
-            <a:r>
-              <a:rPr lang="zh-CN" altLang="en-US" dirty="0"/>
-              <a:t>单分类的训练速度？</a:t>
-            </a:r>
-            <a:endParaRPr dirty="0">
-              <a:sym typeface="+mn-ea"/>
-            </a:endParaRPr>
-          </a:p>
-        </p:txBody>
-      </p:sp>
-      <p:sp>
-        <p:nvSpPr>
-          <p:cNvPr id="6" name="文本占位符 1">
-            <a:extLst>
-              <a:ext uri="{FF2B5EF4-FFF2-40B4-BE49-F238E27FC236}">
-                <a16:creationId xmlns:a16="http://schemas.microsoft.com/office/drawing/2014/main" id="{BA88068A-4FDC-6963-46A5-ADEC46CDA15E}"/>
-              </a:ext>
-            </a:extLst>
-          </p:cNvPr>
-          <p:cNvSpPr txBox="1">
-            <a:spLocks/>
-          </p:cNvSpPr>
-          <p:nvPr/>
-        </p:nvSpPr>
-        <p:spPr>
-          <a:xfrm>
-            <a:off x="822325" y="1778635"/>
-            <a:ext cx="10852150" cy="4553585"/>
-          </a:xfrm>
-        </p:spPr>
-        <p:txBody>
-          <a:bodyPr lIns="101600" tIns="38100" rIns="76200" bIns="38100">
-            <a:noAutofit/>
-          </a:bodyPr>
-          <a:lstStyle>
-            <a:lvl1pPr marL="0" indent="0" algn="l" defTabSz="914400" rtl="0" eaLnBrk="1" fontAlgn="auto" latinLnBrk="0" hangingPunct="1">
-              <a:lnSpc>
-                <a:spcPct val="130000"/>
-              </a:lnSpc>
-              <a:spcBef>
-                <a:spcPts val="0"/>
-              </a:spcBef>
-              <a:spcAft>
-                <a:spcPts val="1000"/>
-              </a:spcAft>
-              <a:buFont typeface="Arial" panose="020B0604020202020204" pitchFamily="34" charset="0"/>
-              <a:buNone/>
-              <a:defRPr kumimoji="0" lang="zh-CN" altLang="en-US" sz="1600" b="0" i="0" u="none" strike="noStrike" kern="1200" cap="none" spc="150" normalizeH="0" baseline="0" noProof="1">
-                <a:solidFill>
-                  <a:schemeClr val="tx1"/>
-                </a:solidFill>
-                <a:uFillTx/>
-                <a:latin typeface="+mn-lt"/>
-                <a:ea typeface="+mn-ea"/>
-                <a:cs typeface="+mn-cs"/>
-                <a:sym typeface="+mn-ea"/>
-              </a:defRPr>
-            </a:lvl1pPr>
-            <a:lvl2pPr marL="457200" indent="0" algn="l" defTabSz="914400" rtl="0" eaLnBrk="1" fontAlgn="auto" latinLnBrk="0" hangingPunct="1">
-              <a:lnSpc>
-                <a:spcPct val="130000"/>
-              </a:lnSpc>
-              <a:spcBef>
-                <a:spcPts val="0"/>
-              </a:spcBef>
-              <a:spcAft>
-                <a:spcPts val="1000"/>
-              </a:spcAft>
-              <a:buFont typeface="Arial" panose="020B0604020202020204" pitchFamily="34" charset="0"/>
-              <a:buNone/>
-              <a:tabLst>
-                <a:tab pos="1609725" algn="l"/>
-              </a:tabLst>
-              <a:defRPr sz="2000" u="none" strike="noStrike" kern="1200" cap="none" spc="150" normalizeH="0" baseline="0">
-                <a:solidFill>
-                  <a:schemeClr val="tx1">
-                    <a:tint val="75000"/>
-                  </a:schemeClr>
-                </a:solidFill>
-                <a:uFillTx/>
-                <a:latin typeface="+mn-lt"/>
-                <a:ea typeface="+mn-ea"/>
-                <a:cs typeface="+mn-cs"/>
-              </a:defRPr>
-            </a:lvl2pPr>
-            <a:lvl3pPr marL="914400" indent="0" algn="l" defTabSz="914400" rtl="0" eaLnBrk="1" fontAlgn="auto" latinLnBrk="0" hangingPunct="1">
-              <a:lnSpc>
-                <a:spcPct val="130000"/>
-              </a:lnSpc>
-              <a:spcBef>
-                <a:spcPts val="0"/>
-              </a:spcBef>
-              <a:spcAft>
-                <a:spcPts val="1000"/>
-              </a:spcAft>
-              <a:buFont typeface="Arial" panose="020B0604020202020204" pitchFamily="34" charset="0"/>
-              <a:buNone/>
-              <a:defRPr sz="1800" u="none" strike="noStrike" kern="1200" cap="none" spc="150" normalizeH="0" baseline="0">
-                <a:solidFill>
-                  <a:schemeClr val="tx1">
-                    <a:tint val="75000"/>
-                  </a:schemeClr>
-                </a:solidFill>
-                <a:uFillTx/>
-                <a:latin typeface="+mn-lt"/>
-                <a:ea typeface="+mn-ea"/>
-                <a:cs typeface="+mn-cs"/>
-              </a:defRPr>
-            </a:lvl3pPr>
-            <a:lvl4pPr marL="1371600" indent="0" algn="l" defTabSz="914400" rtl="0" eaLnBrk="1" fontAlgn="auto" latinLnBrk="0" hangingPunct="1">
-              <a:lnSpc>
-                <a:spcPct val="130000"/>
-              </a:lnSpc>
-              <a:spcBef>
-                <a:spcPts val="0"/>
-              </a:spcBef>
-              <a:spcAft>
-                <a:spcPts val="1000"/>
-              </a:spcAft>
-              <a:buFont typeface="Arial" panose="020B0604020202020204" pitchFamily="34" charset="0"/>
-              <a:buNone/>
-              <a:defRPr sz="1600" u="none" strike="noStrike" kern="1200" cap="none" spc="150" normalizeH="0" baseline="0">
-                <a:solidFill>
-                  <a:schemeClr val="tx1">
-                    <a:tint val="75000"/>
-                  </a:schemeClr>
-                </a:solidFill>
-                <a:uFillTx/>
-                <a:latin typeface="+mn-lt"/>
-                <a:ea typeface="+mn-ea"/>
-                <a:cs typeface="+mn-cs"/>
-              </a:defRPr>
-            </a:lvl4pPr>
-            <a:lvl5pPr marL="1828800" indent="0" algn="l" defTabSz="914400" rtl="0" eaLnBrk="1" fontAlgn="auto" latinLnBrk="0" hangingPunct="1">
-              <a:lnSpc>
-                <a:spcPct val="130000"/>
-              </a:lnSpc>
-              <a:spcBef>
-                <a:spcPts val="0"/>
-              </a:spcBef>
-              <a:spcAft>
-                <a:spcPts val="1000"/>
-              </a:spcAft>
-              <a:buFont typeface="Arial" panose="020B0604020202020204" pitchFamily="34" charset="0"/>
-              <a:buNone/>
-              <a:defRPr sz="1600" u="none" strike="noStrike" kern="1200" cap="none" spc="150" normalizeH="0" baseline="0">
-                <a:solidFill>
-                  <a:schemeClr val="tx1">
-                    <a:tint val="75000"/>
-                  </a:schemeClr>
-                </a:solidFill>
-                <a:uFillTx/>
-                <a:latin typeface="+mn-lt"/>
-                <a:ea typeface="+mn-ea"/>
-                <a:cs typeface="+mn-cs"/>
-              </a:defRPr>
-            </a:lvl5pPr>
-            <a:lvl6pPr marL="2286000" indent="0" algn="l" defTabSz="914400" rtl="0" eaLnBrk="1" latinLnBrk="0" hangingPunct="1">
-              <a:lnSpc>
-                <a:spcPct val="90000"/>
-              </a:lnSpc>
-              <a:spcBef>
-                <a:spcPts val="500"/>
-              </a:spcBef>
-              <a:buFont typeface="Arial" panose="020B0604020202020204" pitchFamily="34" charset="0"/>
-              <a:buNone/>
-              <a:defRPr sz="1600" kern="1200">
-                <a:solidFill>
-                  <a:schemeClr val="tx1">
-                    <a:tint val="75000"/>
-                  </a:schemeClr>
-                </a:solidFill>
-                <a:latin typeface="+mn-lt"/>
-                <a:ea typeface="+mn-ea"/>
-                <a:cs typeface="+mn-cs"/>
-              </a:defRPr>
-            </a:lvl6pPr>
-            <a:lvl7pPr marL="2743200" indent="0" algn="l" defTabSz="914400" rtl="0" eaLnBrk="1" latinLnBrk="0" hangingPunct="1">
-              <a:lnSpc>
-                <a:spcPct val="90000"/>
-              </a:lnSpc>
-              <a:spcBef>
-                <a:spcPts val="500"/>
-              </a:spcBef>
-              <a:buFont typeface="Arial" panose="020B0604020202020204" pitchFamily="34" charset="0"/>
-              <a:buNone/>
-              <a:defRPr sz="1600" kern="1200">
-                <a:solidFill>
-                  <a:schemeClr val="tx1">
-                    <a:tint val="75000"/>
-                  </a:schemeClr>
-                </a:solidFill>
-                <a:latin typeface="+mn-lt"/>
-                <a:ea typeface="+mn-ea"/>
-                <a:cs typeface="+mn-cs"/>
-              </a:defRPr>
-            </a:lvl7pPr>
-            <a:lvl8pPr marL="3200400" indent="0" algn="l" defTabSz="914400" rtl="0" eaLnBrk="1" latinLnBrk="0" hangingPunct="1">
-              <a:lnSpc>
-                <a:spcPct val="90000"/>
-              </a:lnSpc>
-              <a:spcBef>
-                <a:spcPts val="500"/>
-              </a:spcBef>
-              <a:buFont typeface="Arial" panose="020B0604020202020204" pitchFamily="34" charset="0"/>
-              <a:buNone/>
-              <a:defRPr sz="1600" kern="1200">
-                <a:solidFill>
-                  <a:schemeClr val="tx1">
-                    <a:tint val="75000"/>
-                  </a:schemeClr>
-                </a:solidFill>
-                <a:latin typeface="+mn-lt"/>
-                <a:ea typeface="+mn-ea"/>
-                <a:cs typeface="+mn-cs"/>
-              </a:defRPr>
-            </a:lvl8pPr>
-            <a:lvl9pPr marL="3657600" indent="0" algn="l" defTabSz="914400" rtl="0" eaLnBrk="1" latinLnBrk="0" hangingPunct="1">
-              <a:lnSpc>
-                <a:spcPct val="90000"/>
-              </a:lnSpc>
-              <a:spcBef>
-                <a:spcPts val="500"/>
-              </a:spcBef>
-              <a:buFont typeface="Arial" panose="020B0604020202020204" pitchFamily="34" charset="0"/>
-              <a:buNone/>
-              <a:defRPr sz="1600" kern="1200">
-                <a:solidFill>
-                  <a:schemeClr val="tx1">
-                    <a:tint val="75000"/>
-                  </a:schemeClr>
-                </a:solidFill>
-                <a:latin typeface="+mn-lt"/>
-                <a:ea typeface="+mn-ea"/>
-                <a:cs typeface="+mn-cs"/>
-              </a:defRPr>
-            </a:lvl9pPr>
-          </a:lstStyle>
-          <a:p>
-            <a:pPr marL="285750" indent="-285750">
-              <a:buFont typeface="Arial" panose="020B0604020202020204" pitchFamily="34" charset="0"/>
-              <a:buChar char="•"/>
-            </a:pPr>
-            <a:r>
-              <a:rPr lang="zh-CN" altLang="en-US" dirty="0"/>
-              <a:t>所以现在</a:t>
-            </a:r>
-            <a:r>
-              <a:rPr lang="en-US" altLang="zh-CN" dirty="0"/>
-              <a:t>loss</a:t>
-            </a:r>
-            <a:r>
-              <a:rPr lang="zh-CN" altLang="en-US" dirty="0"/>
-              <a:t>的大小和梯度的大小的关系是什么？</a:t>
-            </a:r>
-            <a:endParaRPr lang="en-US" altLang="zh-CN" dirty="0"/>
-          </a:p>
-          <a:p>
-            <a:pPr marL="285750" indent="-285750">
-              <a:buFont typeface="Arial" panose="020B0604020202020204" pitchFamily="34" charset="0"/>
-              <a:buChar char="•"/>
-            </a:pPr>
-            <a:r>
-              <a:rPr lang="zh-CN" altLang="en-US" dirty="0"/>
-              <a:t>希望它们的关系是什么，才能尽快收敛？</a:t>
-            </a:r>
-            <a:endParaRPr lang="en-US" altLang="zh-CN" dirty="0"/>
-          </a:p>
-          <a:p>
-            <a:pPr marL="285750" indent="-285750">
-              <a:buFont typeface="Arial" panose="020B0604020202020204" pitchFamily="34" charset="0"/>
-              <a:buChar char="•"/>
-            </a:pPr>
-            <a:r>
-              <a:rPr lang="zh-CN" altLang="en-US" dirty="0"/>
-              <a:t>误差项的大小和梯度的大小的关系是什么？</a:t>
-            </a:r>
-            <a:endParaRPr lang="en-US" altLang="zh-CN" dirty="0"/>
-          </a:p>
-          <a:p>
-            <a:pPr marL="285750" indent="-285750">
-              <a:buFont typeface="Arial" panose="020B0604020202020204" pitchFamily="34" charset="0"/>
-              <a:buChar char="•"/>
-            </a:pPr>
-            <a:r>
-              <a:rPr lang="zh-CN" altLang="en-US" dirty="0"/>
-              <a:t>请思考误差项的公式是什么样的，才能满足</a:t>
-            </a:r>
-            <a:r>
-              <a:rPr lang="en-US" altLang="zh-CN" dirty="0"/>
-              <a:t>loss</a:t>
-            </a:r>
-            <a:r>
-              <a:rPr lang="zh-CN" altLang="en-US" dirty="0"/>
-              <a:t>越大误差项就越大（也就是梯度越大），</a:t>
-            </a:r>
-            <a:r>
-              <a:rPr lang="en-US" altLang="zh-CN" dirty="0"/>
-              <a:t>loss</a:t>
-            </a:r>
-            <a:r>
-              <a:rPr lang="zh-CN" altLang="en-US" dirty="0"/>
-              <a:t>越小误差项就越小（也就是梯度越小）？</a:t>
-            </a:r>
-            <a:endParaRPr lang="en-US" altLang="zh-CN" dirty="0"/>
-          </a:p>
-          <a:p>
-            <a:pPr marL="285750" indent="-285750">
-              <a:buFont typeface="Arial" panose="020B0604020202020204" pitchFamily="34" charset="0"/>
-              <a:buChar char="•"/>
-            </a:pPr>
-            <a:r>
-              <a:rPr lang="zh-CN" altLang="en-US" dirty="0">
-                <a:solidFill>
-                  <a:schemeClr val="bg2"/>
-                </a:solidFill>
-              </a:rPr>
-              <a:t>根据误差项的公式，在激活函数不变的情况下（从而激活函数的导数也不变），另一项应该是多少？</a:t>
-            </a:r>
-            <a:endParaRPr lang="en-US" altLang="zh-CN" dirty="0">
-              <a:solidFill>
-                <a:schemeClr val="bg2"/>
-              </a:solidFill>
-            </a:endParaRPr>
-          </a:p>
-          <a:p>
-            <a:pPr marL="285750" indent="-285750">
-              <a:buFont typeface="Arial" panose="020B0604020202020204" pitchFamily="34" charset="0"/>
-              <a:buChar char="•"/>
-            </a:pPr>
-            <a:r>
-              <a:rPr lang="zh-CN" altLang="en-US" dirty="0"/>
-              <a:t>所以我们使用新的损失函数：交叉熵损失函数，它能使误差项成为该公式</a:t>
-            </a:r>
-            <a:endParaRPr lang="en-US" altLang="zh-CN" dirty="0"/>
-          </a:p>
-          <a:p>
-            <a:endParaRPr lang="en-US" altLang="zh-CN" dirty="0"/>
-          </a:p>
-          <a:p>
-            <a:endParaRPr lang="en-US" altLang="zh-CN" dirty="0"/>
-          </a:p>
-          <a:p>
-            <a:pPr marL="285750" indent="-285750">
-              <a:buFont typeface="Arial" panose="020B0604020202020204" pitchFamily="34" charset="0"/>
-              <a:buChar char="•"/>
-            </a:pPr>
-            <a:r>
-              <a:rPr lang="zh-CN" altLang="en-US" dirty="0"/>
-              <a:t>自学、展学</a:t>
-            </a:r>
-          </a:p>
-          <a:p>
-            <a:pPr marL="285750" indent="-285750">
-              <a:buFont typeface="Arial" panose="020B0604020202020204" pitchFamily="34" charset="0"/>
-              <a:buChar char="•"/>
-            </a:pPr>
-            <a:endParaRPr lang="zh-CN" altLang="en-US" dirty="0"/>
-          </a:p>
-          <a:p>
-            <a:pPr marL="285750" indent="-285750">
-              <a:buFont typeface="Arial" panose="020B0604020202020204" pitchFamily="34" charset="0"/>
-              <a:buChar char="•"/>
-            </a:pPr>
-            <a:endParaRPr lang="en-US" altLang="zh-CN" dirty="0"/>
-          </a:p>
-          <a:p>
-            <a:pPr marL="285750" indent="-285750">
-              <a:buFont typeface="Arial" panose="020B0604020202020204" pitchFamily="34" charset="0"/>
-              <a:buChar char="•"/>
-            </a:pPr>
-            <a:endParaRPr lang="zh-CN" altLang="en-US" dirty="0"/>
-          </a:p>
-          <a:p>
-            <a:pPr marL="285750" indent="-285750">
-              <a:buFont typeface="Arial" panose="020B0604020202020204" pitchFamily="34" charset="0"/>
-              <a:buChar char="•"/>
-            </a:pPr>
-            <a:endParaRPr lang="zh-CN" altLang="en-US" dirty="0"/>
-          </a:p>
-          <a:p>
-            <a:pPr marL="285750" indent="-285750">
-              <a:buFont typeface="Arial" panose="020B0604020202020204" pitchFamily="34" charset="0"/>
-              <a:buChar char="•"/>
-            </a:pPr>
-            <a:endParaRPr lang="zh-CN" altLang="en-US" dirty="0"/>
-          </a:p>
-          <a:p>
-            <a:pPr marL="285750" indent="-285750">
-              <a:buFont typeface="Arial" panose="020B0604020202020204" pitchFamily="34" charset="0"/>
-              <a:buChar char="•"/>
-            </a:pPr>
-            <a:endParaRPr lang="zh-CN" altLang="en-US" dirty="0"/>
-          </a:p>
-          <a:p>
-            <a:pPr marL="285750" indent="-285750">
-              <a:buFont typeface="Arial" panose="020B0604020202020204" pitchFamily="34" charset="0"/>
-              <a:buChar char="•"/>
-            </a:pPr>
-            <a:endParaRPr lang="zh-CN" altLang="en-US" dirty="0"/>
-          </a:p>
-          <a:p>
-            <a:pPr marL="285750" indent="-285750">
-              <a:buFont typeface="Arial" panose="020B0604020202020204" pitchFamily="34" charset="0"/>
-              <a:buChar char="•"/>
-            </a:pPr>
-            <a:endParaRPr lang="zh-CN" altLang="en-US" dirty="0"/>
-          </a:p>
-          <a:p>
-            <a:pPr marL="285750" indent="-285750">
-              <a:buFont typeface="Arial" panose="020B0604020202020204" pitchFamily="34" charset="0"/>
-              <a:buChar char="•"/>
-            </a:pPr>
-            <a:endParaRPr lang="zh-CN" altLang="en-US" dirty="0"/>
-          </a:p>
-        </p:txBody>
-      </p:sp>
-      <p:pic>
-        <p:nvPicPr>
-          <p:cNvPr id="4" name="图片 3">
-            <a:extLst>
-              <a:ext uri="{FF2B5EF4-FFF2-40B4-BE49-F238E27FC236}">
-                <a16:creationId xmlns:a16="http://schemas.microsoft.com/office/drawing/2014/main" id="{30F07015-2F03-094A-696A-5D50BFACB80D}"/>
-              </a:ext>
-            </a:extLst>
-          </p:cNvPr>
-          <p:cNvPicPr>
-            <a:picLocks noChangeAspect="1"/>
-          </p:cNvPicPr>
-          <p:nvPr/>
-        </p:nvPicPr>
-        <p:blipFill>
-          <a:blip r:embed="rId3">
-            <a:extLst>
-              <a:ext uri="{28A0092B-C50C-407E-A947-70E740481C1C}">
-                <a14:useLocalDpi xmlns:a14="http://schemas.microsoft.com/office/drawing/2010/main" val="0"/>
-              </a:ext>
-            </a:extLst>
-          </a:blip>
-          <a:stretch>
-            <a:fillRect/>
-          </a:stretch>
-        </p:blipFill>
-        <p:spPr>
-          <a:xfrm>
-            <a:off x="9745182" y="2072273"/>
-            <a:ext cx="1624493" cy="443961"/>
-          </a:xfrm>
-          <a:prstGeom prst="rect">
-            <a:avLst/>
-          </a:prstGeom>
-        </p:spPr>
-      </p:pic>
-    </p:spTree>
-    <p:custDataLst>
-      <p:tags r:id="rId1"/>
-    </p:custDataLst>
-    <p:extLst>
-      <p:ext uri="{BB962C8B-B14F-4D97-AF65-F5344CB8AC3E}">
-        <p14:creationId xmlns:p14="http://schemas.microsoft.com/office/powerpoint/2010/main" val="3884151446"/>
-      </p:ext>
-    </p:extLst>
-  </p:cSld>
-  <p:clrMapOvr>
-    <a:masterClrMapping/>
-  </p:clrMapOvr>
-  <p:timing>
-    <p:tnLst>
-      <p:par>
-        <p:cTn id="1" dur="indefinite" restart="never" nodeType="tmRoot">
-          <p:childTnLst>
-            <p:seq concurrent="1" nextAc="seek">
-              <p:cTn id="2" dur="indefinite" nodeType="mainSeq">
-                <p:childTnLst>
-                  <p:par>
-                    <p:cTn id="3" fill="hold">
-                      <p:stCondLst>
-                        <p:cond delay="indefinite"/>
-                      </p:stCondLst>
-                      <p:childTnLst>
-                        <p:par>
-                          <p:cTn id="4" fill="hold">
-                            <p:stCondLst>
-                              <p:cond delay="0"/>
-                            </p:stCondLst>
-                            <p:childTnLst>
-                              <p:par>
-                                <p:cTn id="5" presetID="1" presetClass="entr" presetSubtype="0" fill="hold" grpId="0" nodeType="clickEffect">
-                                  <p:stCondLst>
-                                    <p:cond delay="0"/>
-                                  </p:stCondLst>
-                                  <p:childTnLst>
-                                    <p:set>
-                                      <p:cBhvr>
-                                        <p:cTn id="6" dur="1" fill="hold">
-                                          <p:stCondLst>
-                                            <p:cond delay="0"/>
-                                          </p:stCondLst>
-                                        </p:cTn>
-                                        <p:tgtEl>
-                                          <p:spTgt spid="6"/>
-                                        </p:tgtEl>
-                                        <p:attrNameLst>
-                                          <p:attrName>style.visibility</p:attrName>
-                                        </p:attrNameLst>
-                                      </p:cBhvr>
-                                      <p:to>
-                                        <p:strVal val="visible"/>
-                                      </p:to>
-                                    </p:set>
-                                  </p:childTnLst>
-                                </p:cTn>
-                              </p:par>
-                            </p:childTnLst>
-                          </p:cTn>
-                        </p:par>
-                      </p:childTnLst>
-                    </p:cTn>
-                  </p:par>
-                </p:childTnLst>
-              </p:cTn>
-              <p:prevCondLst>
-                <p:cond evt="onPrev" delay="0">
-                  <p:tgtEl>
-                    <p:sldTgt/>
-                  </p:tgtEl>
-                </p:cond>
-              </p:prevCondLst>
-              <p:nextCondLst>
-                <p:cond evt="onNext" delay="0">
-                  <p:tgtEl>
-                    <p:sldTgt/>
-                  </p:tgtEl>
-                </p:cond>
-              </p:nextCondLst>
-            </p:seq>
-          </p:childTnLst>
-        </p:cTn>
-      </p:par>
-    </p:tnLst>
-    <p:bldLst>
-      <p:bldP spid="6" grpId="0"/>
+      <p:bldP spid="5" grpId="0"/>
+      <p:bldP spid="8" grpId="0"/>
     </p:bldLst>
   </p:timing>
 </p:sld>

</xml_diff>

<commit_message>
feat(6_softmax): update ppt and code
</commit_message>
<xml_diff>
--- a/lessons/6_softmax/ppt/使用交叉熵损失函数和Softmax激活函数.pptx
+++ b/lessons/6_softmax/ppt/使用交叉熵损失函数和Softmax激活函数.pptx
@@ -5,10 +5,10 @@
     <p:sldMasterId id="2147483648" r:id="rId1"/>
   </p:sldMasterIdLst>
   <p:notesMasterIdLst>
-    <p:notesMasterId r:id="rId36"/>
+    <p:notesMasterId r:id="rId34"/>
   </p:notesMasterIdLst>
   <p:handoutMasterIdLst>
-    <p:handoutMasterId r:id="rId37"/>
+    <p:handoutMasterId r:id="rId35"/>
   </p:handoutMasterIdLst>
   <p:sldIdLst>
     <p:sldId id="307" r:id="rId2"/>
@@ -25,31 +25,29 @@
     <p:sldId id="1085" r:id="rId13"/>
     <p:sldId id="1081" r:id="rId14"/>
     <p:sldId id="1086" r:id="rId15"/>
-    <p:sldId id="1093" r:id="rId16"/>
-    <p:sldId id="1094" r:id="rId17"/>
-    <p:sldId id="1095" r:id="rId18"/>
-    <p:sldId id="1097" r:id="rId19"/>
-    <p:sldId id="1101" r:id="rId20"/>
-    <p:sldId id="1104" r:id="rId21"/>
-    <p:sldId id="1105" r:id="rId22"/>
-    <p:sldId id="1106" r:id="rId23"/>
-    <p:sldId id="1098" r:id="rId24"/>
-    <p:sldId id="1099" r:id="rId25"/>
-    <p:sldId id="1100" r:id="rId26"/>
-    <p:sldId id="1083" r:id="rId27"/>
-    <p:sldId id="1087" r:id="rId28"/>
-    <p:sldId id="537" r:id="rId29"/>
-    <p:sldId id="536" r:id="rId30"/>
-    <p:sldId id="1014" r:id="rId31"/>
-    <p:sldId id="1013" r:id="rId32"/>
-    <p:sldId id="997" r:id="rId33"/>
-    <p:sldId id="998" r:id="rId34"/>
-    <p:sldId id="653" r:id="rId35"/>
+    <p:sldId id="1095" r:id="rId16"/>
+    <p:sldId id="1097" r:id="rId17"/>
+    <p:sldId id="1101" r:id="rId18"/>
+    <p:sldId id="1104" r:id="rId19"/>
+    <p:sldId id="1105" r:id="rId20"/>
+    <p:sldId id="1106" r:id="rId21"/>
+    <p:sldId id="1098" r:id="rId22"/>
+    <p:sldId id="1099" r:id="rId23"/>
+    <p:sldId id="1100" r:id="rId24"/>
+    <p:sldId id="1083" r:id="rId25"/>
+    <p:sldId id="1087" r:id="rId26"/>
+    <p:sldId id="537" r:id="rId27"/>
+    <p:sldId id="536" r:id="rId28"/>
+    <p:sldId id="1014" r:id="rId29"/>
+    <p:sldId id="1013" r:id="rId30"/>
+    <p:sldId id="997" r:id="rId31"/>
+    <p:sldId id="998" r:id="rId32"/>
+    <p:sldId id="653" r:id="rId33"/>
   </p:sldIdLst>
   <p:sldSz cx="12192000" cy="6858000"/>
   <p:notesSz cx="6858000" cy="9144000"/>
   <p:custDataLst>
-    <p:tags r:id="rId38"/>
+    <p:tags r:id="rId36"/>
   </p:custDataLst>
   <p:defaultTextStyle>
     <a:defPPr>
@@ -8291,7 +8289,7 @@
             </a:pPr>
             <a:r>
               <a:rPr lang="zh-CN" altLang="en-US" dirty="0"/>
-              <a:t>“识别手写数字“使用交叉熵损失函数，是否能够加快训练速度？</a:t>
+              <a:t>“识别手写数字“是否能使用单分类中的交叉熵损失函数？</a:t>
             </a:r>
             <a:endParaRPr lang="en-US" altLang="zh-CN" dirty="0"/>
           </a:p>
@@ -8300,915 +8298,17 @@
               <a:buFont typeface="Arial" panose="020B0604020202020204" pitchFamily="34" charset="0"/>
               <a:buChar char="•"/>
             </a:pPr>
+            <a:r>
+              <a:rPr lang="zh-CN" altLang="en-US" dirty="0"/>
+              <a:t>为什么？</a:t>
+            </a:r>
             <a:endParaRPr lang="en-US" altLang="zh-CN" dirty="0"/>
           </a:p>
           <a:p>
-            <a:endParaRPr lang="en-US" altLang="zh-CN" dirty="0"/>
-          </a:p>
-          <a:p>
             <a:pPr marL="285750" indent="-285750">
               <a:buFont typeface="Arial" panose="020B0604020202020204" pitchFamily="34" charset="0"/>
               <a:buChar char="•"/>
             </a:pPr>
-            <a:r>
-              <a:rPr lang="zh-CN" altLang="en-US" dirty="0"/>
-              <a:t>自学、互学、展学</a:t>
-            </a:r>
-          </a:p>
-          <a:p>
-            <a:pPr marL="285750" indent="-285750">
-              <a:buFont typeface="Arial" panose="020B0604020202020204" pitchFamily="34" charset="0"/>
-              <a:buChar char="•"/>
-            </a:pPr>
-            <a:endParaRPr lang="zh-CN" altLang="en-US" dirty="0"/>
-          </a:p>
-          <a:p>
-            <a:pPr marL="285750" indent="-285750">
-              <a:buFont typeface="Arial" panose="020B0604020202020204" pitchFamily="34" charset="0"/>
-              <a:buChar char="•"/>
-            </a:pPr>
-            <a:endParaRPr lang="en-US" altLang="zh-CN" dirty="0"/>
-          </a:p>
-          <a:p>
-            <a:pPr marL="285750" indent="-285750">
-              <a:buFont typeface="Arial" panose="020B0604020202020204" pitchFamily="34" charset="0"/>
-              <a:buChar char="•"/>
-            </a:pPr>
-            <a:endParaRPr lang="zh-CN" altLang="en-US" dirty="0"/>
-          </a:p>
-          <a:p>
-            <a:pPr marL="285750" indent="-285750">
-              <a:buFont typeface="Arial" panose="020B0604020202020204" pitchFamily="34" charset="0"/>
-              <a:buChar char="•"/>
-            </a:pPr>
-            <a:endParaRPr lang="zh-CN" altLang="en-US" dirty="0"/>
-          </a:p>
-          <a:p>
-            <a:pPr marL="285750" indent="-285750">
-              <a:buFont typeface="Arial" panose="020B0604020202020204" pitchFamily="34" charset="0"/>
-              <a:buChar char="•"/>
-            </a:pPr>
-            <a:endParaRPr lang="zh-CN" altLang="en-US" dirty="0"/>
-          </a:p>
-          <a:p>
-            <a:pPr marL="285750" indent="-285750">
-              <a:buFont typeface="Arial" panose="020B0604020202020204" pitchFamily="34" charset="0"/>
-              <a:buChar char="•"/>
-            </a:pPr>
-            <a:endParaRPr lang="zh-CN" altLang="en-US" dirty="0"/>
-          </a:p>
-          <a:p>
-            <a:pPr marL="285750" indent="-285750">
-              <a:buFont typeface="Arial" panose="020B0604020202020204" pitchFamily="34" charset="0"/>
-              <a:buChar char="•"/>
-            </a:pPr>
-            <a:endParaRPr lang="zh-CN" altLang="en-US" dirty="0"/>
-          </a:p>
-          <a:p>
-            <a:pPr marL="285750" indent="-285750">
-              <a:buFont typeface="Arial" panose="020B0604020202020204" pitchFamily="34" charset="0"/>
-              <a:buChar char="•"/>
-            </a:pPr>
-            <a:endParaRPr lang="zh-CN" altLang="en-US" dirty="0"/>
-          </a:p>
-          <a:p>
-            <a:pPr marL="285750" indent="-285750">
-              <a:buFont typeface="Arial" panose="020B0604020202020204" pitchFamily="34" charset="0"/>
-              <a:buChar char="•"/>
-            </a:pPr>
-            <a:endParaRPr lang="zh-CN" altLang="en-US" dirty="0"/>
-          </a:p>
-        </p:txBody>
-      </p:sp>
-    </p:spTree>
-    <p:custDataLst>
-      <p:tags r:id="rId1"/>
-    </p:custDataLst>
-    <p:extLst>
-      <p:ext uri="{BB962C8B-B14F-4D97-AF65-F5344CB8AC3E}">
-        <p14:creationId xmlns:p14="http://schemas.microsoft.com/office/powerpoint/2010/main" val="3794217102"/>
-      </p:ext>
-    </p:extLst>
-  </p:cSld>
-  <p:clrMapOvr>
-    <a:masterClrMapping/>
-  </p:clrMapOvr>
-  <p:timing>
-    <p:tnLst>
-      <p:par>
-        <p:cTn id="1" dur="indefinite" restart="never" nodeType="tmRoot">
-          <p:childTnLst>
-            <p:seq concurrent="1" nextAc="seek">
-              <p:cTn id="2" dur="indefinite" nodeType="mainSeq">
-                <p:childTnLst>
-                  <p:par>
-                    <p:cTn id="3" fill="hold">
-                      <p:stCondLst>
-                        <p:cond delay="indefinite"/>
-                      </p:stCondLst>
-                      <p:childTnLst>
-                        <p:par>
-                          <p:cTn id="4" fill="hold">
-                            <p:stCondLst>
-                              <p:cond delay="0"/>
-                            </p:stCondLst>
-                            <p:childTnLst>
-                              <p:par>
-                                <p:cTn id="5" presetID="1" presetClass="entr" presetSubtype="0" fill="hold" grpId="0" nodeType="clickEffect">
-                                  <p:stCondLst>
-                                    <p:cond delay="0"/>
-                                  </p:stCondLst>
-                                  <p:childTnLst>
-                                    <p:set>
-                                      <p:cBhvr>
-                                        <p:cTn id="6" dur="1" fill="hold">
-                                          <p:stCondLst>
-                                            <p:cond delay="0"/>
-                                          </p:stCondLst>
-                                        </p:cTn>
-                                        <p:tgtEl>
-                                          <p:spTgt spid="6"/>
-                                        </p:tgtEl>
-                                        <p:attrNameLst>
-                                          <p:attrName>style.visibility</p:attrName>
-                                        </p:attrNameLst>
-                                      </p:cBhvr>
-                                      <p:to>
-                                        <p:strVal val="visible"/>
-                                      </p:to>
-                                    </p:set>
-                                  </p:childTnLst>
-                                </p:cTn>
-                              </p:par>
-                            </p:childTnLst>
-                          </p:cTn>
-                        </p:par>
-                      </p:childTnLst>
-                    </p:cTn>
-                  </p:par>
-                </p:childTnLst>
-              </p:cTn>
-              <p:prevCondLst>
-                <p:cond evt="onPrev" delay="0">
-                  <p:tgtEl>
-                    <p:sldTgt/>
-                  </p:tgtEl>
-                </p:cond>
-              </p:prevCondLst>
-              <p:nextCondLst>
-                <p:cond evt="onNext" delay="0">
-                  <p:tgtEl>
-                    <p:sldTgt/>
-                  </p:tgtEl>
-                </p:cond>
-              </p:nextCondLst>
-            </p:seq>
-          </p:childTnLst>
-        </p:cTn>
-      </p:par>
-    </p:tnLst>
-    <p:bldLst>
-      <p:bldP spid="6" grpId="0"/>
-    </p:bldLst>
-  </p:timing>
-</p:sld>
-</file>
-
-<file path=ppt/slides/slide15.xml><?xml version="1.0" encoding="utf-8"?>
-<p:sld xmlns:a="http://schemas.openxmlformats.org/drawingml/2006/main" xmlns:r="http://schemas.openxmlformats.org/officeDocument/2006/relationships" xmlns:p="http://schemas.openxmlformats.org/presentationml/2006/main">
-  <p:cSld>
-    <p:spTree>
-      <p:nvGrpSpPr>
-        <p:cNvPr id="1" name=""/>
-        <p:cNvGrpSpPr/>
-        <p:nvPr/>
-      </p:nvGrpSpPr>
-      <p:grpSpPr>
-        <a:xfrm>
-          <a:off x="0" y="0"/>
-          <a:ext cx="0" cy="0"/>
-          <a:chOff x="0" y="0"/>
-          <a:chExt cx="0" cy="0"/>
-        </a:xfrm>
-      </p:grpSpPr>
-      <p:sp>
-        <p:nvSpPr>
-          <p:cNvPr id="3" name="标题 2"/>
-          <p:cNvSpPr>
-            <a:spLocks noGrp="1"/>
-          </p:cNvSpPr>
-          <p:nvPr>
-            <p:ph type="title"/>
-          </p:nvPr>
-        </p:nvSpPr>
-        <p:spPr/>
-        <p:txBody>
-          <a:bodyPr/>
-          <a:lstStyle/>
-          <a:p>
-            <a:r>
-              <a:rPr lang="zh-CN" altLang="en-US" dirty="0">
-                <a:sym typeface="+mn-ea"/>
-              </a:rPr>
-              <a:t>任务：识别手写数字使用交叉熵损失函数	</a:t>
-            </a:r>
-            <a:endParaRPr lang="en-US" altLang="zh-CN" dirty="0"/>
-          </a:p>
-        </p:txBody>
-      </p:sp>
-      <p:sp>
-        <p:nvSpPr>
-          <p:cNvPr id="6" name="文本占位符 1">
-            <a:extLst>
-              <a:ext uri="{FF2B5EF4-FFF2-40B4-BE49-F238E27FC236}">
-                <a16:creationId xmlns:a16="http://schemas.microsoft.com/office/drawing/2014/main" id="{BA88068A-4FDC-6963-46A5-ADEC46CDA15E}"/>
-              </a:ext>
-            </a:extLst>
-          </p:cNvPr>
-          <p:cNvSpPr txBox="1">
-            <a:spLocks/>
-          </p:cNvSpPr>
-          <p:nvPr/>
-        </p:nvSpPr>
-        <p:spPr>
-          <a:xfrm>
-            <a:off x="822325" y="1778635"/>
-            <a:ext cx="10852150" cy="4553585"/>
-          </a:xfrm>
-        </p:spPr>
-        <p:txBody>
-          <a:bodyPr lIns="101600" tIns="38100" rIns="76200" bIns="38100">
-            <a:noAutofit/>
-          </a:bodyPr>
-          <a:lstStyle>
-            <a:lvl1pPr marL="0" indent="0" algn="l" defTabSz="914400" rtl="0" eaLnBrk="1" fontAlgn="auto" latinLnBrk="0" hangingPunct="1">
-              <a:lnSpc>
-                <a:spcPct val="130000"/>
-              </a:lnSpc>
-              <a:spcBef>
-                <a:spcPts val="0"/>
-              </a:spcBef>
-              <a:spcAft>
-                <a:spcPts val="1000"/>
-              </a:spcAft>
-              <a:buFont typeface="Arial" panose="020B0604020202020204" pitchFamily="34" charset="0"/>
-              <a:buNone/>
-              <a:defRPr kumimoji="0" lang="zh-CN" altLang="en-US" sz="1600" b="0" i="0" u="none" strike="noStrike" kern="1200" cap="none" spc="150" normalizeH="0" baseline="0" noProof="1">
-                <a:solidFill>
-                  <a:schemeClr val="tx1"/>
-                </a:solidFill>
-                <a:uFillTx/>
-                <a:latin typeface="+mn-lt"/>
-                <a:ea typeface="+mn-ea"/>
-                <a:cs typeface="+mn-cs"/>
-                <a:sym typeface="+mn-ea"/>
-              </a:defRPr>
-            </a:lvl1pPr>
-            <a:lvl2pPr marL="457200" indent="0" algn="l" defTabSz="914400" rtl="0" eaLnBrk="1" fontAlgn="auto" latinLnBrk="0" hangingPunct="1">
-              <a:lnSpc>
-                <a:spcPct val="130000"/>
-              </a:lnSpc>
-              <a:spcBef>
-                <a:spcPts val="0"/>
-              </a:spcBef>
-              <a:spcAft>
-                <a:spcPts val="1000"/>
-              </a:spcAft>
-              <a:buFont typeface="Arial" panose="020B0604020202020204" pitchFamily="34" charset="0"/>
-              <a:buNone/>
-              <a:tabLst>
-                <a:tab pos="1609725" algn="l"/>
-              </a:tabLst>
-              <a:defRPr sz="2000" u="none" strike="noStrike" kern="1200" cap="none" spc="150" normalizeH="0" baseline="0">
-                <a:solidFill>
-                  <a:schemeClr val="tx1">
-                    <a:tint val="75000"/>
-                  </a:schemeClr>
-                </a:solidFill>
-                <a:uFillTx/>
-                <a:latin typeface="+mn-lt"/>
-                <a:ea typeface="+mn-ea"/>
-                <a:cs typeface="+mn-cs"/>
-              </a:defRPr>
-            </a:lvl2pPr>
-            <a:lvl3pPr marL="914400" indent="0" algn="l" defTabSz="914400" rtl="0" eaLnBrk="1" fontAlgn="auto" latinLnBrk="0" hangingPunct="1">
-              <a:lnSpc>
-                <a:spcPct val="130000"/>
-              </a:lnSpc>
-              <a:spcBef>
-                <a:spcPts val="0"/>
-              </a:spcBef>
-              <a:spcAft>
-                <a:spcPts val="1000"/>
-              </a:spcAft>
-              <a:buFont typeface="Arial" panose="020B0604020202020204" pitchFamily="34" charset="0"/>
-              <a:buNone/>
-              <a:defRPr sz="1800" u="none" strike="noStrike" kern="1200" cap="none" spc="150" normalizeH="0" baseline="0">
-                <a:solidFill>
-                  <a:schemeClr val="tx1">
-                    <a:tint val="75000"/>
-                  </a:schemeClr>
-                </a:solidFill>
-                <a:uFillTx/>
-                <a:latin typeface="+mn-lt"/>
-                <a:ea typeface="+mn-ea"/>
-                <a:cs typeface="+mn-cs"/>
-              </a:defRPr>
-            </a:lvl3pPr>
-            <a:lvl4pPr marL="1371600" indent="0" algn="l" defTabSz="914400" rtl="0" eaLnBrk="1" fontAlgn="auto" latinLnBrk="0" hangingPunct="1">
-              <a:lnSpc>
-                <a:spcPct val="130000"/>
-              </a:lnSpc>
-              <a:spcBef>
-                <a:spcPts val="0"/>
-              </a:spcBef>
-              <a:spcAft>
-                <a:spcPts val="1000"/>
-              </a:spcAft>
-              <a:buFont typeface="Arial" panose="020B0604020202020204" pitchFamily="34" charset="0"/>
-              <a:buNone/>
-              <a:defRPr sz="1600" u="none" strike="noStrike" kern="1200" cap="none" spc="150" normalizeH="0" baseline="0">
-                <a:solidFill>
-                  <a:schemeClr val="tx1">
-                    <a:tint val="75000"/>
-                  </a:schemeClr>
-                </a:solidFill>
-                <a:uFillTx/>
-                <a:latin typeface="+mn-lt"/>
-                <a:ea typeface="+mn-ea"/>
-                <a:cs typeface="+mn-cs"/>
-              </a:defRPr>
-            </a:lvl4pPr>
-            <a:lvl5pPr marL="1828800" indent="0" algn="l" defTabSz="914400" rtl="0" eaLnBrk="1" fontAlgn="auto" latinLnBrk="0" hangingPunct="1">
-              <a:lnSpc>
-                <a:spcPct val="130000"/>
-              </a:lnSpc>
-              <a:spcBef>
-                <a:spcPts val="0"/>
-              </a:spcBef>
-              <a:spcAft>
-                <a:spcPts val="1000"/>
-              </a:spcAft>
-              <a:buFont typeface="Arial" panose="020B0604020202020204" pitchFamily="34" charset="0"/>
-              <a:buNone/>
-              <a:defRPr sz="1600" u="none" strike="noStrike" kern="1200" cap="none" spc="150" normalizeH="0" baseline="0">
-                <a:solidFill>
-                  <a:schemeClr val="tx1">
-                    <a:tint val="75000"/>
-                  </a:schemeClr>
-                </a:solidFill>
-                <a:uFillTx/>
-                <a:latin typeface="+mn-lt"/>
-                <a:ea typeface="+mn-ea"/>
-                <a:cs typeface="+mn-cs"/>
-              </a:defRPr>
-            </a:lvl5pPr>
-            <a:lvl6pPr marL="2286000" indent="0" algn="l" defTabSz="914400" rtl="0" eaLnBrk="1" latinLnBrk="0" hangingPunct="1">
-              <a:lnSpc>
-                <a:spcPct val="90000"/>
-              </a:lnSpc>
-              <a:spcBef>
-                <a:spcPts val="500"/>
-              </a:spcBef>
-              <a:buFont typeface="Arial" panose="020B0604020202020204" pitchFamily="34" charset="0"/>
-              <a:buNone/>
-              <a:defRPr sz="1600" kern="1200">
-                <a:solidFill>
-                  <a:schemeClr val="tx1">
-                    <a:tint val="75000"/>
-                  </a:schemeClr>
-                </a:solidFill>
-                <a:latin typeface="+mn-lt"/>
-                <a:ea typeface="+mn-ea"/>
-                <a:cs typeface="+mn-cs"/>
-              </a:defRPr>
-            </a:lvl6pPr>
-            <a:lvl7pPr marL="2743200" indent="0" algn="l" defTabSz="914400" rtl="0" eaLnBrk="1" latinLnBrk="0" hangingPunct="1">
-              <a:lnSpc>
-                <a:spcPct val="90000"/>
-              </a:lnSpc>
-              <a:spcBef>
-                <a:spcPts val="500"/>
-              </a:spcBef>
-              <a:buFont typeface="Arial" panose="020B0604020202020204" pitchFamily="34" charset="0"/>
-              <a:buNone/>
-              <a:defRPr sz="1600" kern="1200">
-                <a:solidFill>
-                  <a:schemeClr val="tx1">
-                    <a:tint val="75000"/>
-                  </a:schemeClr>
-                </a:solidFill>
-                <a:latin typeface="+mn-lt"/>
-                <a:ea typeface="+mn-ea"/>
-                <a:cs typeface="+mn-cs"/>
-              </a:defRPr>
-            </a:lvl7pPr>
-            <a:lvl8pPr marL="3200400" indent="0" algn="l" defTabSz="914400" rtl="0" eaLnBrk="1" latinLnBrk="0" hangingPunct="1">
-              <a:lnSpc>
-                <a:spcPct val="90000"/>
-              </a:lnSpc>
-              <a:spcBef>
-                <a:spcPts val="500"/>
-              </a:spcBef>
-              <a:buFont typeface="Arial" panose="020B0604020202020204" pitchFamily="34" charset="0"/>
-              <a:buNone/>
-              <a:defRPr sz="1600" kern="1200">
-                <a:solidFill>
-                  <a:schemeClr val="tx1">
-                    <a:tint val="75000"/>
-                  </a:schemeClr>
-                </a:solidFill>
-                <a:latin typeface="+mn-lt"/>
-                <a:ea typeface="+mn-ea"/>
-                <a:cs typeface="+mn-cs"/>
-              </a:defRPr>
-            </a:lvl8pPr>
-            <a:lvl9pPr marL="3657600" indent="0" algn="l" defTabSz="914400" rtl="0" eaLnBrk="1" latinLnBrk="0" hangingPunct="1">
-              <a:lnSpc>
-                <a:spcPct val="90000"/>
-              </a:lnSpc>
-              <a:spcBef>
-                <a:spcPts val="500"/>
-              </a:spcBef>
-              <a:buFont typeface="Arial" panose="020B0604020202020204" pitchFamily="34" charset="0"/>
-              <a:buNone/>
-              <a:defRPr sz="1600" kern="1200">
-                <a:solidFill>
-                  <a:schemeClr val="tx1">
-                    <a:tint val="75000"/>
-                  </a:schemeClr>
-                </a:solidFill>
-                <a:latin typeface="+mn-lt"/>
-                <a:ea typeface="+mn-ea"/>
-                <a:cs typeface="+mn-cs"/>
-              </a:defRPr>
-            </a:lvl9pPr>
-          </a:lstStyle>
-          <a:p>
-            <a:pPr marL="285750" indent="-285750">
-              <a:buFont typeface="Arial" panose="020B0604020202020204" pitchFamily="34" charset="0"/>
-              <a:buChar char="•"/>
-            </a:pPr>
-            <a:r>
-              <a:rPr lang="zh-CN" altLang="en-US" dirty="0"/>
-              <a:t>请使用新的交叉熵损失函数实现代码</a:t>
-            </a:r>
-            <a:endParaRPr lang="en-US" altLang="zh-CN" dirty="0"/>
-          </a:p>
-          <a:p>
-            <a:pPr marL="285750" indent="-285750">
-              <a:buFont typeface="Arial" panose="020B0604020202020204" pitchFamily="34" charset="0"/>
-              <a:buChar char="•"/>
-            </a:pPr>
-            <a:r>
-              <a:rPr lang="zh-CN" altLang="en-US" dirty="0"/>
-              <a:t>请每个同学运行代码，与之前的代码比较，看下</a:t>
-            </a:r>
-            <a:r>
-              <a:rPr lang="en-US" altLang="zh-CN" dirty="0"/>
-              <a:t>loss</a:t>
-            </a:r>
-            <a:r>
-              <a:rPr lang="zh-CN" altLang="en-US" dirty="0"/>
-              <a:t>的训练速度是否加快？</a:t>
-            </a:r>
-            <a:endParaRPr lang="en-US" altLang="zh-CN" dirty="0"/>
-          </a:p>
-          <a:p>
-            <a:endParaRPr lang="en-US" altLang="zh-CN" dirty="0"/>
-          </a:p>
-          <a:p>
-            <a:pPr marL="285750" indent="-285750">
-              <a:buFont typeface="Arial" panose="020B0604020202020204" pitchFamily="34" charset="0"/>
-              <a:buChar char="•"/>
-            </a:pPr>
-            <a:r>
-              <a:rPr lang="zh-CN" altLang="en-US" dirty="0"/>
-              <a:t>自学、展学</a:t>
-            </a:r>
-          </a:p>
-          <a:p>
-            <a:pPr marL="285750" indent="-285750">
-              <a:buFont typeface="Arial" panose="020B0604020202020204" pitchFamily="34" charset="0"/>
-              <a:buChar char="•"/>
-            </a:pPr>
-            <a:endParaRPr lang="zh-CN" altLang="en-US" dirty="0"/>
-          </a:p>
-          <a:p>
-            <a:pPr marL="285750" indent="-285750">
-              <a:buFont typeface="Arial" panose="020B0604020202020204" pitchFamily="34" charset="0"/>
-              <a:buChar char="•"/>
-            </a:pPr>
-            <a:endParaRPr lang="en-US" altLang="zh-CN" dirty="0"/>
-          </a:p>
-          <a:p>
-            <a:pPr marL="285750" indent="-285750">
-              <a:buFont typeface="Arial" panose="020B0604020202020204" pitchFamily="34" charset="0"/>
-              <a:buChar char="•"/>
-            </a:pPr>
-            <a:endParaRPr lang="zh-CN" altLang="en-US" dirty="0"/>
-          </a:p>
-          <a:p>
-            <a:pPr marL="285750" indent="-285750">
-              <a:buFont typeface="Arial" panose="020B0604020202020204" pitchFamily="34" charset="0"/>
-              <a:buChar char="•"/>
-            </a:pPr>
-            <a:endParaRPr lang="zh-CN" altLang="en-US" dirty="0"/>
-          </a:p>
-          <a:p>
-            <a:endParaRPr lang="zh-CN" altLang="en-US" dirty="0"/>
-          </a:p>
-        </p:txBody>
-      </p:sp>
-    </p:spTree>
-    <p:custDataLst>
-      <p:tags r:id="rId1"/>
-    </p:custDataLst>
-    <p:extLst>
-      <p:ext uri="{BB962C8B-B14F-4D97-AF65-F5344CB8AC3E}">
-        <p14:creationId xmlns:p14="http://schemas.microsoft.com/office/powerpoint/2010/main" val="722688410"/>
-      </p:ext>
-    </p:extLst>
-  </p:cSld>
-  <p:clrMapOvr>
-    <a:masterClrMapping/>
-  </p:clrMapOvr>
-  <p:timing>
-    <p:tnLst>
-      <p:par>
-        <p:cTn id="1" dur="indefinite" restart="never" nodeType="tmRoot">
-          <p:childTnLst>
-            <p:seq concurrent="1" nextAc="seek">
-              <p:cTn id="2" dur="indefinite" nodeType="mainSeq">
-                <p:childTnLst>
-                  <p:par>
-                    <p:cTn id="3" fill="hold">
-                      <p:stCondLst>
-                        <p:cond delay="indefinite"/>
-                      </p:stCondLst>
-                      <p:childTnLst>
-                        <p:par>
-                          <p:cTn id="4" fill="hold">
-                            <p:stCondLst>
-                              <p:cond delay="0"/>
-                            </p:stCondLst>
-                            <p:childTnLst>
-                              <p:par>
-                                <p:cTn id="5" presetID="1" presetClass="entr" presetSubtype="0" fill="hold" grpId="0" nodeType="clickEffect">
-                                  <p:stCondLst>
-                                    <p:cond delay="0"/>
-                                  </p:stCondLst>
-                                  <p:childTnLst>
-                                    <p:set>
-                                      <p:cBhvr>
-                                        <p:cTn id="6" dur="1" fill="hold">
-                                          <p:stCondLst>
-                                            <p:cond delay="0"/>
-                                          </p:stCondLst>
-                                        </p:cTn>
-                                        <p:tgtEl>
-                                          <p:spTgt spid="6"/>
-                                        </p:tgtEl>
-                                        <p:attrNameLst>
-                                          <p:attrName>style.visibility</p:attrName>
-                                        </p:attrNameLst>
-                                      </p:cBhvr>
-                                      <p:to>
-                                        <p:strVal val="visible"/>
-                                      </p:to>
-                                    </p:set>
-                                  </p:childTnLst>
-                                </p:cTn>
-                              </p:par>
-                            </p:childTnLst>
-                          </p:cTn>
-                        </p:par>
-                      </p:childTnLst>
-                    </p:cTn>
-                  </p:par>
-                </p:childTnLst>
-              </p:cTn>
-              <p:prevCondLst>
-                <p:cond evt="onPrev" delay="0">
-                  <p:tgtEl>
-                    <p:sldTgt/>
-                  </p:tgtEl>
-                </p:cond>
-              </p:prevCondLst>
-              <p:nextCondLst>
-                <p:cond evt="onNext" delay="0">
-                  <p:tgtEl>
-                    <p:sldTgt/>
-                  </p:tgtEl>
-                </p:cond>
-              </p:nextCondLst>
-            </p:seq>
-          </p:childTnLst>
-        </p:cTn>
-      </p:par>
-    </p:tnLst>
-    <p:bldLst>
-      <p:bldP spid="6" grpId="0"/>
-    </p:bldLst>
-  </p:timing>
-</p:sld>
-</file>
-
-<file path=ppt/slides/slide16.xml><?xml version="1.0" encoding="utf-8"?>
-<p:sld xmlns:a="http://schemas.openxmlformats.org/drawingml/2006/main" xmlns:r="http://schemas.openxmlformats.org/officeDocument/2006/relationships" xmlns:p="http://schemas.openxmlformats.org/presentationml/2006/main">
-  <p:cSld>
-    <p:spTree>
-      <p:nvGrpSpPr>
-        <p:cNvPr id="1" name=""/>
-        <p:cNvGrpSpPr/>
-        <p:nvPr/>
-      </p:nvGrpSpPr>
-      <p:grpSpPr>
-        <a:xfrm>
-          <a:off x="0" y="0"/>
-          <a:ext cx="0" cy="0"/>
-          <a:chOff x="0" y="0"/>
-          <a:chExt cx="0" cy="0"/>
-        </a:xfrm>
-      </p:grpSpPr>
-      <p:sp>
-        <p:nvSpPr>
-          <p:cNvPr id="3" name="标题 2"/>
-          <p:cNvSpPr>
-            <a:spLocks noGrp="1"/>
-          </p:cNvSpPr>
-          <p:nvPr>
-            <p:ph type="title"/>
-          </p:nvPr>
-        </p:nvSpPr>
-        <p:spPr/>
-        <p:txBody>
-          <a:bodyPr/>
-          <a:lstStyle/>
-          <a:p>
-            <a:r>
-              <a:rPr lang="zh-CN" altLang="en-US" dirty="0">
-                <a:sym typeface="+mn-ea"/>
-              </a:rPr>
-              <a:t>主问题：	如何加快多</a:t>
-            </a:r>
-            <a:r>
-              <a:rPr lang="zh-CN" altLang="en-US" dirty="0"/>
-              <a:t>分类的训练速度？</a:t>
-            </a:r>
-            <a:endParaRPr dirty="0">
-              <a:sym typeface="+mn-ea"/>
-            </a:endParaRPr>
-          </a:p>
-        </p:txBody>
-      </p:sp>
-      <p:sp>
-        <p:nvSpPr>
-          <p:cNvPr id="6" name="文本占位符 1">
-            <a:extLst>
-              <a:ext uri="{FF2B5EF4-FFF2-40B4-BE49-F238E27FC236}">
-                <a16:creationId xmlns:a16="http://schemas.microsoft.com/office/drawing/2014/main" id="{BA88068A-4FDC-6963-46A5-ADEC46CDA15E}"/>
-              </a:ext>
-            </a:extLst>
-          </p:cNvPr>
-          <p:cNvSpPr txBox="1">
-            <a:spLocks/>
-          </p:cNvSpPr>
-          <p:nvPr/>
-        </p:nvSpPr>
-        <p:spPr>
-          <a:xfrm>
-            <a:off x="822325" y="1778635"/>
-            <a:ext cx="10852150" cy="4553585"/>
-          </a:xfrm>
-        </p:spPr>
-        <p:txBody>
-          <a:bodyPr lIns="101600" tIns="38100" rIns="76200" bIns="38100">
-            <a:noAutofit/>
-          </a:bodyPr>
-          <a:lstStyle>
-            <a:lvl1pPr marL="0" indent="0" algn="l" defTabSz="914400" rtl="0" eaLnBrk="1" fontAlgn="auto" latinLnBrk="0" hangingPunct="1">
-              <a:lnSpc>
-                <a:spcPct val="130000"/>
-              </a:lnSpc>
-              <a:spcBef>
-                <a:spcPts val="0"/>
-              </a:spcBef>
-              <a:spcAft>
-                <a:spcPts val="1000"/>
-              </a:spcAft>
-              <a:buFont typeface="Arial" panose="020B0604020202020204" pitchFamily="34" charset="0"/>
-              <a:buNone/>
-              <a:defRPr kumimoji="0" lang="zh-CN" altLang="en-US" sz="1600" b="0" i="0" u="none" strike="noStrike" kern="1200" cap="none" spc="150" normalizeH="0" baseline="0" noProof="1">
-                <a:solidFill>
-                  <a:schemeClr val="tx1"/>
-                </a:solidFill>
-                <a:uFillTx/>
-                <a:latin typeface="+mn-lt"/>
-                <a:ea typeface="+mn-ea"/>
-                <a:cs typeface="+mn-cs"/>
-                <a:sym typeface="+mn-ea"/>
-              </a:defRPr>
-            </a:lvl1pPr>
-            <a:lvl2pPr marL="457200" indent="0" algn="l" defTabSz="914400" rtl="0" eaLnBrk="1" fontAlgn="auto" latinLnBrk="0" hangingPunct="1">
-              <a:lnSpc>
-                <a:spcPct val="130000"/>
-              </a:lnSpc>
-              <a:spcBef>
-                <a:spcPts val="0"/>
-              </a:spcBef>
-              <a:spcAft>
-                <a:spcPts val="1000"/>
-              </a:spcAft>
-              <a:buFont typeface="Arial" panose="020B0604020202020204" pitchFamily="34" charset="0"/>
-              <a:buNone/>
-              <a:tabLst>
-                <a:tab pos="1609725" algn="l"/>
-              </a:tabLst>
-              <a:defRPr sz="2000" u="none" strike="noStrike" kern="1200" cap="none" spc="150" normalizeH="0" baseline="0">
-                <a:solidFill>
-                  <a:schemeClr val="tx1">
-                    <a:tint val="75000"/>
-                  </a:schemeClr>
-                </a:solidFill>
-                <a:uFillTx/>
-                <a:latin typeface="+mn-lt"/>
-                <a:ea typeface="+mn-ea"/>
-                <a:cs typeface="+mn-cs"/>
-              </a:defRPr>
-            </a:lvl2pPr>
-            <a:lvl3pPr marL="914400" indent="0" algn="l" defTabSz="914400" rtl="0" eaLnBrk="1" fontAlgn="auto" latinLnBrk="0" hangingPunct="1">
-              <a:lnSpc>
-                <a:spcPct val="130000"/>
-              </a:lnSpc>
-              <a:spcBef>
-                <a:spcPts val="0"/>
-              </a:spcBef>
-              <a:spcAft>
-                <a:spcPts val="1000"/>
-              </a:spcAft>
-              <a:buFont typeface="Arial" panose="020B0604020202020204" pitchFamily="34" charset="0"/>
-              <a:buNone/>
-              <a:defRPr sz="1800" u="none" strike="noStrike" kern="1200" cap="none" spc="150" normalizeH="0" baseline="0">
-                <a:solidFill>
-                  <a:schemeClr val="tx1">
-                    <a:tint val="75000"/>
-                  </a:schemeClr>
-                </a:solidFill>
-                <a:uFillTx/>
-                <a:latin typeface="+mn-lt"/>
-                <a:ea typeface="+mn-ea"/>
-                <a:cs typeface="+mn-cs"/>
-              </a:defRPr>
-            </a:lvl3pPr>
-            <a:lvl4pPr marL="1371600" indent="0" algn="l" defTabSz="914400" rtl="0" eaLnBrk="1" fontAlgn="auto" latinLnBrk="0" hangingPunct="1">
-              <a:lnSpc>
-                <a:spcPct val="130000"/>
-              </a:lnSpc>
-              <a:spcBef>
-                <a:spcPts val="0"/>
-              </a:spcBef>
-              <a:spcAft>
-                <a:spcPts val="1000"/>
-              </a:spcAft>
-              <a:buFont typeface="Arial" panose="020B0604020202020204" pitchFamily="34" charset="0"/>
-              <a:buNone/>
-              <a:defRPr sz="1600" u="none" strike="noStrike" kern="1200" cap="none" spc="150" normalizeH="0" baseline="0">
-                <a:solidFill>
-                  <a:schemeClr val="tx1">
-                    <a:tint val="75000"/>
-                  </a:schemeClr>
-                </a:solidFill>
-                <a:uFillTx/>
-                <a:latin typeface="+mn-lt"/>
-                <a:ea typeface="+mn-ea"/>
-                <a:cs typeface="+mn-cs"/>
-              </a:defRPr>
-            </a:lvl4pPr>
-            <a:lvl5pPr marL="1828800" indent="0" algn="l" defTabSz="914400" rtl="0" eaLnBrk="1" fontAlgn="auto" latinLnBrk="0" hangingPunct="1">
-              <a:lnSpc>
-                <a:spcPct val="130000"/>
-              </a:lnSpc>
-              <a:spcBef>
-                <a:spcPts val="0"/>
-              </a:spcBef>
-              <a:spcAft>
-                <a:spcPts val="1000"/>
-              </a:spcAft>
-              <a:buFont typeface="Arial" panose="020B0604020202020204" pitchFamily="34" charset="0"/>
-              <a:buNone/>
-              <a:defRPr sz="1600" u="none" strike="noStrike" kern="1200" cap="none" spc="150" normalizeH="0" baseline="0">
-                <a:solidFill>
-                  <a:schemeClr val="tx1">
-                    <a:tint val="75000"/>
-                  </a:schemeClr>
-                </a:solidFill>
-                <a:uFillTx/>
-                <a:latin typeface="+mn-lt"/>
-                <a:ea typeface="+mn-ea"/>
-                <a:cs typeface="+mn-cs"/>
-              </a:defRPr>
-            </a:lvl5pPr>
-            <a:lvl6pPr marL="2286000" indent="0" algn="l" defTabSz="914400" rtl="0" eaLnBrk="1" latinLnBrk="0" hangingPunct="1">
-              <a:lnSpc>
-                <a:spcPct val="90000"/>
-              </a:lnSpc>
-              <a:spcBef>
-                <a:spcPts val="500"/>
-              </a:spcBef>
-              <a:buFont typeface="Arial" panose="020B0604020202020204" pitchFamily="34" charset="0"/>
-              <a:buNone/>
-              <a:defRPr sz="1600" kern="1200">
-                <a:solidFill>
-                  <a:schemeClr val="tx1">
-                    <a:tint val="75000"/>
-                  </a:schemeClr>
-                </a:solidFill>
-                <a:latin typeface="+mn-lt"/>
-                <a:ea typeface="+mn-ea"/>
-                <a:cs typeface="+mn-cs"/>
-              </a:defRPr>
-            </a:lvl6pPr>
-            <a:lvl7pPr marL="2743200" indent="0" algn="l" defTabSz="914400" rtl="0" eaLnBrk="1" latinLnBrk="0" hangingPunct="1">
-              <a:lnSpc>
-                <a:spcPct val="90000"/>
-              </a:lnSpc>
-              <a:spcBef>
-                <a:spcPts val="500"/>
-              </a:spcBef>
-              <a:buFont typeface="Arial" panose="020B0604020202020204" pitchFamily="34" charset="0"/>
-              <a:buNone/>
-              <a:defRPr sz="1600" kern="1200">
-                <a:solidFill>
-                  <a:schemeClr val="tx1">
-                    <a:tint val="75000"/>
-                  </a:schemeClr>
-                </a:solidFill>
-                <a:latin typeface="+mn-lt"/>
-                <a:ea typeface="+mn-ea"/>
-                <a:cs typeface="+mn-cs"/>
-              </a:defRPr>
-            </a:lvl7pPr>
-            <a:lvl8pPr marL="3200400" indent="0" algn="l" defTabSz="914400" rtl="0" eaLnBrk="1" latinLnBrk="0" hangingPunct="1">
-              <a:lnSpc>
-                <a:spcPct val="90000"/>
-              </a:lnSpc>
-              <a:spcBef>
-                <a:spcPts val="500"/>
-              </a:spcBef>
-              <a:buFont typeface="Arial" panose="020B0604020202020204" pitchFamily="34" charset="0"/>
-              <a:buNone/>
-              <a:defRPr sz="1600" kern="1200">
-                <a:solidFill>
-                  <a:schemeClr val="tx1">
-                    <a:tint val="75000"/>
-                  </a:schemeClr>
-                </a:solidFill>
-                <a:latin typeface="+mn-lt"/>
-                <a:ea typeface="+mn-ea"/>
-                <a:cs typeface="+mn-cs"/>
-              </a:defRPr>
-            </a:lvl8pPr>
-            <a:lvl9pPr marL="3657600" indent="0" algn="l" defTabSz="914400" rtl="0" eaLnBrk="1" latinLnBrk="0" hangingPunct="1">
-              <a:lnSpc>
-                <a:spcPct val="90000"/>
-              </a:lnSpc>
-              <a:spcBef>
-                <a:spcPts val="500"/>
-              </a:spcBef>
-              <a:buFont typeface="Arial" panose="020B0604020202020204" pitchFamily="34" charset="0"/>
-              <a:buNone/>
-              <a:defRPr sz="1600" kern="1200">
-                <a:solidFill>
-                  <a:schemeClr val="tx1">
-                    <a:tint val="75000"/>
-                  </a:schemeClr>
-                </a:solidFill>
-                <a:latin typeface="+mn-lt"/>
-                <a:ea typeface="+mn-ea"/>
-                <a:cs typeface="+mn-cs"/>
-              </a:defRPr>
-            </a:lvl9pPr>
-          </a:lstStyle>
-          <a:p>
-            <a:pPr marL="285750" indent="-285750">
-              <a:buFont typeface="Arial" panose="020B0604020202020204" pitchFamily="34" charset="0"/>
-              <a:buChar char="•"/>
-            </a:pPr>
-            <a:r>
-              <a:rPr lang="zh-CN" altLang="en-US" dirty="0"/>
-              <a:t>我们发现“识别手写数字“使用交叉熵损失函数后，训练速度反而变慢了，为什么？</a:t>
-            </a:r>
-            <a:endParaRPr lang="en-US" altLang="zh-CN" dirty="0"/>
-          </a:p>
-          <a:p>
-            <a:pPr marL="285750" indent="-285750">
-              <a:buFont typeface="Arial" panose="020B0604020202020204" pitchFamily="34" charset="0"/>
-              <a:buChar char="•"/>
-            </a:pPr>
-            <a:endParaRPr lang="en-US" altLang="zh-CN" dirty="0"/>
-          </a:p>
-          <a:p>
             <a:endParaRPr lang="en-US" altLang="zh-CN" dirty="0"/>
           </a:p>
           <a:p>
@@ -9288,10 +8388,10 @@
       </p:sp>
       <p:pic>
         <p:nvPicPr>
-          <p:cNvPr id="4" name="图片 3">
+          <p:cNvPr id="2" name="图片 1">
             <a:extLst>
               <a:ext uri="{FF2B5EF4-FFF2-40B4-BE49-F238E27FC236}">
-                <a16:creationId xmlns:a16="http://schemas.microsoft.com/office/drawing/2014/main" id="{DA9A95A2-654F-69BE-D86D-77F7524B8C8B}"/>
+                <a16:creationId xmlns:a16="http://schemas.microsoft.com/office/drawing/2014/main" id="{B87E7FC2-A0DD-3B00-1944-360F67FB1FE3}"/>
               </a:ext>
             </a:extLst>
           </p:cNvPr>
@@ -9314,7 +8414,7 @@
         </p:blipFill>
         <p:spPr>
           <a:xfrm>
-            <a:off x="5573975" y="2456333"/>
+            <a:off x="7724819" y="1933544"/>
             <a:ext cx="3797300" cy="2146300"/>
           </a:xfrm>
           <a:prstGeom prst="rect">
@@ -9326,10 +8426,10 @@
         <mc:Choice xmlns:a14="http://schemas.microsoft.com/office/drawing/2010/main" Requires="a14">
           <p:sp>
             <p:nvSpPr>
-              <p:cNvPr id="5" name="文本框 4">
+              <p:cNvPr id="4" name="文本框 3">
                 <a:extLst>
                   <a:ext uri="{FF2B5EF4-FFF2-40B4-BE49-F238E27FC236}">
-                    <a16:creationId xmlns:a16="http://schemas.microsoft.com/office/drawing/2014/main" id="{4A8BDA47-593C-9B1E-4EF2-4EEA29083E4A}"/>
+                    <a16:creationId xmlns:a16="http://schemas.microsoft.com/office/drawing/2014/main" id="{5E778358-F638-2004-B96B-7B4A36E04CC5}"/>
                   </a:ext>
                 </a:extLst>
               </p:cNvPr>
@@ -9338,7 +8438,7 @@
             </p:nvSpPr>
             <p:spPr>
               <a:xfrm>
-                <a:off x="1326383" y="4602633"/>
+                <a:off x="1537398" y="4568929"/>
                 <a:ext cx="8881310" cy="1640962"/>
               </a:xfrm>
               <a:prstGeom prst="rect">
@@ -9507,10 +8607,10 @@
         <mc:Fallback>
           <p:sp>
             <p:nvSpPr>
-              <p:cNvPr id="5" name="文本框 4">
+              <p:cNvPr id="4" name="文本框 3">
                 <a:extLst>
                   <a:ext uri="{FF2B5EF4-FFF2-40B4-BE49-F238E27FC236}">
-                    <a16:creationId xmlns:a16="http://schemas.microsoft.com/office/drawing/2014/main" id="{4A8BDA47-593C-9B1E-4EF2-4EEA29083E4A}"/>
+                    <a16:creationId xmlns:a16="http://schemas.microsoft.com/office/drawing/2014/main" id="{5E778358-F638-2004-B96B-7B4A36E04CC5}"/>
                   </a:ext>
                 </a:extLst>
               </p:cNvPr>
@@ -9521,7 +8621,7 @@
             </p:nvSpPr>
             <p:spPr>
               <a:xfrm>
-                <a:off x="1326383" y="4602633"/>
+                <a:off x="1537398" y="4568929"/>
                 <a:ext cx="8881310" cy="1640962"/>
               </a:xfrm>
               <a:prstGeom prst="rect">
@@ -9530,7 +8630,7 @@
               <a:blipFill>
                 <a:blip r:embed="rId4"/>
                 <a:stretch>
-                  <a:fillRect l="-571" t="-1538" b="-5385"/>
+                  <a:fillRect l="-428" t="-1527" b="-4580"/>
                 </a:stretch>
               </a:blipFill>
             </p:spPr>
@@ -9555,7 +8655,7 @@
     </p:custDataLst>
     <p:extLst>
       <p:ext uri="{BB962C8B-B14F-4D97-AF65-F5344CB8AC3E}">
-        <p14:creationId xmlns:p14="http://schemas.microsoft.com/office/powerpoint/2010/main" val="2626747040"/>
+        <p14:creationId xmlns:p14="http://schemas.microsoft.com/office/powerpoint/2010/main" val="3794217102"/>
       </p:ext>
     </p:extLst>
   </p:cSld>
@@ -9643,7 +8743,7 @@
 </p:sld>
 </file>
 
-<file path=ppt/slides/slide17.xml><?xml version="1.0" encoding="utf-8"?>
+<file path=ppt/slides/slide15.xml><?xml version="1.0" encoding="utf-8"?>
 <p:sld xmlns:a="http://schemas.openxmlformats.org/drawingml/2006/main" xmlns:r="http://schemas.openxmlformats.org/officeDocument/2006/relationships" xmlns:p="http://schemas.openxmlformats.org/presentationml/2006/main">
   <p:cSld>
     <p:spTree>
@@ -10279,7 +9379,7 @@
 </p:sld>
 </file>
 
-<file path=ppt/slides/slide18.xml><?xml version="1.0" encoding="utf-8"?>
+<file path=ppt/slides/slide16.xml><?xml version="1.0" encoding="utf-8"?>
 <p:sld xmlns:a="http://schemas.openxmlformats.org/drawingml/2006/main" xmlns:r="http://schemas.openxmlformats.org/officeDocument/2006/relationships" xmlns:p="http://schemas.openxmlformats.org/presentationml/2006/main">
   <p:cSld>
     <p:spTree>
@@ -10892,7 +9992,7 @@
 </p:sld>
 </file>
 
-<file path=ppt/slides/slide19.xml><?xml version="1.0" encoding="utf-8"?>
+<file path=ppt/slides/slide17.xml><?xml version="1.0" encoding="utf-8"?>
 <p:sld xmlns:a="http://schemas.openxmlformats.org/drawingml/2006/main" xmlns:r="http://schemas.openxmlformats.org/officeDocument/2006/relationships" xmlns:p="http://schemas.openxmlformats.org/presentationml/2006/main">
   <p:cSld>
     <p:spTree>
@@ -11657,77 +10757,7 @@
 </p:sld>
 </file>
 
-<file path=ppt/slides/slide2.xml><?xml version="1.0" encoding="utf-8"?>
-<p:sld xmlns:a="http://schemas.openxmlformats.org/drawingml/2006/main" xmlns:r="http://schemas.openxmlformats.org/officeDocument/2006/relationships" xmlns:p="http://schemas.openxmlformats.org/presentationml/2006/main">
-  <p:cSld>
-    <p:spTree>
-      <p:nvGrpSpPr>
-        <p:cNvPr id="1" name=""/>
-        <p:cNvGrpSpPr/>
-        <p:nvPr/>
-      </p:nvGrpSpPr>
-      <p:grpSpPr>
-        <a:xfrm>
-          <a:off x="0" y="0"/>
-          <a:ext cx="0" cy="0"/>
-          <a:chOff x="0" y="0"/>
-          <a:chExt cx="0" cy="0"/>
-        </a:xfrm>
-      </p:grpSpPr>
-      <p:sp>
-        <p:nvSpPr>
-          <p:cNvPr id="2" name="标题 1"/>
-          <p:cNvSpPr>
-            <a:spLocks noGrp="1"/>
-          </p:cNvSpPr>
-          <p:nvPr>
-            <p:ph type="title"/>
-          </p:nvPr>
-        </p:nvSpPr>
-        <p:spPr>
-          <a:xfrm>
-            <a:off x="669882" y="2108221"/>
-            <a:ext cx="10852237" cy="899167"/>
-          </a:xfrm>
-        </p:spPr>
-        <p:txBody>
-          <a:bodyPr/>
-          <a:lstStyle/>
-          <a:p>
-            <a:r>
-              <a:rPr lang="zh-CN" altLang="en-US" dirty="0"/>
-              <a:t>第六节课：</a:t>
-            </a:r>
-            <a:br>
-              <a:rPr lang="en-US" altLang="zh-CN" dirty="0"/>
-            </a:br>
-            <a:r>
-              <a:rPr lang="zh-CN" altLang="en-US" dirty="0"/>
-              <a:t>使用交叉熵损失函数和</a:t>
-            </a:r>
-            <a:r>
-              <a:rPr lang="en-US" altLang="zh-CN" dirty="0" err="1"/>
-              <a:t>Softmax</a:t>
-            </a:r>
-            <a:r>
-              <a:rPr lang="zh-CN" altLang="en-US" dirty="0"/>
-              <a:t>激活函数</a:t>
-            </a:r>
-          </a:p>
-        </p:txBody>
-      </p:sp>
-    </p:spTree>
-    <p:custDataLst>
-      <p:tags r:id="rId1"/>
-    </p:custDataLst>
-  </p:cSld>
-  <p:clrMapOvr>
-    <a:masterClrMapping/>
-  </p:clrMapOvr>
-</p:sld>
-</file>
-
-<file path=ppt/slides/slide20.xml><?xml version="1.0" encoding="utf-8"?>
+<file path=ppt/slides/slide18.xml><?xml version="1.0" encoding="utf-8"?>
 <p:sld xmlns:a="http://schemas.openxmlformats.org/drawingml/2006/main" xmlns:r="http://schemas.openxmlformats.org/officeDocument/2006/relationships" xmlns:p="http://schemas.openxmlformats.org/presentationml/2006/main">
   <p:cSld>
     <p:spTree>
@@ -11832,7 +10862,7 @@
 </p:sld>
 </file>
 
-<file path=ppt/slides/slide21.xml><?xml version="1.0" encoding="utf-8"?>
+<file path=ppt/slides/slide19.xml><?xml version="1.0" encoding="utf-8"?>
 <p:sld xmlns:a="http://schemas.openxmlformats.org/drawingml/2006/main" xmlns:r="http://schemas.openxmlformats.org/officeDocument/2006/relationships" xmlns:p="http://schemas.openxmlformats.org/presentationml/2006/main">
   <p:cSld>
     <p:spTree>
@@ -11901,7 +10931,77 @@
 </p:sld>
 </file>
 
-<file path=ppt/slides/slide22.xml><?xml version="1.0" encoding="utf-8"?>
+<file path=ppt/slides/slide2.xml><?xml version="1.0" encoding="utf-8"?>
+<p:sld xmlns:a="http://schemas.openxmlformats.org/drawingml/2006/main" xmlns:r="http://schemas.openxmlformats.org/officeDocument/2006/relationships" xmlns:p="http://schemas.openxmlformats.org/presentationml/2006/main">
+  <p:cSld>
+    <p:spTree>
+      <p:nvGrpSpPr>
+        <p:cNvPr id="1" name=""/>
+        <p:cNvGrpSpPr/>
+        <p:nvPr/>
+      </p:nvGrpSpPr>
+      <p:grpSpPr>
+        <a:xfrm>
+          <a:off x="0" y="0"/>
+          <a:ext cx="0" cy="0"/>
+          <a:chOff x="0" y="0"/>
+          <a:chExt cx="0" cy="0"/>
+        </a:xfrm>
+      </p:grpSpPr>
+      <p:sp>
+        <p:nvSpPr>
+          <p:cNvPr id="2" name="标题 1"/>
+          <p:cNvSpPr>
+            <a:spLocks noGrp="1"/>
+          </p:cNvSpPr>
+          <p:nvPr>
+            <p:ph type="title"/>
+          </p:nvPr>
+        </p:nvSpPr>
+        <p:spPr>
+          <a:xfrm>
+            <a:off x="669882" y="2108221"/>
+            <a:ext cx="10852237" cy="899167"/>
+          </a:xfrm>
+        </p:spPr>
+        <p:txBody>
+          <a:bodyPr/>
+          <a:lstStyle/>
+          <a:p>
+            <a:r>
+              <a:rPr lang="zh-CN" altLang="en-US" dirty="0"/>
+              <a:t>第六节课：</a:t>
+            </a:r>
+            <a:br>
+              <a:rPr lang="en-US" altLang="zh-CN" dirty="0"/>
+            </a:br>
+            <a:r>
+              <a:rPr lang="zh-CN" altLang="en-US" dirty="0"/>
+              <a:t>使用交叉熵损失函数和</a:t>
+            </a:r>
+            <a:r>
+              <a:rPr lang="en-US" altLang="zh-CN" dirty="0" err="1"/>
+              <a:t>Softmax</a:t>
+            </a:r>
+            <a:r>
+              <a:rPr lang="zh-CN" altLang="en-US" dirty="0"/>
+              <a:t>激活函数</a:t>
+            </a:r>
+          </a:p>
+        </p:txBody>
+      </p:sp>
+    </p:spTree>
+    <p:custDataLst>
+      <p:tags r:id="rId1"/>
+    </p:custDataLst>
+  </p:cSld>
+  <p:clrMapOvr>
+    <a:masterClrMapping/>
+  </p:clrMapOvr>
+</p:sld>
+</file>
+
+<file path=ppt/slides/slide20.xml><?xml version="1.0" encoding="utf-8"?>
 <p:sld xmlns:a="http://schemas.openxmlformats.org/drawingml/2006/main" xmlns:r="http://schemas.openxmlformats.org/officeDocument/2006/relationships" xmlns:p="http://schemas.openxmlformats.org/presentationml/2006/main">
   <p:cSld>
     <p:spTree>
@@ -11970,7 +11070,7 @@
 </p:sld>
 </file>
 
-<file path=ppt/slides/slide23.xml><?xml version="1.0" encoding="utf-8"?>
+<file path=ppt/slides/slide21.xml><?xml version="1.0" encoding="utf-8"?>
 <p:sld xmlns:a="http://schemas.openxmlformats.org/drawingml/2006/main" xmlns:r="http://schemas.openxmlformats.org/officeDocument/2006/relationships" xmlns:p="http://schemas.openxmlformats.org/presentationml/2006/main">
   <p:cSld>
     <p:spTree>
@@ -12251,6 +11351,25 @@
             <a:endParaRPr lang="en-US" altLang="zh-CN" dirty="0"/>
           </a:p>
           <a:p>
+            <a:pPr marL="285750" indent="-285750">
+              <a:buFont typeface="Arial" panose="020B0604020202020204" pitchFamily="34" charset="0"/>
+              <a:buChar char="•"/>
+            </a:pPr>
+            <a:r>
+              <a:rPr lang="zh-CN" altLang="en-US" dirty="0"/>
+              <a:t>根据交叉熵损失函数和</a:t>
+            </a:r>
+            <a:r>
+              <a:rPr lang="en-US" altLang="zh-CN" dirty="0" err="1"/>
+              <a:t>softmax</a:t>
+            </a:r>
+            <a:r>
+              <a:rPr lang="zh-CN" altLang="en-US" dirty="0"/>
+              <a:t>，推导误差项的过程是什么？</a:t>
+            </a:r>
+            <a:endParaRPr lang="en-US" altLang="zh-CN" dirty="0"/>
+          </a:p>
+          <a:p>
             <a:endParaRPr lang="en-US" altLang="zh-CN" dirty="0"/>
           </a:p>
           <a:p>
@@ -12335,6 +11454,593 @@
     <p:extLst>
       <p:ext uri="{BB962C8B-B14F-4D97-AF65-F5344CB8AC3E}">
         <p14:creationId xmlns:p14="http://schemas.microsoft.com/office/powerpoint/2010/main" val="2536093079"/>
+      </p:ext>
+    </p:extLst>
+  </p:cSld>
+  <p:clrMapOvr>
+    <a:masterClrMapping/>
+  </p:clrMapOvr>
+  <p:timing>
+    <p:tnLst>
+      <p:par>
+        <p:cTn id="1" dur="indefinite" restart="never" nodeType="tmRoot">
+          <p:childTnLst>
+            <p:seq concurrent="1" nextAc="seek">
+              <p:cTn id="2" dur="indefinite" nodeType="mainSeq">
+                <p:childTnLst>
+                  <p:par>
+                    <p:cTn id="3" fill="hold">
+                      <p:stCondLst>
+                        <p:cond delay="indefinite"/>
+                      </p:stCondLst>
+                      <p:childTnLst>
+                        <p:par>
+                          <p:cTn id="4" fill="hold">
+                            <p:stCondLst>
+                              <p:cond delay="0"/>
+                            </p:stCondLst>
+                            <p:childTnLst>
+                              <p:par>
+                                <p:cTn id="5" presetID="1" presetClass="entr" presetSubtype="0" fill="hold" grpId="0" nodeType="clickEffect">
+                                  <p:stCondLst>
+                                    <p:cond delay="0"/>
+                                  </p:stCondLst>
+                                  <p:childTnLst>
+                                    <p:set>
+                                      <p:cBhvr>
+                                        <p:cTn id="6" dur="1" fill="hold">
+                                          <p:stCondLst>
+                                            <p:cond delay="0"/>
+                                          </p:stCondLst>
+                                        </p:cTn>
+                                        <p:tgtEl>
+                                          <p:spTgt spid="6"/>
+                                        </p:tgtEl>
+                                        <p:attrNameLst>
+                                          <p:attrName>style.visibility</p:attrName>
+                                        </p:attrNameLst>
+                                      </p:cBhvr>
+                                      <p:to>
+                                        <p:strVal val="visible"/>
+                                      </p:to>
+                                    </p:set>
+                                  </p:childTnLst>
+                                </p:cTn>
+                              </p:par>
+                            </p:childTnLst>
+                          </p:cTn>
+                        </p:par>
+                      </p:childTnLst>
+                    </p:cTn>
+                  </p:par>
+                </p:childTnLst>
+              </p:cTn>
+              <p:prevCondLst>
+                <p:cond evt="onPrev" delay="0">
+                  <p:tgtEl>
+                    <p:sldTgt/>
+                  </p:tgtEl>
+                </p:cond>
+              </p:prevCondLst>
+              <p:nextCondLst>
+                <p:cond evt="onNext" delay="0">
+                  <p:tgtEl>
+                    <p:sldTgt/>
+                  </p:tgtEl>
+                </p:cond>
+              </p:nextCondLst>
+            </p:seq>
+          </p:childTnLst>
+        </p:cTn>
+      </p:par>
+    </p:tnLst>
+    <p:bldLst>
+      <p:bldP spid="6" grpId="0"/>
+    </p:bldLst>
+  </p:timing>
+</p:sld>
+</file>
+
+<file path=ppt/slides/slide22.xml><?xml version="1.0" encoding="utf-8"?>
+<p:sld xmlns:a="http://schemas.openxmlformats.org/drawingml/2006/main" xmlns:r="http://schemas.openxmlformats.org/officeDocument/2006/relationships" xmlns:p="http://schemas.openxmlformats.org/presentationml/2006/main">
+  <p:cSld>
+    <p:spTree>
+      <p:nvGrpSpPr>
+        <p:cNvPr id="1" name=""/>
+        <p:cNvGrpSpPr/>
+        <p:nvPr/>
+      </p:nvGrpSpPr>
+      <p:grpSpPr>
+        <a:xfrm>
+          <a:off x="0" y="0"/>
+          <a:ext cx="0" cy="0"/>
+          <a:chOff x="0" y="0"/>
+          <a:chExt cx="0" cy="0"/>
+        </a:xfrm>
+      </p:grpSpPr>
+      <p:sp>
+        <p:nvSpPr>
+          <p:cNvPr id="2" name="标题 1"/>
+          <p:cNvSpPr>
+            <a:spLocks noGrp="1"/>
+          </p:cNvSpPr>
+          <p:nvPr>
+            <p:ph type="title"/>
+          </p:nvPr>
+        </p:nvSpPr>
+        <p:spPr/>
+        <p:txBody>
+          <a:bodyPr/>
+          <a:lstStyle/>
+          <a:p>
+            <a:r>
+              <a:rPr lang="zh-CN" altLang="en-US" dirty="0">
+                <a:sym typeface="+mn-ea"/>
+              </a:rPr>
+              <a:t>任务：</a:t>
+            </a:r>
+            <a:br>
+              <a:rPr lang="en-US" altLang="zh-CN" dirty="0">
+                <a:sym typeface="+mn-ea"/>
+              </a:rPr>
+            </a:br>
+            <a:r>
+              <a:rPr lang="zh-CN" altLang="en-US" dirty="0">
+                <a:sym typeface="+mn-ea"/>
+              </a:rPr>
+              <a:t>识别手写数字使用交叉熵损失函数和</a:t>
+            </a:r>
+            <a:r>
+              <a:rPr lang="en-US" altLang="zh-CN" dirty="0" err="1">
+                <a:sym typeface="+mn-ea"/>
+              </a:rPr>
+              <a:t>softmax</a:t>
+            </a:r>
+            <a:r>
+              <a:rPr lang="zh-CN" altLang="en-US" dirty="0">
+                <a:sym typeface="+mn-ea"/>
+              </a:rPr>
+              <a:t>激活函数</a:t>
+            </a:r>
+            <a:endParaRPr lang="zh-CN" altLang="en-US" dirty="0"/>
+          </a:p>
+        </p:txBody>
+      </p:sp>
+    </p:spTree>
+    <p:custDataLst>
+      <p:tags r:id="rId1"/>
+    </p:custDataLst>
+    <p:extLst>
+      <p:ext uri="{BB962C8B-B14F-4D97-AF65-F5344CB8AC3E}">
+        <p14:creationId xmlns:p14="http://schemas.microsoft.com/office/powerpoint/2010/main" val="2557938798"/>
+      </p:ext>
+    </p:extLst>
+  </p:cSld>
+  <p:clrMapOvr>
+    <a:masterClrMapping/>
+  </p:clrMapOvr>
+</p:sld>
+</file>
+
+<file path=ppt/slides/slide23.xml><?xml version="1.0" encoding="utf-8"?>
+<p:sld xmlns:a="http://schemas.openxmlformats.org/drawingml/2006/main" xmlns:r="http://schemas.openxmlformats.org/officeDocument/2006/relationships" xmlns:p="http://schemas.openxmlformats.org/presentationml/2006/main">
+  <p:cSld>
+    <p:spTree>
+      <p:nvGrpSpPr>
+        <p:cNvPr id="1" name=""/>
+        <p:cNvGrpSpPr/>
+        <p:nvPr/>
+      </p:nvGrpSpPr>
+      <p:grpSpPr>
+        <a:xfrm>
+          <a:off x="0" y="0"/>
+          <a:ext cx="0" cy="0"/>
+          <a:chOff x="0" y="0"/>
+          <a:chExt cx="0" cy="0"/>
+        </a:xfrm>
+      </p:grpSpPr>
+      <p:sp>
+        <p:nvSpPr>
+          <p:cNvPr id="3" name="标题 2"/>
+          <p:cNvSpPr>
+            <a:spLocks noGrp="1"/>
+          </p:cNvSpPr>
+          <p:nvPr>
+            <p:ph type="title"/>
+          </p:nvPr>
+        </p:nvSpPr>
+        <p:spPr/>
+        <p:txBody>
+          <a:bodyPr/>
+          <a:lstStyle/>
+          <a:p>
+            <a:r>
+              <a:rPr lang="zh-CN" altLang="en-US" dirty="0">
+                <a:sym typeface="+mn-ea"/>
+              </a:rPr>
+              <a:t>任务：识别手写数字使用交叉熵损失函数和</a:t>
+            </a:r>
+            <a:r>
+              <a:rPr lang="en-US" altLang="zh-CN" dirty="0" err="1">
+                <a:sym typeface="+mn-ea"/>
+              </a:rPr>
+              <a:t>softmax</a:t>
+            </a:r>
+            <a:r>
+              <a:rPr lang="zh-CN" altLang="en-US" dirty="0">
+                <a:sym typeface="+mn-ea"/>
+              </a:rPr>
+              <a:t>激活函数</a:t>
+            </a:r>
+            <a:endParaRPr dirty="0">
+              <a:sym typeface="+mn-ea"/>
+            </a:endParaRPr>
+          </a:p>
+        </p:txBody>
+      </p:sp>
+      <p:sp>
+        <p:nvSpPr>
+          <p:cNvPr id="6" name="文本占位符 1">
+            <a:extLst>
+              <a:ext uri="{FF2B5EF4-FFF2-40B4-BE49-F238E27FC236}">
+                <a16:creationId xmlns:a16="http://schemas.microsoft.com/office/drawing/2014/main" id="{BA88068A-4FDC-6963-46A5-ADEC46CDA15E}"/>
+              </a:ext>
+            </a:extLst>
+          </p:cNvPr>
+          <p:cNvSpPr txBox="1">
+            <a:spLocks/>
+          </p:cNvSpPr>
+          <p:nvPr/>
+        </p:nvSpPr>
+        <p:spPr>
+          <a:xfrm>
+            <a:off x="822325" y="1778635"/>
+            <a:ext cx="10852150" cy="4553585"/>
+          </a:xfrm>
+        </p:spPr>
+        <p:txBody>
+          <a:bodyPr lIns="101600" tIns="38100" rIns="76200" bIns="38100">
+            <a:noAutofit/>
+          </a:bodyPr>
+          <a:lstStyle>
+            <a:lvl1pPr marL="0" indent="0" algn="l" defTabSz="914400" rtl="0" eaLnBrk="1" fontAlgn="auto" latinLnBrk="0" hangingPunct="1">
+              <a:lnSpc>
+                <a:spcPct val="130000"/>
+              </a:lnSpc>
+              <a:spcBef>
+                <a:spcPts val="0"/>
+              </a:spcBef>
+              <a:spcAft>
+                <a:spcPts val="1000"/>
+              </a:spcAft>
+              <a:buFont typeface="Arial" panose="020B0604020202020204" pitchFamily="34" charset="0"/>
+              <a:buNone/>
+              <a:defRPr kumimoji="0" lang="zh-CN" altLang="en-US" sz="1600" b="0" i="0" u="none" strike="noStrike" kern="1200" cap="none" spc="150" normalizeH="0" baseline="0" noProof="1">
+                <a:solidFill>
+                  <a:schemeClr val="tx1"/>
+                </a:solidFill>
+                <a:uFillTx/>
+                <a:latin typeface="+mn-lt"/>
+                <a:ea typeface="+mn-ea"/>
+                <a:cs typeface="+mn-cs"/>
+                <a:sym typeface="+mn-ea"/>
+              </a:defRPr>
+            </a:lvl1pPr>
+            <a:lvl2pPr marL="457200" indent="0" algn="l" defTabSz="914400" rtl="0" eaLnBrk="1" fontAlgn="auto" latinLnBrk="0" hangingPunct="1">
+              <a:lnSpc>
+                <a:spcPct val="130000"/>
+              </a:lnSpc>
+              <a:spcBef>
+                <a:spcPts val="0"/>
+              </a:spcBef>
+              <a:spcAft>
+                <a:spcPts val="1000"/>
+              </a:spcAft>
+              <a:buFont typeface="Arial" panose="020B0604020202020204" pitchFamily="34" charset="0"/>
+              <a:buNone/>
+              <a:tabLst>
+                <a:tab pos="1609725" algn="l"/>
+              </a:tabLst>
+              <a:defRPr sz="2000" u="none" strike="noStrike" kern="1200" cap="none" spc="150" normalizeH="0" baseline="0">
+                <a:solidFill>
+                  <a:schemeClr val="tx1">
+                    <a:tint val="75000"/>
+                  </a:schemeClr>
+                </a:solidFill>
+                <a:uFillTx/>
+                <a:latin typeface="+mn-lt"/>
+                <a:ea typeface="+mn-ea"/>
+                <a:cs typeface="+mn-cs"/>
+              </a:defRPr>
+            </a:lvl2pPr>
+            <a:lvl3pPr marL="914400" indent="0" algn="l" defTabSz="914400" rtl="0" eaLnBrk="1" fontAlgn="auto" latinLnBrk="0" hangingPunct="1">
+              <a:lnSpc>
+                <a:spcPct val="130000"/>
+              </a:lnSpc>
+              <a:spcBef>
+                <a:spcPts val="0"/>
+              </a:spcBef>
+              <a:spcAft>
+                <a:spcPts val="1000"/>
+              </a:spcAft>
+              <a:buFont typeface="Arial" panose="020B0604020202020204" pitchFamily="34" charset="0"/>
+              <a:buNone/>
+              <a:defRPr sz="1800" u="none" strike="noStrike" kern="1200" cap="none" spc="150" normalizeH="0" baseline="0">
+                <a:solidFill>
+                  <a:schemeClr val="tx1">
+                    <a:tint val="75000"/>
+                  </a:schemeClr>
+                </a:solidFill>
+                <a:uFillTx/>
+                <a:latin typeface="+mn-lt"/>
+                <a:ea typeface="+mn-ea"/>
+                <a:cs typeface="+mn-cs"/>
+              </a:defRPr>
+            </a:lvl3pPr>
+            <a:lvl4pPr marL="1371600" indent="0" algn="l" defTabSz="914400" rtl="0" eaLnBrk="1" fontAlgn="auto" latinLnBrk="0" hangingPunct="1">
+              <a:lnSpc>
+                <a:spcPct val="130000"/>
+              </a:lnSpc>
+              <a:spcBef>
+                <a:spcPts val="0"/>
+              </a:spcBef>
+              <a:spcAft>
+                <a:spcPts val="1000"/>
+              </a:spcAft>
+              <a:buFont typeface="Arial" panose="020B0604020202020204" pitchFamily="34" charset="0"/>
+              <a:buNone/>
+              <a:defRPr sz="1600" u="none" strike="noStrike" kern="1200" cap="none" spc="150" normalizeH="0" baseline="0">
+                <a:solidFill>
+                  <a:schemeClr val="tx1">
+                    <a:tint val="75000"/>
+                  </a:schemeClr>
+                </a:solidFill>
+                <a:uFillTx/>
+                <a:latin typeface="+mn-lt"/>
+                <a:ea typeface="+mn-ea"/>
+                <a:cs typeface="+mn-cs"/>
+              </a:defRPr>
+            </a:lvl4pPr>
+            <a:lvl5pPr marL="1828800" indent="0" algn="l" defTabSz="914400" rtl="0" eaLnBrk="1" fontAlgn="auto" latinLnBrk="0" hangingPunct="1">
+              <a:lnSpc>
+                <a:spcPct val="130000"/>
+              </a:lnSpc>
+              <a:spcBef>
+                <a:spcPts val="0"/>
+              </a:spcBef>
+              <a:spcAft>
+                <a:spcPts val="1000"/>
+              </a:spcAft>
+              <a:buFont typeface="Arial" panose="020B0604020202020204" pitchFamily="34" charset="0"/>
+              <a:buNone/>
+              <a:defRPr sz="1600" u="none" strike="noStrike" kern="1200" cap="none" spc="150" normalizeH="0" baseline="0">
+                <a:solidFill>
+                  <a:schemeClr val="tx1">
+                    <a:tint val="75000"/>
+                  </a:schemeClr>
+                </a:solidFill>
+                <a:uFillTx/>
+                <a:latin typeface="+mn-lt"/>
+                <a:ea typeface="+mn-ea"/>
+                <a:cs typeface="+mn-cs"/>
+              </a:defRPr>
+            </a:lvl5pPr>
+            <a:lvl6pPr marL="2286000" indent="0" algn="l" defTabSz="914400" rtl="0" eaLnBrk="1" latinLnBrk="0" hangingPunct="1">
+              <a:lnSpc>
+                <a:spcPct val="90000"/>
+              </a:lnSpc>
+              <a:spcBef>
+                <a:spcPts val="500"/>
+              </a:spcBef>
+              <a:buFont typeface="Arial" panose="020B0604020202020204" pitchFamily="34" charset="0"/>
+              <a:buNone/>
+              <a:defRPr sz="1600" kern="1200">
+                <a:solidFill>
+                  <a:schemeClr val="tx1">
+                    <a:tint val="75000"/>
+                  </a:schemeClr>
+                </a:solidFill>
+                <a:latin typeface="+mn-lt"/>
+                <a:ea typeface="+mn-ea"/>
+                <a:cs typeface="+mn-cs"/>
+              </a:defRPr>
+            </a:lvl6pPr>
+            <a:lvl7pPr marL="2743200" indent="0" algn="l" defTabSz="914400" rtl="0" eaLnBrk="1" latinLnBrk="0" hangingPunct="1">
+              <a:lnSpc>
+                <a:spcPct val="90000"/>
+              </a:lnSpc>
+              <a:spcBef>
+                <a:spcPts val="500"/>
+              </a:spcBef>
+              <a:buFont typeface="Arial" panose="020B0604020202020204" pitchFamily="34" charset="0"/>
+              <a:buNone/>
+              <a:defRPr sz="1600" kern="1200">
+                <a:solidFill>
+                  <a:schemeClr val="tx1">
+                    <a:tint val="75000"/>
+                  </a:schemeClr>
+                </a:solidFill>
+                <a:latin typeface="+mn-lt"/>
+                <a:ea typeface="+mn-ea"/>
+                <a:cs typeface="+mn-cs"/>
+              </a:defRPr>
+            </a:lvl7pPr>
+            <a:lvl8pPr marL="3200400" indent="0" algn="l" defTabSz="914400" rtl="0" eaLnBrk="1" latinLnBrk="0" hangingPunct="1">
+              <a:lnSpc>
+                <a:spcPct val="90000"/>
+              </a:lnSpc>
+              <a:spcBef>
+                <a:spcPts val="500"/>
+              </a:spcBef>
+              <a:buFont typeface="Arial" panose="020B0604020202020204" pitchFamily="34" charset="0"/>
+              <a:buNone/>
+              <a:defRPr sz="1600" kern="1200">
+                <a:solidFill>
+                  <a:schemeClr val="tx1">
+                    <a:tint val="75000"/>
+                  </a:schemeClr>
+                </a:solidFill>
+                <a:latin typeface="+mn-lt"/>
+                <a:ea typeface="+mn-ea"/>
+                <a:cs typeface="+mn-cs"/>
+              </a:defRPr>
+            </a:lvl8pPr>
+            <a:lvl9pPr marL="3657600" indent="0" algn="l" defTabSz="914400" rtl="0" eaLnBrk="1" latinLnBrk="0" hangingPunct="1">
+              <a:lnSpc>
+                <a:spcPct val="90000"/>
+              </a:lnSpc>
+              <a:spcBef>
+                <a:spcPts val="500"/>
+              </a:spcBef>
+              <a:buFont typeface="Arial" panose="020B0604020202020204" pitchFamily="34" charset="0"/>
+              <a:buNone/>
+              <a:defRPr sz="1600" kern="1200">
+                <a:solidFill>
+                  <a:schemeClr val="tx1">
+                    <a:tint val="75000"/>
+                  </a:schemeClr>
+                </a:solidFill>
+                <a:latin typeface="+mn-lt"/>
+                <a:ea typeface="+mn-ea"/>
+                <a:cs typeface="+mn-cs"/>
+              </a:defRPr>
+            </a:lvl9pPr>
+          </a:lstStyle>
+          <a:p>
+            <a:pPr marL="285750" indent="-285750">
+              <a:buFont typeface="Arial" panose="020B0604020202020204" pitchFamily="34" charset="0"/>
+              <a:buChar char="•"/>
+            </a:pPr>
+            <a:r>
+              <a:rPr lang="zh-CN" altLang="en-US" dirty="0"/>
+              <a:t>请实现代码，并且加入“通过打印</a:t>
+            </a:r>
+            <a:r>
+              <a:rPr lang="en-US" altLang="zh-CN" dirty="0"/>
+              <a:t>loss</a:t>
+            </a:r>
+            <a:r>
+              <a:rPr lang="zh-CN" altLang="en-US" dirty="0"/>
+              <a:t>来判断收敛”</a:t>
+            </a:r>
+            <a:endParaRPr lang="en-US" altLang="zh-CN" dirty="0"/>
+          </a:p>
+          <a:p>
+            <a:pPr marL="285750" indent="-285750">
+              <a:buFont typeface="Arial" panose="020B0604020202020204" pitchFamily="34" charset="0"/>
+              <a:buChar char="•"/>
+            </a:pPr>
+            <a:r>
+              <a:rPr lang="zh-CN" altLang="en-US" dirty="0"/>
+              <a:t>请每个同学运行代码</a:t>
+            </a:r>
+            <a:endParaRPr lang="en-US" altLang="zh-CN" dirty="0"/>
+          </a:p>
+          <a:p>
+            <a:pPr marL="742950" lvl="1" indent="-285750">
+              <a:buFont typeface="Arial" panose="020B0604020202020204" pitchFamily="34" charset="0"/>
+              <a:buChar char="•"/>
+            </a:pPr>
+            <a:r>
+              <a:rPr lang="zh-CN" altLang="en-US" dirty="0"/>
+              <a:t>刚开始训练时，有什么警告？</a:t>
+            </a:r>
+            <a:endParaRPr lang="en-US" altLang="zh-CN" dirty="0"/>
+          </a:p>
+          <a:p>
+            <a:pPr marL="742950" lvl="1" indent="-285750">
+              <a:buFont typeface="Arial" panose="020B0604020202020204" pitchFamily="34" charset="0"/>
+              <a:buChar char="•"/>
+            </a:pPr>
+            <a:r>
+              <a:rPr lang="zh-CN" altLang="en-US" dirty="0"/>
+              <a:t>注释掉警告代码后，看下</a:t>
+            </a:r>
+            <a:r>
+              <a:rPr lang="en-US" altLang="zh-CN" dirty="0"/>
+              <a:t>loss</a:t>
+            </a:r>
+            <a:r>
+              <a:rPr lang="zh-CN" altLang="en-US" dirty="0"/>
+              <a:t>的训练速度与之前的代码相比是否明显加快？</a:t>
+            </a:r>
+            <a:endParaRPr lang="en-US" altLang="zh-CN" dirty="0"/>
+          </a:p>
+          <a:p>
+            <a:pPr marL="742950" lvl="1" indent="-285750">
+              <a:buFont typeface="Arial" panose="020B0604020202020204" pitchFamily="34" charset="0"/>
+              <a:buChar char="•"/>
+            </a:pPr>
+            <a:endParaRPr lang="en-US" altLang="zh-CN" dirty="0"/>
+          </a:p>
+          <a:p>
+            <a:pPr marL="285750" indent="-285750">
+              <a:buFont typeface="Arial" panose="020B0604020202020204" pitchFamily="34" charset="0"/>
+              <a:buChar char="•"/>
+            </a:pPr>
+            <a:r>
+              <a:rPr lang="zh-CN" altLang="en-US" dirty="0"/>
+              <a:t>自学、展学</a:t>
+            </a:r>
+          </a:p>
+          <a:p>
+            <a:pPr marL="285750" indent="-285750">
+              <a:buFont typeface="Arial" panose="020B0604020202020204" pitchFamily="34" charset="0"/>
+              <a:buChar char="•"/>
+            </a:pPr>
+            <a:endParaRPr lang="zh-CN" altLang="en-US" dirty="0"/>
+          </a:p>
+          <a:p>
+            <a:pPr marL="285750" indent="-285750">
+              <a:buFont typeface="Arial" panose="020B0604020202020204" pitchFamily="34" charset="0"/>
+              <a:buChar char="•"/>
+            </a:pPr>
+            <a:endParaRPr lang="zh-CN" altLang="en-US" dirty="0"/>
+          </a:p>
+          <a:p>
+            <a:pPr marL="285750" indent="-285750">
+              <a:buFont typeface="Arial" panose="020B0604020202020204" pitchFamily="34" charset="0"/>
+              <a:buChar char="•"/>
+            </a:pPr>
+            <a:endParaRPr lang="zh-CN" altLang="en-US" dirty="0"/>
+          </a:p>
+          <a:p>
+            <a:pPr marL="285750" indent="-285750">
+              <a:buFont typeface="Arial" panose="020B0604020202020204" pitchFamily="34" charset="0"/>
+              <a:buChar char="•"/>
+            </a:pPr>
+            <a:endParaRPr lang="zh-CN" altLang="en-US" dirty="0"/>
+          </a:p>
+          <a:p>
+            <a:pPr marL="285750" indent="-285750">
+              <a:buFont typeface="Arial" panose="020B0604020202020204" pitchFamily="34" charset="0"/>
+              <a:buChar char="•"/>
+            </a:pPr>
+            <a:endParaRPr lang="zh-CN" altLang="en-US" dirty="0"/>
+          </a:p>
+          <a:p>
+            <a:pPr marL="285750" indent="-285750">
+              <a:buFont typeface="Arial" panose="020B0604020202020204" pitchFamily="34" charset="0"/>
+              <a:buChar char="•"/>
+            </a:pPr>
+            <a:endParaRPr lang="zh-CN" altLang="en-US" dirty="0"/>
+          </a:p>
+          <a:p>
+            <a:pPr marL="285750" indent="-285750">
+              <a:buFont typeface="Arial" panose="020B0604020202020204" pitchFamily="34" charset="0"/>
+              <a:buChar char="•"/>
+            </a:pPr>
+            <a:endParaRPr lang="zh-CN" altLang="en-US" dirty="0"/>
+          </a:p>
+        </p:txBody>
+      </p:sp>
+    </p:spTree>
+    <p:custDataLst>
+      <p:tags r:id="rId1"/>
+    </p:custDataLst>
+    <p:extLst>
+      <p:ext uri="{BB962C8B-B14F-4D97-AF65-F5344CB8AC3E}">
+        <p14:creationId xmlns:p14="http://schemas.microsoft.com/office/powerpoint/2010/main" val="3391474740"/>
       </p:ext>
     </p:extLst>
   </p:cSld>
@@ -12460,30 +12166,10 @@
               </a:rPr>
               <a:t>任务：</a:t>
             </a:r>
-            <a:br>
-              <a:rPr lang="en-US" altLang="zh-CN" dirty="0">
-                <a:sym typeface="+mn-ea"/>
-              </a:rPr>
-            </a:br>
-            <a:r>
-              <a:rPr lang="zh-CN" altLang="en-US" dirty="0">
-                <a:sym typeface="+mn-ea"/>
-              </a:rPr>
-              <a:t>识别手写数字使用交叉熵损失函数和</a:t>
-            </a:r>
-            <a:r>
-              <a:rPr lang="en-US" altLang="zh-CN" dirty="0" err="1">
-                <a:sym typeface="+mn-ea"/>
-              </a:rPr>
-              <a:t>softmax</a:t>
-            </a:r>
-            <a:r>
-              <a:rPr lang="zh-CN" altLang="en-US" dirty="0">
-                <a:sym typeface="+mn-ea"/>
-              </a:rPr>
-              <a:t>激活函数</a:t>
-            </a:r>
-            <a:endParaRPr lang="zh-CN" altLang="en-US" dirty="0"/>
+            <a:r>
+              <a:rPr lang="zh-CN" altLang="en-US" dirty="0"/>
+              <a:t>改进代码</a:t>
+            </a:r>
           </a:p>
         </p:txBody>
       </p:sp>
@@ -12493,7 +12179,7 @@
     </p:custDataLst>
     <p:extLst>
       <p:ext uri="{BB962C8B-B14F-4D97-AF65-F5344CB8AC3E}">
-        <p14:creationId xmlns:p14="http://schemas.microsoft.com/office/powerpoint/2010/main" val="2557938798"/>
+        <p14:creationId xmlns:p14="http://schemas.microsoft.com/office/powerpoint/2010/main" val="2400914644"/>
       </p:ext>
     </p:extLst>
   </p:cSld>
@@ -12539,19 +12225,11 @@
               <a:rPr lang="zh-CN" altLang="en-US" dirty="0">
                 <a:sym typeface="+mn-ea"/>
               </a:rPr>
-              <a:t>任务：识别手写数字使用交叉熵损失函数和</a:t>
-            </a:r>
-            <a:r>
-              <a:rPr lang="en-US" altLang="zh-CN" dirty="0" err="1">
-                <a:sym typeface="+mn-ea"/>
-              </a:rPr>
-              <a:t>softmax</a:t>
-            </a:r>
-            <a:r>
-              <a:rPr lang="zh-CN" altLang="en-US" dirty="0">
-                <a:sym typeface="+mn-ea"/>
-              </a:rPr>
-              <a:t>激活函数</a:t>
+              <a:t>任务：</a:t>
+            </a:r>
+            <a:r>
+              <a:rPr lang="zh-CN" altLang="en-US" dirty="0"/>
+              <a:t>改进代码</a:t>
             </a:r>
             <a:endParaRPr dirty="0">
               <a:sym typeface="+mn-ea"/>
@@ -12794,7 +12472,7 @@
             </a:pPr>
             <a:r>
               <a:rPr lang="zh-CN" altLang="en-US" dirty="0"/>
-              <a:t>请实现代码</a:t>
+              <a:t>找到发生警告的原因？</a:t>
             </a:r>
             <a:endParaRPr lang="en-US" altLang="zh-CN" dirty="0"/>
           </a:p>
@@ -12805,42 +12483,42 @@
             </a:pPr>
             <a:r>
               <a:rPr lang="zh-CN" altLang="en-US" dirty="0"/>
-              <a:t>请每个同学运行代码</a:t>
+              <a:t>如何改进代码？</a:t>
             </a:r>
             <a:endParaRPr lang="en-US" altLang="zh-CN" dirty="0"/>
           </a:p>
           <a:p>
-            <a:pPr marL="742950" lvl="1" indent="-285750">
+            <a:pPr marL="285750" indent="-285750">
               <a:buFont typeface="Arial" panose="020B0604020202020204" pitchFamily="34" charset="0"/>
               <a:buChar char="•"/>
             </a:pPr>
             <a:r>
               <a:rPr lang="zh-CN" altLang="en-US" dirty="0"/>
-              <a:t>有无警告？</a:t>
+              <a:t>将输出层的学习率分别变小为</a:t>
+            </a:r>
+            <a:r>
+              <a:rPr lang="en-US" altLang="zh-CN" dirty="0"/>
+              <a:t>1.0</a:t>
+            </a:r>
+            <a:r>
+              <a:rPr lang="zh-CN" altLang="en-US" dirty="0"/>
+              <a:t>、</a:t>
+            </a:r>
+            <a:r>
+              <a:rPr lang="en-US" altLang="zh-CN" dirty="0"/>
+              <a:t>0.1</a:t>
+            </a:r>
+            <a:r>
+              <a:rPr lang="zh-CN" altLang="en-US" dirty="0"/>
+              <a:t>，运行代码，看是否解决了警告，并提升了训练速度？</a:t>
             </a:r>
             <a:endParaRPr lang="en-US" altLang="zh-CN" dirty="0"/>
           </a:p>
           <a:p>
-            <a:pPr marL="742950" lvl="1" indent="-285750">
-              <a:buFont typeface="Arial" panose="020B0604020202020204" pitchFamily="34" charset="0"/>
-              <a:buChar char="•"/>
-            </a:pPr>
-            <a:r>
-              <a:rPr lang="zh-CN" altLang="en-US" dirty="0"/>
-              <a:t>与之前的代码相比，</a:t>
-            </a:r>
-            <a:r>
-              <a:rPr lang="en-US" altLang="zh-CN" dirty="0"/>
-              <a:t>loss</a:t>
-            </a:r>
-            <a:r>
-              <a:rPr lang="zh-CN" altLang="en-US" dirty="0"/>
-              <a:t>的训练速度是否加快？</a:t>
-            </a:r>
             <a:endParaRPr lang="en-US" altLang="zh-CN" dirty="0"/>
           </a:p>
           <a:p>
-            <a:pPr marL="742950" lvl="1" indent="-285750">
+            <a:pPr marL="285750" indent="-285750">
               <a:buFont typeface="Arial" panose="020B0604020202020204" pitchFamily="34" charset="0"/>
               <a:buChar char="•"/>
             </a:pPr>
@@ -12851,6 +12529,20 @@
               <a:buFont typeface="Arial" panose="020B0604020202020204" pitchFamily="34" charset="0"/>
               <a:buChar char="•"/>
             </a:pPr>
+            <a:endParaRPr lang="en-US" altLang="zh-CN" dirty="0"/>
+          </a:p>
+          <a:p>
+            <a:pPr marL="285750" indent="-285750">
+              <a:buFont typeface="Arial" panose="020B0604020202020204" pitchFamily="34" charset="0"/>
+              <a:buChar char="•"/>
+            </a:pPr>
+            <a:endParaRPr lang="en-US" altLang="zh-CN" dirty="0"/>
+          </a:p>
+          <a:p>
+            <a:pPr marL="285750" indent="-285750">
+              <a:buFont typeface="Arial" panose="020B0604020202020204" pitchFamily="34" charset="0"/>
+              <a:buChar char="•"/>
+            </a:pPr>
             <a:r>
               <a:rPr lang="zh-CN" altLang="en-US" dirty="0"/>
               <a:t>自学、展学</a:t>
@@ -12868,7 +12560,7 @@
               <a:buFont typeface="Arial" panose="020B0604020202020204" pitchFamily="34" charset="0"/>
               <a:buChar char="•"/>
             </a:pPr>
-            <a:endParaRPr lang="zh-CN" altLang="en-US" dirty="0"/>
+            <a:endParaRPr lang="en-US" altLang="zh-CN" dirty="0"/>
           </a:p>
           <a:p>
             <a:pPr marL="285750" indent="-285750">
@@ -12904,6 +12596,103 @@
               <a:buChar char="•"/>
             </a:pPr>
             <a:endParaRPr lang="zh-CN" altLang="en-US" dirty="0"/>
+          </a:p>
+          <a:p>
+            <a:pPr marL="285750" indent="-285750">
+              <a:buFont typeface="Arial" panose="020B0604020202020204" pitchFamily="34" charset="0"/>
+              <a:buChar char="•"/>
+            </a:pPr>
+            <a:endParaRPr lang="zh-CN" altLang="en-US" dirty="0"/>
+          </a:p>
+          <a:p>
+            <a:pPr marL="285750" indent="-285750">
+              <a:buFont typeface="Arial" panose="020B0604020202020204" pitchFamily="34" charset="0"/>
+              <a:buChar char="•"/>
+            </a:pPr>
+            <a:endParaRPr lang="zh-CN" altLang="en-US" dirty="0"/>
+          </a:p>
+        </p:txBody>
+      </p:sp>
+      <p:sp>
+        <p:nvSpPr>
+          <p:cNvPr id="2" name="文本框 1">
+            <a:extLst>
+              <a:ext uri="{FF2B5EF4-FFF2-40B4-BE49-F238E27FC236}">
+                <a16:creationId xmlns:a16="http://schemas.microsoft.com/office/drawing/2014/main" id="{C44CE5FF-F5B7-EE3A-4FA0-0237E0B59B4F}"/>
+              </a:ext>
+            </a:extLst>
+          </p:cNvPr>
+          <p:cNvSpPr txBox="1"/>
+          <p:nvPr/>
+        </p:nvSpPr>
+        <p:spPr>
+          <a:xfrm>
+            <a:off x="3671002" y="1778635"/>
+            <a:ext cx="7851117" cy="369332"/>
+          </a:xfrm>
+          <a:prstGeom prst="rect">
+            <a:avLst/>
+          </a:prstGeom>
+          <a:noFill/>
+        </p:spPr>
+        <p:txBody>
+          <a:bodyPr wrap="square" rtlCol="0">
+            <a:spAutoFit/>
+          </a:bodyPr>
+          <a:lstStyle/>
+          <a:p>
+            <a:r>
+              <a:rPr kumimoji="1" lang="zh-CN" altLang="en-US" dirty="0"/>
+              <a:t>因为刚开始训练时，</a:t>
+            </a:r>
+            <a:r>
+              <a:rPr kumimoji="1" lang="en-US" altLang="zh-CN" dirty="0"/>
+              <a:t>loss</a:t>
+            </a:r>
+            <a:r>
+              <a:rPr kumimoji="1" lang="zh-CN" altLang="en-US" dirty="0"/>
+              <a:t>很大，所以梯度很大，所以报“梯度爆炸”的警告</a:t>
+            </a:r>
+          </a:p>
+        </p:txBody>
+      </p:sp>
+      <p:sp>
+        <p:nvSpPr>
+          <p:cNvPr id="5" name="文本框 4">
+            <a:extLst>
+              <a:ext uri="{FF2B5EF4-FFF2-40B4-BE49-F238E27FC236}">
+                <a16:creationId xmlns:a16="http://schemas.microsoft.com/office/drawing/2014/main" id="{8DAE3D6F-D317-ED35-A24E-93B8C2A03B22}"/>
+              </a:ext>
+            </a:extLst>
+          </p:cNvPr>
+          <p:cNvSpPr txBox="1"/>
+          <p:nvPr/>
+        </p:nvSpPr>
+        <p:spPr>
+          <a:xfrm>
+            <a:off x="3381275" y="2267720"/>
+            <a:ext cx="3240590" cy="369332"/>
+          </a:xfrm>
+          <a:prstGeom prst="rect">
+            <a:avLst/>
+          </a:prstGeom>
+          <a:noFill/>
+        </p:spPr>
+        <p:txBody>
+          <a:bodyPr wrap="square" rtlCol="0">
+            <a:spAutoFit/>
+          </a:bodyPr>
+          <a:lstStyle/>
+          <a:p>
+            <a:r>
+              <a:rPr lang="zh-CN" altLang="en-US" dirty="0"/>
+              <a:t>将输出层的学习率变小为</a:t>
+            </a:r>
+            <a:r>
+              <a:rPr lang="en-US" altLang="zh-CN" dirty="0"/>
+              <a:t>0.1</a:t>
+            </a:r>
+            <a:endParaRPr kumimoji="1" lang="zh-CN" altLang="en-US" dirty="0"/>
           </a:p>
         </p:txBody>
       </p:sp>
@@ -12913,7 +12702,7 @@
     </p:custDataLst>
     <p:extLst>
       <p:ext uri="{BB962C8B-B14F-4D97-AF65-F5344CB8AC3E}">
-        <p14:creationId xmlns:p14="http://schemas.microsoft.com/office/powerpoint/2010/main" val="3391474740"/>
+        <p14:creationId xmlns:p14="http://schemas.microsoft.com/office/powerpoint/2010/main" val="1180362079"/>
       </p:ext>
     </p:extLst>
   </p:cSld>
@@ -13034,659 +12823,6 @@
           <a:lstStyle/>
           <a:p>
             <a:r>
-              <a:rPr lang="zh-CN" altLang="en-US" dirty="0">
-                <a:sym typeface="+mn-ea"/>
-              </a:rPr>
-              <a:t>任务：</a:t>
-            </a:r>
-            <a:r>
-              <a:rPr lang="zh-CN" altLang="en-US" dirty="0"/>
-              <a:t>改进代码</a:t>
-            </a:r>
-          </a:p>
-        </p:txBody>
-      </p:sp>
-    </p:spTree>
-    <p:custDataLst>
-      <p:tags r:id="rId1"/>
-    </p:custDataLst>
-    <p:extLst>
-      <p:ext uri="{BB962C8B-B14F-4D97-AF65-F5344CB8AC3E}">
-        <p14:creationId xmlns:p14="http://schemas.microsoft.com/office/powerpoint/2010/main" val="2400914644"/>
-      </p:ext>
-    </p:extLst>
-  </p:cSld>
-  <p:clrMapOvr>
-    <a:masterClrMapping/>
-  </p:clrMapOvr>
-</p:sld>
-</file>
-
-<file path=ppt/slides/slide27.xml><?xml version="1.0" encoding="utf-8"?>
-<p:sld xmlns:a="http://schemas.openxmlformats.org/drawingml/2006/main" xmlns:r="http://schemas.openxmlformats.org/officeDocument/2006/relationships" xmlns:p="http://schemas.openxmlformats.org/presentationml/2006/main">
-  <p:cSld>
-    <p:spTree>
-      <p:nvGrpSpPr>
-        <p:cNvPr id="1" name=""/>
-        <p:cNvGrpSpPr/>
-        <p:nvPr/>
-      </p:nvGrpSpPr>
-      <p:grpSpPr>
-        <a:xfrm>
-          <a:off x="0" y="0"/>
-          <a:ext cx="0" cy="0"/>
-          <a:chOff x="0" y="0"/>
-          <a:chExt cx="0" cy="0"/>
-        </a:xfrm>
-      </p:grpSpPr>
-      <p:sp>
-        <p:nvSpPr>
-          <p:cNvPr id="3" name="标题 2"/>
-          <p:cNvSpPr>
-            <a:spLocks noGrp="1"/>
-          </p:cNvSpPr>
-          <p:nvPr>
-            <p:ph type="title"/>
-          </p:nvPr>
-        </p:nvSpPr>
-        <p:spPr/>
-        <p:txBody>
-          <a:bodyPr/>
-          <a:lstStyle/>
-          <a:p>
-            <a:r>
-              <a:rPr lang="zh-CN" altLang="en-US" dirty="0">
-                <a:sym typeface="+mn-ea"/>
-              </a:rPr>
-              <a:t>任务：</a:t>
-            </a:r>
-            <a:r>
-              <a:rPr lang="zh-CN" altLang="en-US" dirty="0"/>
-              <a:t>改进代码</a:t>
-            </a:r>
-            <a:endParaRPr dirty="0">
-              <a:sym typeface="+mn-ea"/>
-            </a:endParaRPr>
-          </a:p>
-        </p:txBody>
-      </p:sp>
-      <p:sp>
-        <p:nvSpPr>
-          <p:cNvPr id="6" name="文本占位符 1">
-            <a:extLst>
-              <a:ext uri="{FF2B5EF4-FFF2-40B4-BE49-F238E27FC236}">
-                <a16:creationId xmlns:a16="http://schemas.microsoft.com/office/drawing/2014/main" id="{BA88068A-4FDC-6963-46A5-ADEC46CDA15E}"/>
-              </a:ext>
-            </a:extLst>
-          </p:cNvPr>
-          <p:cNvSpPr txBox="1">
-            <a:spLocks/>
-          </p:cNvSpPr>
-          <p:nvPr/>
-        </p:nvSpPr>
-        <p:spPr>
-          <a:xfrm>
-            <a:off x="822325" y="1778635"/>
-            <a:ext cx="10852150" cy="4553585"/>
-          </a:xfrm>
-        </p:spPr>
-        <p:txBody>
-          <a:bodyPr lIns="101600" tIns="38100" rIns="76200" bIns="38100">
-            <a:noAutofit/>
-          </a:bodyPr>
-          <a:lstStyle>
-            <a:lvl1pPr marL="0" indent="0" algn="l" defTabSz="914400" rtl="0" eaLnBrk="1" fontAlgn="auto" latinLnBrk="0" hangingPunct="1">
-              <a:lnSpc>
-                <a:spcPct val="130000"/>
-              </a:lnSpc>
-              <a:spcBef>
-                <a:spcPts val="0"/>
-              </a:spcBef>
-              <a:spcAft>
-                <a:spcPts val="1000"/>
-              </a:spcAft>
-              <a:buFont typeface="Arial" panose="020B0604020202020204" pitchFamily="34" charset="0"/>
-              <a:buNone/>
-              <a:defRPr kumimoji="0" lang="zh-CN" altLang="en-US" sz="1600" b="0" i="0" u="none" strike="noStrike" kern="1200" cap="none" spc="150" normalizeH="0" baseline="0" noProof="1">
-                <a:solidFill>
-                  <a:schemeClr val="tx1"/>
-                </a:solidFill>
-                <a:uFillTx/>
-                <a:latin typeface="+mn-lt"/>
-                <a:ea typeface="+mn-ea"/>
-                <a:cs typeface="+mn-cs"/>
-                <a:sym typeface="+mn-ea"/>
-              </a:defRPr>
-            </a:lvl1pPr>
-            <a:lvl2pPr marL="457200" indent="0" algn="l" defTabSz="914400" rtl="0" eaLnBrk="1" fontAlgn="auto" latinLnBrk="0" hangingPunct="1">
-              <a:lnSpc>
-                <a:spcPct val="130000"/>
-              </a:lnSpc>
-              <a:spcBef>
-                <a:spcPts val="0"/>
-              </a:spcBef>
-              <a:spcAft>
-                <a:spcPts val="1000"/>
-              </a:spcAft>
-              <a:buFont typeface="Arial" panose="020B0604020202020204" pitchFamily="34" charset="0"/>
-              <a:buNone/>
-              <a:tabLst>
-                <a:tab pos="1609725" algn="l"/>
-              </a:tabLst>
-              <a:defRPr sz="2000" u="none" strike="noStrike" kern="1200" cap="none" spc="150" normalizeH="0" baseline="0">
-                <a:solidFill>
-                  <a:schemeClr val="tx1">
-                    <a:tint val="75000"/>
-                  </a:schemeClr>
-                </a:solidFill>
-                <a:uFillTx/>
-                <a:latin typeface="+mn-lt"/>
-                <a:ea typeface="+mn-ea"/>
-                <a:cs typeface="+mn-cs"/>
-              </a:defRPr>
-            </a:lvl2pPr>
-            <a:lvl3pPr marL="914400" indent="0" algn="l" defTabSz="914400" rtl="0" eaLnBrk="1" fontAlgn="auto" latinLnBrk="0" hangingPunct="1">
-              <a:lnSpc>
-                <a:spcPct val="130000"/>
-              </a:lnSpc>
-              <a:spcBef>
-                <a:spcPts val="0"/>
-              </a:spcBef>
-              <a:spcAft>
-                <a:spcPts val="1000"/>
-              </a:spcAft>
-              <a:buFont typeface="Arial" panose="020B0604020202020204" pitchFamily="34" charset="0"/>
-              <a:buNone/>
-              <a:defRPr sz="1800" u="none" strike="noStrike" kern="1200" cap="none" spc="150" normalizeH="0" baseline="0">
-                <a:solidFill>
-                  <a:schemeClr val="tx1">
-                    <a:tint val="75000"/>
-                  </a:schemeClr>
-                </a:solidFill>
-                <a:uFillTx/>
-                <a:latin typeface="+mn-lt"/>
-                <a:ea typeface="+mn-ea"/>
-                <a:cs typeface="+mn-cs"/>
-              </a:defRPr>
-            </a:lvl3pPr>
-            <a:lvl4pPr marL="1371600" indent="0" algn="l" defTabSz="914400" rtl="0" eaLnBrk="1" fontAlgn="auto" latinLnBrk="0" hangingPunct="1">
-              <a:lnSpc>
-                <a:spcPct val="130000"/>
-              </a:lnSpc>
-              <a:spcBef>
-                <a:spcPts val="0"/>
-              </a:spcBef>
-              <a:spcAft>
-                <a:spcPts val="1000"/>
-              </a:spcAft>
-              <a:buFont typeface="Arial" panose="020B0604020202020204" pitchFamily="34" charset="0"/>
-              <a:buNone/>
-              <a:defRPr sz="1600" u="none" strike="noStrike" kern="1200" cap="none" spc="150" normalizeH="0" baseline="0">
-                <a:solidFill>
-                  <a:schemeClr val="tx1">
-                    <a:tint val="75000"/>
-                  </a:schemeClr>
-                </a:solidFill>
-                <a:uFillTx/>
-                <a:latin typeface="+mn-lt"/>
-                <a:ea typeface="+mn-ea"/>
-                <a:cs typeface="+mn-cs"/>
-              </a:defRPr>
-            </a:lvl4pPr>
-            <a:lvl5pPr marL="1828800" indent="0" algn="l" defTabSz="914400" rtl="0" eaLnBrk="1" fontAlgn="auto" latinLnBrk="0" hangingPunct="1">
-              <a:lnSpc>
-                <a:spcPct val="130000"/>
-              </a:lnSpc>
-              <a:spcBef>
-                <a:spcPts val="0"/>
-              </a:spcBef>
-              <a:spcAft>
-                <a:spcPts val="1000"/>
-              </a:spcAft>
-              <a:buFont typeface="Arial" panose="020B0604020202020204" pitchFamily="34" charset="0"/>
-              <a:buNone/>
-              <a:defRPr sz="1600" u="none" strike="noStrike" kern="1200" cap="none" spc="150" normalizeH="0" baseline="0">
-                <a:solidFill>
-                  <a:schemeClr val="tx1">
-                    <a:tint val="75000"/>
-                  </a:schemeClr>
-                </a:solidFill>
-                <a:uFillTx/>
-                <a:latin typeface="+mn-lt"/>
-                <a:ea typeface="+mn-ea"/>
-                <a:cs typeface="+mn-cs"/>
-              </a:defRPr>
-            </a:lvl5pPr>
-            <a:lvl6pPr marL="2286000" indent="0" algn="l" defTabSz="914400" rtl="0" eaLnBrk="1" latinLnBrk="0" hangingPunct="1">
-              <a:lnSpc>
-                <a:spcPct val="90000"/>
-              </a:lnSpc>
-              <a:spcBef>
-                <a:spcPts val="500"/>
-              </a:spcBef>
-              <a:buFont typeface="Arial" panose="020B0604020202020204" pitchFamily="34" charset="0"/>
-              <a:buNone/>
-              <a:defRPr sz="1600" kern="1200">
-                <a:solidFill>
-                  <a:schemeClr val="tx1">
-                    <a:tint val="75000"/>
-                  </a:schemeClr>
-                </a:solidFill>
-                <a:latin typeface="+mn-lt"/>
-                <a:ea typeface="+mn-ea"/>
-                <a:cs typeface="+mn-cs"/>
-              </a:defRPr>
-            </a:lvl6pPr>
-            <a:lvl7pPr marL="2743200" indent="0" algn="l" defTabSz="914400" rtl="0" eaLnBrk="1" latinLnBrk="0" hangingPunct="1">
-              <a:lnSpc>
-                <a:spcPct val="90000"/>
-              </a:lnSpc>
-              <a:spcBef>
-                <a:spcPts val="500"/>
-              </a:spcBef>
-              <a:buFont typeface="Arial" panose="020B0604020202020204" pitchFamily="34" charset="0"/>
-              <a:buNone/>
-              <a:defRPr sz="1600" kern="1200">
-                <a:solidFill>
-                  <a:schemeClr val="tx1">
-                    <a:tint val="75000"/>
-                  </a:schemeClr>
-                </a:solidFill>
-                <a:latin typeface="+mn-lt"/>
-                <a:ea typeface="+mn-ea"/>
-                <a:cs typeface="+mn-cs"/>
-              </a:defRPr>
-            </a:lvl7pPr>
-            <a:lvl8pPr marL="3200400" indent="0" algn="l" defTabSz="914400" rtl="0" eaLnBrk="1" latinLnBrk="0" hangingPunct="1">
-              <a:lnSpc>
-                <a:spcPct val="90000"/>
-              </a:lnSpc>
-              <a:spcBef>
-                <a:spcPts val="500"/>
-              </a:spcBef>
-              <a:buFont typeface="Arial" panose="020B0604020202020204" pitchFamily="34" charset="0"/>
-              <a:buNone/>
-              <a:defRPr sz="1600" kern="1200">
-                <a:solidFill>
-                  <a:schemeClr val="tx1">
-                    <a:tint val="75000"/>
-                  </a:schemeClr>
-                </a:solidFill>
-                <a:latin typeface="+mn-lt"/>
-                <a:ea typeface="+mn-ea"/>
-                <a:cs typeface="+mn-cs"/>
-              </a:defRPr>
-            </a:lvl8pPr>
-            <a:lvl9pPr marL="3657600" indent="0" algn="l" defTabSz="914400" rtl="0" eaLnBrk="1" latinLnBrk="0" hangingPunct="1">
-              <a:lnSpc>
-                <a:spcPct val="90000"/>
-              </a:lnSpc>
-              <a:spcBef>
-                <a:spcPts val="500"/>
-              </a:spcBef>
-              <a:buFont typeface="Arial" panose="020B0604020202020204" pitchFamily="34" charset="0"/>
-              <a:buNone/>
-              <a:defRPr sz="1600" kern="1200">
-                <a:solidFill>
-                  <a:schemeClr val="tx1">
-                    <a:tint val="75000"/>
-                  </a:schemeClr>
-                </a:solidFill>
-                <a:latin typeface="+mn-lt"/>
-                <a:ea typeface="+mn-ea"/>
-                <a:cs typeface="+mn-cs"/>
-              </a:defRPr>
-            </a:lvl9pPr>
-          </a:lstStyle>
-          <a:p>
-            <a:pPr marL="285750" indent="-285750">
-              <a:buFont typeface="Arial" panose="020B0604020202020204" pitchFamily="34" charset="0"/>
-              <a:buChar char="•"/>
-            </a:pPr>
-            <a:r>
-              <a:rPr lang="zh-CN" altLang="en-US" dirty="0"/>
-              <a:t>如何改进代码？</a:t>
-            </a:r>
-            <a:endParaRPr lang="en-US" altLang="zh-CN" dirty="0"/>
-          </a:p>
-          <a:p>
-            <a:pPr marL="285750" indent="-285750">
-              <a:buFont typeface="Arial" panose="020B0604020202020204" pitchFamily="34" charset="0"/>
-              <a:buChar char="•"/>
-            </a:pPr>
-            <a:r>
-              <a:rPr lang="zh-CN" altLang="en-US" dirty="0"/>
-              <a:t>将输出层的学习率变小为</a:t>
-            </a:r>
-            <a:r>
-              <a:rPr lang="en-US" altLang="zh-CN" dirty="0"/>
-              <a:t>1.0</a:t>
-            </a:r>
-            <a:r>
-              <a:rPr lang="zh-CN" altLang="en-US" dirty="0"/>
-              <a:t>，再次运行代码，看下是否解决了问题</a:t>
-            </a:r>
-            <a:endParaRPr lang="en-US" altLang="zh-CN" dirty="0"/>
-          </a:p>
-          <a:p>
-            <a:pPr marL="285750" indent="-285750">
-              <a:buFont typeface="Arial" panose="020B0604020202020204" pitchFamily="34" charset="0"/>
-              <a:buChar char="•"/>
-            </a:pPr>
-            <a:r>
-              <a:rPr lang="zh-CN" altLang="en-US" dirty="0"/>
-              <a:t>为什么需要将输出层的学习率变小？</a:t>
-            </a:r>
-            <a:endParaRPr lang="en-US" altLang="zh-CN" dirty="0"/>
-          </a:p>
-          <a:p>
-            <a:pPr marL="285750" indent="-285750">
-              <a:buFont typeface="Arial" panose="020B0604020202020204" pitchFamily="34" charset="0"/>
-              <a:buChar char="•"/>
-            </a:pPr>
-            <a:r>
-              <a:rPr lang="zh-CN" altLang="en-US" dirty="0"/>
-              <a:t>为什么“输出层的学习率过大”会发生警告：隐藏层的输出过大？</a:t>
-            </a:r>
-            <a:br>
-              <a:rPr lang="en-US" altLang="zh-CN" dirty="0"/>
-            </a:br>
-            <a:r>
-              <a:rPr lang="en-US" altLang="zh-CN" dirty="0"/>
-              <a:t>TODO layer3 learn rate too large -&gt; wMatrixBetweenLayer2Layer3 large -&gt; \delta layer2 too large -&gt; wMatrixBetweenLayer1Layer2 too large</a:t>
-            </a:r>
-          </a:p>
-          <a:p>
-            <a:endParaRPr lang="en-US" altLang="zh-CN" dirty="0"/>
-          </a:p>
-          <a:p>
-            <a:pPr marL="285750" indent="-285750">
-              <a:buFont typeface="Arial" panose="020B0604020202020204" pitchFamily="34" charset="0"/>
-              <a:buChar char="•"/>
-            </a:pPr>
-            <a:endParaRPr lang="en-US" altLang="zh-CN" dirty="0"/>
-          </a:p>
-          <a:p>
-            <a:pPr marL="285750" indent="-285750">
-              <a:buFont typeface="Arial" panose="020B0604020202020204" pitchFamily="34" charset="0"/>
-              <a:buChar char="•"/>
-            </a:pPr>
-            <a:endParaRPr lang="en-US" altLang="zh-CN" dirty="0"/>
-          </a:p>
-          <a:p>
-            <a:pPr marL="285750" indent="-285750">
-              <a:buFont typeface="Arial" panose="020B0604020202020204" pitchFamily="34" charset="0"/>
-              <a:buChar char="•"/>
-            </a:pPr>
-            <a:endParaRPr lang="en-US" altLang="zh-CN" dirty="0"/>
-          </a:p>
-          <a:p>
-            <a:pPr marL="285750" indent="-285750">
-              <a:buFont typeface="Arial" panose="020B0604020202020204" pitchFamily="34" charset="0"/>
-              <a:buChar char="•"/>
-            </a:pPr>
-            <a:r>
-              <a:rPr lang="zh-CN" altLang="en-US" dirty="0"/>
-              <a:t>自学、展学</a:t>
-            </a:r>
-          </a:p>
-          <a:p>
-            <a:pPr marL="285750" indent="-285750">
-              <a:buFont typeface="Arial" panose="020B0604020202020204" pitchFamily="34" charset="0"/>
-              <a:buChar char="•"/>
-            </a:pPr>
-            <a:endParaRPr lang="zh-CN" altLang="en-US" dirty="0"/>
-          </a:p>
-          <a:p>
-            <a:pPr marL="285750" indent="-285750">
-              <a:buFont typeface="Arial" panose="020B0604020202020204" pitchFamily="34" charset="0"/>
-              <a:buChar char="•"/>
-            </a:pPr>
-            <a:endParaRPr lang="en-US" altLang="zh-CN" dirty="0"/>
-          </a:p>
-          <a:p>
-            <a:pPr marL="285750" indent="-285750">
-              <a:buFont typeface="Arial" panose="020B0604020202020204" pitchFamily="34" charset="0"/>
-              <a:buChar char="•"/>
-            </a:pPr>
-            <a:endParaRPr lang="zh-CN" altLang="en-US" dirty="0"/>
-          </a:p>
-          <a:p>
-            <a:pPr marL="285750" indent="-285750">
-              <a:buFont typeface="Arial" panose="020B0604020202020204" pitchFamily="34" charset="0"/>
-              <a:buChar char="•"/>
-            </a:pPr>
-            <a:endParaRPr lang="zh-CN" altLang="en-US" dirty="0"/>
-          </a:p>
-          <a:p>
-            <a:pPr marL="285750" indent="-285750">
-              <a:buFont typeface="Arial" panose="020B0604020202020204" pitchFamily="34" charset="0"/>
-              <a:buChar char="•"/>
-            </a:pPr>
-            <a:endParaRPr lang="zh-CN" altLang="en-US" dirty="0"/>
-          </a:p>
-          <a:p>
-            <a:pPr marL="285750" indent="-285750">
-              <a:buFont typeface="Arial" panose="020B0604020202020204" pitchFamily="34" charset="0"/>
-              <a:buChar char="•"/>
-            </a:pPr>
-            <a:endParaRPr lang="zh-CN" altLang="en-US" dirty="0"/>
-          </a:p>
-          <a:p>
-            <a:pPr marL="285750" indent="-285750">
-              <a:buFont typeface="Arial" panose="020B0604020202020204" pitchFamily="34" charset="0"/>
-              <a:buChar char="•"/>
-            </a:pPr>
-            <a:endParaRPr lang="zh-CN" altLang="en-US" dirty="0"/>
-          </a:p>
-          <a:p>
-            <a:pPr marL="285750" indent="-285750">
-              <a:buFont typeface="Arial" panose="020B0604020202020204" pitchFamily="34" charset="0"/>
-              <a:buChar char="•"/>
-            </a:pPr>
-            <a:endParaRPr lang="zh-CN" altLang="en-US" dirty="0"/>
-          </a:p>
-          <a:p>
-            <a:pPr marL="285750" indent="-285750">
-              <a:buFont typeface="Arial" panose="020B0604020202020204" pitchFamily="34" charset="0"/>
-              <a:buChar char="•"/>
-            </a:pPr>
-            <a:endParaRPr lang="zh-CN" altLang="en-US" dirty="0"/>
-          </a:p>
-        </p:txBody>
-      </p:sp>
-      <p:sp>
-        <p:nvSpPr>
-          <p:cNvPr id="2" name="文本框 1">
-            <a:extLst>
-              <a:ext uri="{FF2B5EF4-FFF2-40B4-BE49-F238E27FC236}">
-                <a16:creationId xmlns:a16="http://schemas.microsoft.com/office/drawing/2014/main" id="{C44CE5FF-F5B7-EE3A-4FA0-0237E0B59B4F}"/>
-              </a:ext>
-            </a:extLst>
-          </p:cNvPr>
-          <p:cNvSpPr txBox="1"/>
-          <p:nvPr/>
-        </p:nvSpPr>
-        <p:spPr>
-          <a:xfrm>
-            <a:off x="1051719" y="4383075"/>
-            <a:ext cx="11297705" cy="1200329"/>
-          </a:xfrm>
-          <a:prstGeom prst="rect">
-            <a:avLst/>
-          </a:prstGeom>
-          <a:noFill/>
-        </p:spPr>
-        <p:txBody>
-          <a:bodyPr wrap="square" rtlCol="0">
-            <a:spAutoFit/>
-          </a:bodyPr>
-          <a:lstStyle/>
-          <a:p>
-            <a:r>
-              <a:rPr kumimoji="1" lang="zh-CN" altLang="en-US" dirty="0"/>
-              <a:t>因为之前的输出层的激活函数是</a:t>
-            </a:r>
-            <a:r>
-              <a:rPr kumimoji="1" lang="en-US" altLang="zh-CN" dirty="0"/>
-              <a:t>sigmoid</a:t>
-            </a:r>
-            <a:r>
-              <a:rPr kumimoji="1" lang="zh-CN" altLang="en-US" dirty="0"/>
-              <a:t>，所以在求激活函数的导数时对加权和进行了缩小的处理，</a:t>
-            </a:r>
-            <a:endParaRPr kumimoji="1" lang="en-US" altLang="zh-CN" dirty="0"/>
-          </a:p>
-          <a:p>
-            <a:r>
-              <a:rPr kumimoji="1" lang="zh-CN" altLang="en-US" dirty="0"/>
-              <a:t>这样会导致输出层的误差项变小，从而导致输出层的梯度变小；</a:t>
-            </a:r>
-            <a:endParaRPr kumimoji="1" lang="en-US" altLang="zh-CN" dirty="0"/>
-          </a:p>
-          <a:p>
-            <a:r>
-              <a:rPr kumimoji="1" lang="zh-CN" altLang="en-US" dirty="0"/>
-              <a:t>而现在激活函数换成</a:t>
-            </a:r>
-            <a:r>
-              <a:rPr kumimoji="1" lang="en-US" altLang="zh-CN" dirty="0" err="1"/>
-              <a:t>softmax</a:t>
-            </a:r>
-            <a:r>
-              <a:rPr kumimoji="1" lang="zh-CN" altLang="en-US" dirty="0"/>
-              <a:t>后，在求激活函数的导数时就没有对加权和进行缩小处理了，所以输出层的梯度就变大了，所以学习率就要对应地变小，从而使得梯度下降公式中的权重值的变化范围维持不变。</a:t>
-            </a:r>
-          </a:p>
-        </p:txBody>
-      </p:sp>
-    </p:spTree>
-    <p:custDataLst>
-      <p:tags r:id="rId1"/>
-    </p:custDataLst>
-    <p:extLst>
-      <p:ext uri="{BB962C8B-B14F-4D97-AF65-F5344CB8AC3E}">
-        <p14:creationId xmlns:p14="http://schemas.microsoft.com/office/powerpoint/2010/main" val="1180362079"/>
-      </p:ext>
-    </p:extLst>
-  </p:cSld>
-  <p:clrMapOvr>
-    <a:masterClrMapping/>
-  </p:clrMapOvr>
-  <p:timing>
-    <p:tnLst>
-      <p:par>
-        <p:cTn id="1" dur="indefinite" restart="never" nodeType="tmRoot">
-          <p:childTnLst>
-            <p:seq concurrent="1" nextAc="seek">
-              <p:cTn id="2" dur="indefinite" nodeType="mainSeq">
-                <p:childTnLst>
-                  <p:par>
-                    <p:cTn id="3" fill="hold">
-                      <p:stCondLst>
-                        <p:cond delay="indefinite"/>
-                      </p:stCondLst>
-                      <p:childTnLst>
-                        <p:par>
-                          <p:cTn id="4" fill="hold">
-                            <p:stCondLst>
-                              <p:cond delay="0"/>
-                            </p:stCondLst>
-                            <p:childTnLst>
-                              <p:par>
-                                <p:cTn id="5" presetID="1" presetClass="entr" presetSubtype="0" fill="hold" grpId="0" nodeType="clickEffect">
-                                  <p:stCondLst>
-                                    <p:cond delay="0"/>
-                                  </p:stCondLst>
-                                  <p:childTnLst>
-                                    <p:set>
-                                      <p:cBhvr>
-                                        <p:cTn id="6" dur="1" fill="hold">
-                                          <p:stCondLst>
-                                            <p:cond delay="0"/>
-                                          </p:stCondLst>
-                                        </p:cTn>
-                                        <p:tgtEl>
-                                          <p:spTgt spid="6"/>
-                                        </p:tgtEl>
-                                        <p:attrNameLst>
-                                          <p:attrName>style.visibility</p:attrName>
-                                        </p:attrNameLst>
-                                      </p:cBhvr>
-                                      <p:to>
-                                        <p:strVal val="visible"/>
-                                      </p:to>
-                                    </p:set>
-                                  </p:childTnLst>
-                                </p:cTn>
-                              </p:par>
-                            </p:childTnLst>
-                          </p:cTn>
-                        </p:par>
-                      </p:childTnLst>
-                    </p:cTn>
-                  </p:par>
-                </p:childTnLst>
-              </p:cTn>
-              <p:prevCondLst>
-                <p:cond evt="onPrev" delay="0">
-                  <p:tgtEl>
-                    <p:sldTgt/>
-                  </p:tgtEl>
-                </p:cond>
-              </p:prevCondLst>
-              <p:nextCondLst>
-                <p:cond evt="onNext" delay="0">
-                  <p:tgtEl>
-                    <p:sldTgt/>
-                  </p:tgtEl>
-                </p:cond>
-              </p:nextCondLst>
-            </p:seq>
-          </p:childTnLst>
-        </p:cTn>
-      </p:par>
-    </p:tnLst>
-    <p:bldLst>
-      <p:bldP spid="6" grpId="0"/>
-    </p:bldLst>
-  </p:timing>
-</p:sld>
-</file>
-
-<file path=ppt/slides/slide28.xml><?xml version="1.0" encoding="utf-8"?>
-<p:sld xmlns:a="http://schemas.openxmlformats.org/drawingml/2006/main" xmlns:r="http://schemas.openxmlformats.org/officeDocument/2006/relationships" xmlns:p="http://schemas.openxmlformats.org/presentationml/2006/main">
-  <p:cSld>
-    <p:spTree>
-      <p:nvGrpSpPr>
-        <p:cNvPr id="1" name=""/>
-        <p:cNvGrpSpPr/>
-        <p:nvPr/>
-      </p:nvGrpSpPr>
-      <p:grpSpPr>
-        <a:xfrm>
-          <a:off x="0" y="0"/>
-          <a:ext cx="0" cy="0"/>
-          <a:chOff x="0" y="0"/>
-          <a:chExt cx="0" cy="0"/>
-        </a:xfrm>
-      </p:grpSpPr>
-      <p:sp>
-        <p:nvSpPr>
-          <p:cNvPr id="2" name="标题 1"/>
-          <p:cNvSpPr>
-            <a:spLocks noGrp="1"/>
-          </p:cNvSpPr>
-          <p:nvPr>
-            <p:ph type="title"/>
-          </p:nvPr>
-        </p:nvSpPr>
-        <p:spPr/>
-        <p:txBody>
-          <a:bodyPr/>
-          <a:lstStyle/>
-          <a:p>
-            <a:r>
               <a:rPr lang="zh-CN" altLang="en-US"/>
               <a:t>总结</a:t>
             </a:r>
@@ -13704,7 +12840,7 @@
 </p:sld>
 </file>
 
-<file path=ppt/slides/slide29.xml><?xml version="1.0" encoding="utf-8"?>
+<file path=ppt/slides/slide27.xml><?xml version="1.0" encoding="utf-8"?>
 <p:sld xmlns:a="http://schemas.openxmlformats.org/drawingml/2006/main" xmlns:r="http://schemas.openxmlformats.org/officeDocument/2006/relationships" xmlns:p="http://schemas.openxmlformats.org/presentationml/2006/main">
   <p:cSld>
     <p:spTree>
@@ -14011,6 +13147,287 @@
       <p:bldP spid="2" grpId="0" uiExpand="1" build="p"/>
     </p:bldLst>
   </p:timing>
+</p:sld>
+</file>
+
+<file path=ppt/slides/slide28.xml><?xml version="1.0" encoding="utf-8"?>
+<p:sld xmlns:a="http://schemas.openxmlformats.org/drawingml/2006/main" xmlns:r="http://schemas.openxmlformats.org/officeDocument/2006/relationships" xmlns:p="http://schemas.openxmlformats.org/presentationml/2006/main">
+  <p:cSld>
+    <p:spTree>
+      <p:nvGrpSpPr>
+        <p:cNvPr id="1" name=""/>
+        <p:cNvGrpSpPr/>
+        <p:nvPr/>
+      </p:nvGrpSpPr>
+      <p:grpSpPr>
+        <a:xfrm>
+          <a:off x="0" y="0"/>
+          <a:ext cx="0" cy="0"/>
+          <a:chOff x="0" y="0"/>
+          <a:chExt cx="0" cy="0"/>
+        </a:xfrm>
+      </p:grpSpPr>
+      <p:sp>
+        <p:nvSpPr>
+          <p:cNvPr id="2" name="文本占位符 1"/>
+          <p:cNvSpPr>
+            <a:spLocks noGrp="1"/>
+          </p:cNvSpPr>
+          <p:nvPr>
+            <p:ph type="body" idx="1"/>
+          </p:nvPr>
+        </p:nvSpPr>
+        <p:spPr/>
+        <p:txBody>
+          <a:bodyPr/>
+          <a:lstStyle/>
+          <a:p>
+            <a:pPr marL="285750" indent="-285750">
+              <a:buFont typeface="Arial" panose="020B0604020202020204" pitchFamily="34" charset="0"/>
+              <a:buChar char="•"/>
+            </a:pPr>
+            <a:r>
+              <a:rPr lang="en" dirty="0">
+                <a:sym typeface="+mn-ea"/>
+                <a:hlinkClick r:id="rId3"/>
+              </a:rPr>
+              <a:t>Improving the way neural networks learn</a:t>
+            </a:r>
+            <a:endParaRPr lang="en" dirty="0">
+              <a:sym typeface="+mn-ea"/>
+            </a:endParaRPr>
+          </a:p>
+          <a:p>
+            <a:pPr marL="285750" indent="-285750">
+              <a:buFont typeface="Arial" panose="020B0604020202020204" pitchFamily="34" charset="0"/>
+              <a:buChar char="•"/>
+            </a:pPr>
+            <a:r>
+              <a:rPr lang="zh-CN" altLang="en-US" dirty="0">
+                <a:sym typeface="+mn-ea"/>
+                <a:hlinkClick r:id="rId4"/>
+              </a:rPr>
+              <a:t>超详细的</a:t>
+            </a:r>
+            <a:r>
+              <a:rPr lang="en" dirty="0">
+                <a:sym typeface="+mn-ea"/>
+                <a:hlinkClick r:id="rId4"/>
+              </a:rPr>
+              <a:t>softmax</a:t>
+            </a:r>
+            <a:r>
+              <a:rPr lang="zh-CN" altLang="en-US" dirty="0">
+                <a:sym typeface="+mn-ea"/>
+                <a:hlinkClick r:id="rId4"/>
+              </a:rPr>
+              <a:t>的反向传播梯度计算推导</a:t>
+            </a:r>
+            <a:endParaRPr lang="en-US" altLang="zh-CN" dirty="0">
+              <a:sym typeface="+mn-ea"/>
+            </a:endParaRPr>
+          </a:p>
+          <a:p>
+            <a:pPr marL="285750" indent="-285750">
+              <a:buFont typeface="Arial" panose="020B0604020202020204" pitchFamily="34" charset="0"/>
+              <a:buChar char="•"/>
+            </a:pPr>
+            <a:r>
+              <a:rPr lang="en" dirty="0">
+                <a:sym typeface="+mn-ea"/>
+                <a:hlinkClick r:id="rId5"/>
+              </a:rPr>
+              <a:t>Softmax</a:t>
+            </a:r>
+            <a:r>
+              <a:rPr lang="zh-CN" altLang="en-US" dirty="0">
+                <a:sym typeface="+mn-ea"/>
+                <a:hlinkClick r:id="rId5"/>
+              </a:rPr>
+              <a:t>与交叉熵损失的实现及求导</a:t>
+            </a:r>
+            <a:endParaRPr dirty="0">
+              <a:sym typeface="+mn-ea"/>
+            </a:endParaRPr>
+          </a:p>
+        </p:txBody>
+      </p:sp>
+      <p:sp>
+        <p:nvSpPr>
+          <p:cNvPr id="3" name="标题 2"/>
+          <p:cNvSpPr>
+            <a:spLocks noGrp="1"/>
+          </p:cNvSpPr>
+          <p:nvPr>
+            <p:ph type="title"/>
+          </p:nvPr>
+        </p:nvSpPr>
+        <p:spPr/>
+        <p:txBody>
+          <a:bodyPr/>
+          <a:lstStyle/>
+          <a:p>
+            <a:r>
+              <a:rPr lang="zh-CN" altLang="en-US" dirty="0"/>
+              <a:t>参考资料</a:t>
+            </a:r>
+          </a:p>
+        </p:txBody>
+      </p:sp>
+      <p:graphicFrame>
+        <p:nvGraphicFramePr>
+          <p:cNvPr id="4" name="对象 3">
+            <a:hlinkClick r:id="" action="ppaction://ole?verb=0"/>
+          </p:cNvPr>
+          <p:cNvGraphicFramePr>
+            <a:graphicFrameLocks noChangeAspect="1"/>
+          </p:cNvGraphicFramePr>
+          <p:nvPr/>
+        </p:nvGraphicFramePr>
+        <p:xfrm>
+          <a:off x="5638800" y="3244850"/>
+          <a:ext cx="914400" cy="368300"/>
+        </p:xfrm>
+        <a:graphic>
+          <a:graphicData uri="http://schemas.openxmlformats.org/presentationml/2006/ole">
+            <mc:AlternateContent xmlns:mc="http://schemas.openxmlformats.org/markup-compatibility/2006">
+              <mc:Choice xmlns:v="urn:schemas-microsoft-com:vml" Requires="v">
+                <p:oleObj r:id="rId6" imgW="914400" imgH="368300" progId="Equation.KSEE3">
+                  <p:embed/>
+                </p:oleObj>
+              </mc:Choice>
+              <mc:Fallback>
+                <p:oleObj r:id="rId6" imgW="914400" imgH="368300" progId="Equation.KSEE3">
+                  <p:embed/>
+                  <p:pic>
+                    <p:nvPicPr>
+                      <p:cNvPr id="4" name="对象 3">
+                        <a:hlinkClick r:id="" action="ppaction://ole?verb=0"/>
+                      </p:cNvPr>
+                      <p:cNvPicPr/>
+                      <p:nvPr/>
+                    </p:nvPicPr>
+                    <p:blipFill>
+                      <a:blip r:embed="rId7"/>
+                      <a:stretch>
+                        <a:fillRect/>
+                      </a:stretch>
+                    </p:blipFill>
+                    <p:spPr>
+                      <a:xfrm>
+                        <a:off x="5638800" y="3244850"/>
+                        <a:ext cx="914400" cy="368300"/>
+                      </a:xfrm>
+                      <a:prstGeom prst="rect">
+                        <a:avLst/>
+                      </a:prstGeom>
+                    </p:spPr>
+                  </p:pic>
+                </p:oleObj>
+              </mc:Fallback>
+            </mc:AlternateContent>
+          </a:graphicData>
+        </a:graphic>
+      </p:graphicFrame>
+    </p:spTree>
+    <p:custDataLst>
+      <p:tags r:id="rId1"/>
+    </p:custDataLst>
+    <p:extLst>
+      <p:ext uri="{BB962C8B-B14F-4D97-AF65-F5344CB8AC3E}">
+        <p14:creationId xmlns:p14="http://schemas.microsoft.com/office/powerpoint/2010/main" val="2517994622"/>
+      </p:ext>
+    </p:extLst>
+  </p:cSld>
+  <p:clrMapOvr>
+    <a:masterClrMapping/>
+  </p:clrMapOvr>
+</p:sld>
+</file>
+
+<file path=ppt/slides/slide29.xml><?xml version="1.0" encoding="utf-8"?>
+<p:sld xmlns:a="http://schemas.openxmlformats.org/drawingml/2006/main" xmlns:r="http://schemas.openxmlformats.org/officeDocument/2006/relationships" xmlns:p="http://schemas.openxmlformats.org/presentationml/2006/main">
+  <p:cSld>
+    <p:spTree>
+      <p:nvGrpSpPr>
+        <p:cNvPr id="1" name=""/>
+        <p:cNvGrpSpPr/>
+        <p:nvPr/>
+      </p:nvGrpSpPr>
+      <p:grpSpPr>
+        <a:xfrm>
+          <a:off x="0" y="0"/>
+          <a:ext cx="0" cy="0"/>
+          <a:chOff x="0" y="0"/>
+          <a:chExt cx="0" cy="0"/>
+        </a:xfrm>
+      </p:grpSpPr>
+      <p:sp>
+        <p:nvSpPr>
+          <p:cNvPr id="2" name="文本占位符 1"/>
+          <p:cNvSpPr>
+            <a:spLocks noGrp="1"/>
+          </p:cNvSpPr>
+          <p:nvPr>
+            <p:ph type="body" idx="1"/>
+          </p:nvPr>
+        </p:nvSpPr>
+        <p:spPr/>
+        <p:txBody>
+          <a:bodyPr/>
+          <a:lstStyle/>
+          <a:p>
+            <a:pPr marL="285750" indent="-285750">
+              <a:buFont typeface="Arial" panose="020B0604020202020204" pitchFamily="34" charset="0"/>
+              <a:buChar char="•"/>
+            </a:pPr>
+            <a:r>
+              <a:rPr lang="zh-CN" altLang="en-US" dirty="0">
+                <a:sym typeface="+mn-ea"/>
+              </a:rPr>
+              <a:t>使用小批量随机梯度下降</a:t>
+            </a:r>
+            <a:endParaRPr dirty="0">
+              <a:sym typeface="+mn-ea"/>
+            </a:endParaRPr>
+          </a:p>
+        </p:txBody>
+      </p:sp>
+      <p:sp>
+        <p:nvSpPr>
+          <p:cNvPr id="3" name="标题 2"/>
+          <p:cNvSpPr>
+            <a:spLocks noGrp="1"/>
+          </p:cNvSpPr>
+          <p:nvPr>
+            <p:ph type="title"/>
+          </p:nvPr>
+        </p:nvSpPr>
+        <p:spPr/>
+        <p:txBody>
+          <a:bodyPr/>
+          <a:lstStyle/>
+          <a:p>
+            <a:r>
+              <a:rPr lang="zh-CN" altLang="en-US" dirty="0"/>
+              <a:t>下节课预告</a:t>
+            </a:r>
+          </a:p>
+        </p:txBody>
+      </p:sp>
+    </p:spTree>
+    <p:custDataLst>
+      <p:tags r:id="rId1"/>
+    </p:custDataLst>
+    <p:extLst>
+      <p:ext uri="{BB962C8B-B14F-4D97-AF65-F5344CB8AC3E}">
+        <p14:creationId xmlns:p14="http://schemas.microsoft.com/office/powerpoint/2010/main" val="1027050507"/>
+      </p:ext>
+    </p:extLst>
+  </p:cSld>
+  <p:clrMapOvr>
+    <a:masterClrMapping/>
+  </p:clrMapOvr>
 </p:sld>
 </file>
 
@@ -14381,177 +13798,10 @@
           <a:chExt cx="0" cy="0"/>
         </a:xfrm>
       </p:grpSpPr>
-      <p:sp>
-        <p:nvSpPr>
-          <p:cNvPr id="2" name="文本占位符 1"/>
-          <p:cNvSpPr>
-            <a:spLocks noGrp="1"/>
-          </p:cNvSpPr>
-          <p:nvPr>
-            <p:ph type="body" idx="1"/>
-          </p:nvPr>
-        </p:nvSpPr>
-        <p:spPr/>
-        <p:txBody>
-          <a:bodyPr/>
-          <a:lstStyle/>
-          <a:p>
-            <a:pPr marL="285750" indent="-285750">
-              <a:buFont typeface="Arial" panose="020B0604020202020204" pitchFamily="34" charset="0"/>
-              <a:buChar char="•"/>
-            </a:pPr>
-            <a:r>
-              <a:rPr lang="en" dirty="0">
-                <a:sym typeface="+mn-ea"/>
-                <a:hlinkClick r:id="rId3"/>
-              </a:rPr>
-              <a:t>Improving the way neural networks learn</a:t>
-            </a:r>
-            <a:endParaRPr lang="en" dirty="0">
-              <a:sym typeface="+mn-ea"/>
-            </a:endParaRPr>
-          </a:p>
-          <a:p>
-            <a:pPr marL="285750" indent="-285750">
-              <a:buFont typeface="Arial" panose="020B0604020202020204" pitchFamily="34" charset="0"/>
-              <a:buChar char="•"/>
-            </a:pPr>
-            <a:r>
-              <a:rPr lang="zh-CN" altLang="en-US" dirty="0">
-                <a:sym typeface="+mn-ea"/>
-                <a:hlinkClick r:id="rId4"/>
-              </a:rPr>
-              <a:t>超详细的</a:t>
-            </a:r>
-            <a:r>
-              <a:rPr lang="en" dirty="0">
-                <a:sym typeface="+mn-ea"/>
-                <a:hlinkClick r:id="rId4"/>
-              </a:rPr>
-              <a:t>softmax</a:t>
-            </a:r>
-            <a:r>
-              <a:rPr lang="zh-CN" altLang="en-US" dirty="0">
-                <a:sym typeface="+mn-ea"/>
-                <a:hlinkClick r:id="rId4"/>
-              </a:rPr>
-              <a:t>的反向传播梯度计算推导</a:t>
-            </a:r>
-            <a:endParaRPr lang="en-US" altLang="zh-CN" dirty="0">
-              <a:sym typeface="+mn-ea"/>
-            </a:endParaRPr>
-          </a:p>
-          <a:p>
-            <a:pPr marL="285750" indent="-285750">
-              <a:buFont typeface="Arial" panose="020B0604020202020204" pitchFamily="34" charset="0"/>
-              <a:buChar char="•"/>
-            </a:pPr>
-            <a:r>
-              <a:rPr lang="en" dirty="0">
-                <a:sym typeface="+mn-ea"/>
-                <a:hlinkClick r:id="rId5"/>
-              </a:rPr>
-              <a:t>Softmax</a:t>
-            </a:r>
-            <a:r>
-              <a:rPr lang="zh-CN" altLang="en-US" dirty="0">
-                <a:sym typeface="+mn-ea"/>
-                <a:hlinkClick r:id="rId5"/>
-              </a:rPr>
-              <a:t>与交叉熵损失的实现及求导</a:t>
-            </a:r>
-            <a:endParaRPr dirty="0">
-              <a:sym typeface="+mn-ea"/>
-            </a:endParaRPr>
-          </a:p>
-        </p:txBody>
-      </p:sp>
-      <p:sp>
-        <p:nvSpPr>
-          <p:cNvPr id="3" name="标题 2"/>
-          <p:cNvSpPr>
-            <a:spLocks noGrp="1"/>
-          </p:cNvSpPr>
-          <p:nvPr>
-            <p:ph type="title"/>
-          </p:nvPr>
-        </p:nvSpPr>
-        <p:spPr/>
-        <p:txBody>
-          <a:bodyPr/>
-          <a:lstStyle/>
-          <a:p>
-            <a:r>
-              <a:rPr lang="zh-CN" altLang="en-US" dirty="0"/>
-              <a:t>参考资料</a:t>
-            </a:r>
-          </a:p>
-        </p:txBody>
-      </p:sp>
-      <p:graphicFrame>
-        <p:nvGraphicFramePr>
-          <p:cNvPr id="4" name="对象 3">
-            <a:hlinkClick r:id="" action="ppaction://ole?verb=0"/>
-          </p:cNvPr>
-          <p:cNvGraphicFramePr>
-            <a:graphicFrameLocks noChangeAspect="1"/>
-          </p:cNvGraphicFramePr>
-          <p:nvPr/>
-        </p:nvGraphicFramePr>
-        <p:xfrm>
-          <a:off x="5638800" y="3244850"/>
-          <a:ext cx="914400" cy="368300"/>
-        </p:xfrm>
-        <a:graphic>
-          <a:graphicData uri="http://schemas.openxmlformats.org/presentationml/2006/ole">
-            <mc:AlternateContent xmlns:mc="http://schemas.openxmlformats.org/markup-compatibility/2006">
-              <mc:Choice xmlns:v="urn:schemas-microsoft-com:vml" Requires="v">
-                <p:oleObj r:id="rId6" imgW="914400" imgH="368300" progId="Equation.KSEE3">
-                  <p:embed/>
-                </p:oleObj>
-              </mc:Choice>
-              <mc:Fallback>
-                <p:oleObj r:id="rId6" imgW="914400" imgH="368300" progId="Equation.KSEE3">
-                  <p:embed/>
-                  <p:pic>
-                    <p:nvPicPr>
-                      <p:cNvPr id="4" name="对象 3">
-                        <a:hlinkClick r:id="" action="ppaction://ole?verb=0"/>
-                      </p:cNvPr>
-                      <p:cNvPicPr/>
-                      <p:nvPr/>
-                    </p:nvPicPr>
-                    <p:blipFill>
-                      <a:blip r:embed="rId7"/>
-                      <a:stretch>
-                        <a:fillRect/>
-                      </a:stretch>
-                    </p:blipFill>
-                    <p:spPr>
-                      <a:xfrm>
-                        <a:off x="5638800" y="3244850"/>
-                        <a:ext cx="914400" cy="368300"/>
-                      </a:xfrm>
-                      <a:prstGeom prst="rect">
-                        <a:avLst/>
-                      </a:prstGeom>
-                    </p:spPr>
-                  </p:pic>
-                </p:oleObj>
-              </mc:Fallback>
-            </mc:AlternateContent>
-          </a:graphicData>
-        </a:graphic>
-      </p:graphicFrame>
     </p:spTree>
     <p:custDataLst>
       <p:tags r:id="rId1"/>
     </p:custDataLst>
-    <p:extLst>
-      <p:ext uri="{BB962C8B-B14F-4D97-AF65-F5344CB8AC3E}">
-        <p14:creationId xmlns:p14="http://schemas.microsoft.com/office/powerpoint/2010/main" val="2517994622"/>
-      </p:ext>
-    </p:extLst>
   </p:cSld>
   <p:clrMapOvr>
     <a:masterClrMapping/>
@@ -14595,9 +13845,7 @@
               <a:buFont typeface="Arial" panose="020B0604020202020204" pitchFamily="34" charset="0"/>
               <a:buChar char="•"/>
             </a:pPr>
-            <a:endParaRPr dirty="0">
-              <a:sym typeface="+mn-ea"/>
-            </a:endParaRPr>
+            <a:endParaRPr lang="en-US" altLang="zh-CN" dirty="0"/>
           </a:p>
         </p:txBody>
       </p:sp>
@@ -14617,112 +13865,6 @@
           <a:lstStyle/>
           <a:p>
             <a:r>
-              <a:rPr lang="zh-CN" altLang="en-US"/>
-              <a:t>下节课预告</a:t>
-            </a:r>
-          </a:p>
-        </p:txBody>
-      </p:sp>
-    </p:spTree>
-    <p:custDataLst>
-      <p:tags r:id="rId1"/>
-    </p:custDataLst>
-    <p:extLst>
-      <p:ext uri="{BB962C8B-B14F-4D97-AF65-F5344CB8AC3E}">
-        <p14:creationId xmlns:p14="http://schemas.microsoft.com/office/powerpoint/2010/main" val="1027050507"/>
-      </p:ext>
-    </p:extLst>
-  </p:cSld>
-  <p:clrMapOvr>
-    <a:masterClrMapping/>
-  </p:clrMapOvr>
-</p:sld>
-</file>
-
-<file path=ppt/slides/slide32.xml><?xml version="1.0" encoding="utf-8"?>
-<p:sld xmlns:a="http://schemas.openxmlformats.org/drawingml/2006/main" xmlns:r="http://schemas.openxmlformats.org/officeDocument/2006/relationships" xmlns:p="http://schemas.openxmlformats.org/presentationml/2006/main">
-  <p:cSld>
-    <p:spTree>
-      <p:nvGrpSpPr>
-        <p:cNvPr id="1" name=""/>
-        <p:cNvGrpSpPr/>
-        <p:nvPr/>
-      </p:nvGrpSpPr>
-      <p:grpSpPr>
-        <a:xfrm>
-          <a:off x="0" y="0"/>
-          <a:ext cx="0" cy="0"/>
-          <a:chOff x="0" y="0"/>
-          <a:chExt cx="0" cy="0"/>
-        </a:xfrm>
-      </p:grpSpPr>
-    </p:spTree>
-    <p:custDataLst>
-      <p:tags r:id="rId1"/>
-    </p:custDataLst>
-  </p:cSld>
-  <p:clrMapOvr>
-    <a:masterClrMapping/>
-  </p:clrMapOvr>
-</p:sld>
-</file>
-
-<file path=ppt/slides/slide33.xml><?xml version="1.0" encoding="utf-8"?>
-<p:sld xmlns:a="http://schemas.openxmlformats.org/drawingml/2006/main" xmlns:r="http://schemas.openxmlformats.org/officeDocument/2006/relationships" xmlns:p="http://schemas.openxmlformats.org/presentationml/2006/main">
-  <p:cSld>
-    <p:spTree>
-      <p:nvGrpSpPr>
-        <p:cNvPr id="1" name=""/>
-        <p:cNvGrpSpPr/>
-        <p:nvPr/>
-      </p:nvGrpSpPr>
-      <p:grpSpPr>
-        <a:xfrm>
-          <a:off x="0" y="0"/>
-          <a:ext cx="0" cy="0"/>
-          <a:chOff x="0" y="0"/>
-          <a:chExt cx="0" cy="0"/>
-        </a:xfrm>
-      </p:grpSpPr>
-      <p:sp>
-        <p:nvSpPr>
-          <p:cNvPr id="2" name="文本占位符 1"/>
-          <p:cNvSpPr>
-            <a:spLocks noGrp="1"/>
-          </p:cNvSpPr>
-          <p:nvPr>
-            <p:ph type="body" idx="1"/>
-          </p:nvPr>
-        </p:nvSpPr>
-        <p:spPr/>
-        <p:txBody>
-          <a:bodyPr/>
-          <a:lstStyle/>
-          <a:p>
-            <a:pPr marL="285750" indent="-285750">
-              <a:buFont typeface="Arial" panose="020B0604020202020204" pitchFamily="34" charset="0"/>
-              <a:buChar char="•"/>
-            </a:pPr>
-            <a:endParaRPr lang="en-US" altLang="zh-CN" dirty="0"/>
-          </a:p>
-        </p:txBody>
-      </p:sp>
-      <p:sp>
-        <p:nvSpPr>
-          <p:cNvPr id="3" name="标题 2"/>
-          <p:cNvSpPr>
-            <a:spLocks noGrp="1"/>
-          </p:cNvSpPr>
-          <p:nvPr>
-            <p:ph type="title"/>
-          </p:nvPr>
-        </p:nvSpPr>
-        <p:spPr/>
-        <p:txBody>
-          <a:bodyPr/>
-          <a:lstStyle/>
-          <a:p>
-            <a:r>
               <a:rPr lang="zh-CN" altLang="en-US" dirty="0"/>
               <a:t>问答</a:t>
             </a:r>
@@ -14740,7 +13882,7 @@
 </p:sld>
 </file>
 
-<file path=ppt/slides/slide34.xml><?xml version="1.0" encoding="utf-8"?>
+<file path=ppt/slides/slide32.xml><?xml version="1.0" encoding="utf-8"?>
 <p:sld xmlns:a="http://schemas.openxmlformats.org/drawingml/2006/main" xmlns:r="http://schemas.openxmlformats.org/officeDocument/2006/relationships" xmlns:p="http://schemas.openxmlformats.org/presentationml/2006/main">
   <p:cSld>
     <p:spTree>
@@ -18345,24 +17487,6 @@
 </file>
 
 <file path=ppt/tags/tag101.xml><?xml version="1.0" encoding="utf-8"?>
-<p:tagLst xmlns:a="http://schemas.openxmlformats.org/drawingml/2006/main" xmlns:r="http://schemas.openxmlformats.org/officeDocument/2006/relationships" xmlns:p="http://schemas.openxmlformats.org/presentationml/2006/main">
-  <p:tag name="KSO_WM_BEAUTIFY_FLAG" val="#wm#"/>
-  <p:tag name="KSO_WM_TEMPLATE_CATEGORY" val="custom"/>
-  <p:tag name="KSO_WM_TEMPLATE_INDEX" val="20187308"/>
-  <p:tag name="KSO_WM_SPECIAL_SOURCE" val="bdnull"/>
-</p:tagLst>
-</file>
-
-<file path=ppt/tags/tag102.xml><?xml version="1.0" encoding="utf-8"?>
-<p:tagLst xmlns:a="http://schemas.openxmlformats.org/drawingml/2006/main" xmlns:r="http://schemas.openxmlformats.org/officeDocument/2006/relationships" xmlns:p="http://schemas.openxmlformats.org/presentationml/2006/main">
-  <p:tag name="KSO_WM_BEAUTIFY_FLAG" val="#wm#"/>
-  <p:tag name="KSO_WM_TEMPLATE_CATEGORY" val="custom"/>
-  <p:tag name="KSO_WM_TEMPLATE_INDEX" val="20187308"/>
-  <p:tag name="KSO_WM_SPECIAL_SOURCE" val="bdnull"/>
-</p:tagLst>
-</file>
-
-<file path=ppt/tags/tag103.xml><?xml version="1.0" encoding="utf-8"?>
 <p:tagLst xmlns:a="http://schemas.openxmlformats.org/drawingml/2006/main" xmlns:r="http://schemas.openxmlformats.org/officeDocument/2006/relationships" xmlns:p="http://schemas.openxmlformats.org/presentationml/2006/main">
   <p:tag name="KSO_WM_BEAUTIFY_FLAG" val="#wm#"/>
   <p:tag name="KSO_WM_TEMPLATE_CATEGORY" val="custom"/>

</xml_diff>